<commit_message>
Updated presentation a little
</commit_message>
<xml_diff>
--- a/Presentation.pptx
+++ b/Presentation.pptx
@@ -4,17 +4,21 @@
   <p:sldMasterIdLst>
     <p:sldMasterId id="2147483744" r:id="rId1"/>
   </p:sldMasterIdLst>
+  <p:notesMasterIdLst>
+    <p:notesMasterId r:id="rId13"/>
+  </p:notesMasterIdLst>
   <p:sldIdLst>
     <p:sldId id="256" r:id="rId2"/>
     <p:sldId id="257" r:id="rId3"/>
     <p:sldId id="258" r:id="rId4"/>
-    <p:sldId id="259" r:id="rId5"/>
-    <p:sldId id="260" r:id="rId6"/>
-    <p:sldId id="261" r:id="rId7"/>
-    <p:sldId id="262" r:id="rId8"/>
-    <p:sldId id="263" r:id="rId9"/>
-    <p:sldId id="265" r:id="rId10"/>
-    <p:sldId id="264" r:id="rId11"/>
+    <p:sldId id="266" r:id="rId5"/>
+    <p:sldId id="259" r:id="rId6"/>
+    <p:sldId id="260" r:id="rId7"/>
+    <p:sldId id="261" r:id="rId8"/>
+    <p:sldId id="262" r:id="rId9"/>
+    <p:sldId id="263" r:id="rId10"/>
+    <p:sldId id="265" r:id="rId11"/>
+    <p:sldId id="264" r:id="rId12"/>
   </p:sldIdLst>
   <p:sldSz cx="9144000" cy="6858000" type="screen4x3"/>
   <p:notesSz cx="6858000" cy="9144000"/>
@@ -121,6 +125,7 @@
             <p14:sldId id="256"/>
             <p14:sldId id="257"/>
             <p14:sldId id="258"/>
+            <p14:sldId id="266"/>
           </p14:sldIdLst>
         </p14:section>
         <p14:section name="Untitled Section" id="{B9274524-FC6C-E543-980E-10A83BD2F653}">
@@ -138,6 +143,956 @@
     </p:ext>
   </p:extLst>
 </p:presentation>
+</file>
+
+<file path=ppt/charts/chart1.xml><?xml version="1.0" encoding="utf-8"?>
+<c:chartSpace xmlns:c="http://schemas.openxmlformats.org/drawingml/2006/chart" xmlns:a="http://schemas.openxmlformats.org/drawingml/2006/main" xmlns:r="http://schemas.openxmlformats.org/officeDocument/2006/relationships">
+  <c:date1904 val="0"/>
+  <c:lang val="en-US"/>
+  <c:roundedCorners val="0"/>
+  <mc:AlternateContent xmlns:mc="http://schemas.openxmlformats.org/markup-compatibility/2006">
+    <mc:Choice xmlns:c14="http://schemas.microsoft.com/office/drawing/2007/8/2/chart" Requires="c14">
+      <c14:style val="102"/>
+    </mc:Choice>
+    <mc:Fallback>
+      <c:style val="2"/>
+    </mc:Fallback>
+  </mc:AlternateContent>
+  <c:chart>
+    <c:title>
+      <c:tx>
+        <c:rich>
+          <a:bodyPr/>
+          <a:lstStyle/>
+          <a:p>
+            <a:pPr>
+              <a:defRPr/>
+            </a:pPr>
+            <a:r>
+              <a:rPr lang="en-US"/>
+              <a:t>NY Times Section Breakdown</a:t>
+            </a:r>
+          </a:p>
+        </c:rich>
+      </c:tx>
+      <c:layout/>
+      <c:overlay val="0"/>
+    </c:title>
+    <c:autoTitleDeleted val="0"/>
+    <c:plotArea>
+      <c:layout/>
+      <c:barChart>
+        <c:barDir val="col"/>
+        <c:grouping val="clustered"/>
+        <c:varyColors val="0"/>
+        <c:ser>
+          <c:idx val="0"/>
+          <c:order val="0"/>
+          <c:tx>
+            <c:strRef>
+              <c:f>Chart!$E$3</c:f>
+              <c:strCache>
+                <c:ptCount val="1"/>
+                <c:pt idx="0">
+                  <c:v>Count</c:v>
+                </c:pt>
+              </c:strCache>
+            </c:strRef>
+          </c:tx>
+          <c:invertIfNegative val="0"/>
+          <c:cat>
+            <c:strRef>
+              <c:f>Chart!$D$4:$D$45</c:f>
+              <c:strCache>
+                <c:ptCount val="42"/>
+                <c:pt idx="0">
+                  <c:v>Business Day</c:v>
+                </c:pt>
+                <c:pt idx="1">
+                  <c:v>World</c:v>
+                </c:pt>
+                <c:pt idx="2">
+                  <c:v>Sports</c:v>
+                </c:pt>
+                <c:pt idx="3">
+                  <c:v>Opinion</c:v>
+                </c:pt>
+                <c:pt idx="4">
+                  <c:v>U.S.</c:v>
+                </c:pt>
+                <c:pt idx="5">
+                  <c:v>Arts</c:v>
+                </c:pt>
+                <c:pt idx="6">
+                  <c:v>N.Y. / Region</c:v>
+                </c:pt>
+                <c:pt idx="7">
+                  <c:v>Fashion &amp; Style</c:v>
+                </c:pt>
+                <c:pt idx="8">
+                  <c:v>Technology</c:v>
+                </c:pt>
+                <c:pt idx="9">
+                  <c:v>Movies</c:v>
+                </c:pt>
+                <c:pt idx="10">
+                  <c:v>(blank)</c:v>
+                </c:pt>
+                <c:pt idx="11">
+                  <c:v>Books</c:v>
+                </c:pt>
+                <c:pt idx="12">
+                  <c:v>The Upshot</c:v>
+                </c:pt>
+                <c:pt idx="13">
+                  <c:v>Health</c:v>
+                </c:pt>
+                <c:pt idx="14">
+                  <c:v>T:Style</c:v>
+                </c:pt>
+                <c:pt idx="15">
+                  <c:v>Multimedia/Photos</c:v>
+                </c:pt>
+                <c:pt idx="16">
+                  <c:v>Travel</c:v>
+                </c:pt>
+                <c:pt idx="17">
+                  <c:v>Magazine</c:v>
+                </c:pt>
+                <c:pt idx="18">
+                  <c:v>Automobiles</c:v>
+                </c:pt>
+                <c:pt idx="19">
+                  <c:v>Theater</c:v>
+                </c:pt>
+                <c:pt idx="20">
+                  <c:v>Science</c:v>
+                </c:pt>
+                <c:pt idx="21">
+                  <c:v>Dining &amp; Wine</c:v>
+                </c:pt>
+                <c:pt idx="22">
+                  <c:v>Real Estate</c:v>
+                </c:pt>
+                <c:pt idx="23">
+                  <c:v>Corrections</c:v>
+                </c:pt>
+                <c:pt idx="24">
+                  <c:v>Home &amp; Garden</c:v>
+                </c:pt>
+                <c:pt idx="25">
+                  <c:v>Multimedia</c:v>
+                </c:pt>
+                <c:pt idx="26">
+                  <c:v>Crosswords/Games</c:v>
+                </c:pt>
+                <c:pt idx="27">
+                  <c:v>Your Money</c:v>
+                </c:pt>
+                <c:pt idx="28">
+                  <c:v>Crosswords &amp; Games</c:v>
+                </c:pt>
+                <c:pt idx="29">
+                  <c:v>Great Homes &amp; Destinations</c:v>
+                </c:pt>
+                <c:pt idx="30">
+                  <c:v>Style</c:v>
+                </c:pt>
+                <c:pt idx="31">
+                  <c:v>T Magazine</c:v>
+                </c:pt>
+                <c:pt idx="32">
+                  <c:v>Education</c:v>
+                </c:pt>
+                <c:pt idx="33">
+                  <c:v>Sunday Review</c:v>
+                </c:pt>
+                <c:pt idx="34">
+                  <c:v>Job Market</c:v>
+                </c:pt>
+                <c:pt idx="35">
+                  <c:v>Great Homes and Destinations</c:v>
+                </c:pt>
+                <c:pt idx="36">
+                  <c:v>Open</c:v>
+                </c:pt>
+                <c:pt idx="37">
+                  <c:v>Blogs</c:v>
+                </c:pt>
+                <c:pt idx="38">
+                  <c:v>Public Editor</c:v>
+                </c:pt>
+                <c:pt idx="39">
+                  <c:v>Obituaries</c:v>
+                </c:pt>
+                <c:pt idx="40">
+                  <c:v>Feeds</c:v>
+                </c:pt>
+                <c:pt idx="41">
+                  <c:v>Afternoon Update</c:v>
+                </c:pt>
+              </c:strCache>
+            </c:strRef>
+          </c:cat>
+          <c:val>
+            <c:numRef>
+              <c:f>Chart!$E$4:$E$45</c:f>
+              <c:numCache>
+                <c:formatCode>General</c:formatCode>
+                <c:ptCount val="42"/>
+                <c:pt idx="0">
+                  <c:v>4784</c:v>
+                </c:pt>
+                <c:pt idx="1">
+                  <c:v>4639</c:v>
+                </c:pt>
+                <c:pt idx="2">
+                  <c:v>4408</c:v>
+                </c:pt>
+                <c:pt idx="3">
+                  <c:v>4113</c:v>
+                </c:pt>
+                <c:pt idx="4">
+                  <c:v>3964</c:v>
+                </c:pt>
+                <c:pt idx="5">
+                  <c:v>3627</c:v>
+                </c:pt>
+                <c:pt idx="6">
+                  <c:v>2897</c:v>
+                </c:pt>
+                <c:pt idx="7">
+                  <c:v>1563</c:v>
+                </c:pt>
+                <c:pt idx="8">
+                  <c:v>1007</c:v>
+                </c:pt>
+                <c:pt idx="9">
+                  <c:v>932</c:v>
+                </c:pt>
+                <c:pt idx="10">
+                  <c:v>926</c:v>
+                </c:pt>
+                <c:pt idx="11">
+                  <c:v>795</c:v>
+                </c:pt>
+                <c:pt idx="12">
+                  <c:v>784</c:v>
+                </c:pt>
+                <c:pt idx="13">
+                  <c:v>590</c:v>
+                </c:pt>
+                <c:pt idx="14">
+                  <c:v>588</c:v>
+                </c:pt>
+                <c:pt idx="15">
+                  <c:v>572</c:v>
+                </c:pt>
+                <c:pt idx="16">
+                  <c:v>497</c:v>
+                </c:pt>
+                <c:pt idx="17">
+                  <c:v>486</c:v>
+                </c:pt>
+                <c:pt idx="18">
+                  <c:v>470</c:v>
+                </c:pt>
+                <c:pt idx="19">
+                  <c:v>464</c:v>
+                </c:pt>
+                <c:pt idx="20">
+                  <c:v>453</c:v>
+                </c:pt>
+                <c:pt idx="21">
+                  <c:v>447</c:v>
+                </c:pt>
+                <c:pt idx="22">
+                  <c:v>374</c:v>
+                </c:pt>
+                <c:pt idx="23">
+                  <c:v>321</c:v>
+                </c:pt>
+                <c:pt idx="24">
+                  <c:v>248</c:v>
+                </c:pt>
+                <c:pt idx="25">
+                  <c:v>243</c:v>
+                </c:pt>
+                <c:pt idx="26">
+                  <c:v>214</c:v>
+                </c:pt>
+                <c:pt idx="27">
+                  <c:v>175</c:v>
+                </c:pt>
+                <c:pt idx="28">
+                  <c:v>93</c:v>
+                </c:pt>
+                <c:pt idx="29">
+                  <c:v>85</c:v>
+                </c:pt>
+                <c:pt idx="30">
+                  <c:v>82</c:v>
+                </c:pt>
+                <c:pt idx="31">
+                  <c:v>74</c:v>
+                </c:pt>
+                <c:pt idx="32">
+                  <c:v>60</c:v>
+                </c:pt>
+                <c:pt idx="33">
+                  <c:v>44</c:v>
+                </c:pt>
+                <c:pt idx="34">
+                  <c:v>39</c:v>
+                </c:pt>
+                <c:pt idx="35">
+                  <c:v>26</c:v>
+                </c:pt>
+                <c:pt idx="36">
+                  <c:v>10</c:v>
+                </c:pt>
+                <c:pt idx="37">
+                  <c:v>8</c:v>
+                </c:pt>
+                <c:pt idx="38">
+                  <c:v>6</c:v>
+                </c:pt>
+                <c:pt idx="39">
+                  <c:v>5</c:v>
+                </c:pt>
+                <c:pt idx="40">
+                  <c:v>2</c:v>
+                </c:pt>
+                <c:pt idx="41">
+                  <c:v>1</c:v>
+                </c:pt>
+              </c:numCache>
+            </c:numRef>
+          </c:val>
+        </c:ser>
+        <c:dLbls>
+          <c:showLegendKey val="0"/>
+          <c:showVal val="0"/>
+          <c:showCatName val="0"/>
+          <c:showSerName val="0"/>
+          <c:showPercent val="0"/>
+          <c:showBubbleSize val="0"/>
+        </c:dLbls>
+        <c:gapWidth val="150"/>
+        <c:axId val="58002048"/>
+        <c:axId val="59788288"/>
+      </c:barChart>
+      <c:catAx>
+        <c:axId val="58002048"/>
+        <c:scaling>
+          <c:orientation val="minMax"/>
+        </c:scaling>
+        <c:delete val="0"/>
+        <c:axPos val="b"/>
+        <c:majorTickMark val="out"/>
+        <c:minorTickMark val="none"/>
+        <c:tickLblPos val="nextTo"/>
+        <c:crossAx val="59788288"/>
+        <c:crosses val="autoZero"/>
+        <c:auto val="1"/>
+        <c:lblAlgn val="ctr"/>
+        <c:lblOffset val="100"/>
+        <c:noMultiLvlLbl val="0"/>
+      </c:catAx>
+      <c:valAx>
+        <c:axId val="59788288"/>
+        <c:scaling>
+          <c:orientation val="minMax"/>
+        </c:scaling>
+        <c:delete val="0"/>
+        <c:axPos val="l"/>
+        <c:majorGridlines/>
+        <c:numFmt formatCode="General" sourceLinked="1"/>
+        <c:majorTickMark val="out"/>
+        <c:minorTickMark val="none"/>
+        <c:tickLblPos val="nextTo"/>
+        <c:crossAx val="58002048"/>
+        <c:crosses val="autoZero"/>
+        <c:crossBetween val="between"/>
+      </c:valAx>
+    </c:plotArea>
+    <c:plotVisOnly val="1"/>
+    <c:dispBlanksAs val="gap"/>
+    <c:showDLblsOverMax val="0"/>
+  </c:chart>
+  <c:externalData r:id="rId1">
+    <c:autoUpdate val="0"/>
+  </c:externalData>
+</c:chartSpace>
+</file>
+
+<file path=ppt/notesMasters/notesMaster1.xml><?xml version="1.0" encoding="utf-8"?>
+<p:notesMaster xmlns:a="http://schemas.openxmlformats.org/drawingml/2006/main" xmlns:r="http://schemas.openxmlformats.org/officeDocument/2006/relationships" xmlns:p="http://schemas.openxmlformats.org/presentationml/2006/main">
+  <p:cSld>
+    <p:bg>
+      <p:bgRef idx="1001">
+        <a:schemeClr val="bg1"/>
+      </p:bgRef>
+    </p:bg>
+    <p:spTree>
+      <p:nvGrpSpPr>
+        <p:cNvPr id="1" name=""/>
+        <p:cNvGrpSpPr/>
+        <p:nvPr/>
+      </p:nvGrpSpPr>
+      <p:grpSpPr>
+        <a:xfrm>
+          <a:off x="0" y="0"/>
+          <a:ext cx="0" cy="0"/>
+          <a:chOff x="0" y="0"/>
+          <a:chExt cx="0" cy="0"/>
+        </a:xfrm>
+      </p:grpSpPr>
+      <p:sp>
+        <p:nvSpPr>
+          <p:cNvPr id="2" name="Header Placeholder 1"/>
+          <p:cNvSpPr>
+            <a:spLocks noGrp="1"/>
+          </p:cNvSpPr>
+          <p:nvPr>
+            <p:ph type="hdr" sz="quarter"/>
+          </p:nvPr>
+        </p:nvSpPr>
+        <p:spPr>
+          <a:xfrm>
+            <a:off x="0" y="0"/>
+            <a:ext cx="2971800" cy="457200"/>
+          </a:xfrm>
+          <a:prstGeom prst="rect">
+            <a:avLst/>
+          </a:prstGeom>
+        </p:spPr>
+        <p:txBody>
+          <a:bodyPr vert="horz" lIns="91440" tIns="45720" rIns="91440" bIns="45720" rtlCol="0"/>
+          <a:lstStyle>
+            <a:lvl1pPr algn="l">
+              <a:defRPr sz="1200"/>
+            </a:lvl1pPr>
+          </a:lstStyle>
+          <a:p>
+            <a:endParaRPr lang="en-US"/>
+          </a:p>
+        </p:txBody>
+      </p:sp>
+      <p:sp>
+        <p:nvSpPr>
+          <p:cNvPr id="3" name="Date Placeholder 2"/>
+          <p:cNvSpPr>
+            <a:spLocks noGrp="1"/>
+          </p:cNvSpPr>
+          <p:nvPr>
+            <p:ph type="dt" idx="1"/>
+          </p:nvPr>
+        </p:nvSpPr>
+        <p:spPr>
+          <a:xfrm>
+            <a:off x="3884613" y="0"/>
+            <a:ext cx="2971800" cy="457200"/>
+          </a:xfrm>
+          <a:prstGeom prst="rect">
+            <a:avLst/>
+          </a:prstGeom>
+        </p:spPr>
+        <p:txBody>
+          <a:bodyPr vert="horz" lIns="91440" tIns="45720" rIns="91440" bIns="45720" rtlCol="0"/>
+          <a:lstStyle>
+            <a:lvl1pPr algn="r">
+              <a:defRPr sz="1200"/>
+            </a:lvl1pPr>
+          </a:lstStyle>
+          <a:p>
+            <a:fld id="{DB2AF06D-7C49-4CDB-96A5-20BEE046A6A6}" type="datetimeFigureOut">
+              <a:rPr lang="en-US" smtClean="0"/>
+              <a:t>10/18/2014</a:t>
+            </a:fld>
+            <a:endParaRPr lang="en-US"/>
+          </a:p>
+        </p:txBody>
+      </p:sp>
+      <p:sp>
+        <p:nvSpPr>
+          <p:cNvPr id="4" name="Slide Image Placeholder 3"/>
+          <p:cNvSpPr>
+            <a:spLocks noGrp="1" noRot="1" noChangeAspect="1"/>
+          </p:cNvSpPr>
+          <p:nvPr>
+            <p:ph type="sldImg" idx="2"/>
+          </p:nvPr>
+        </p:nvSpPr>
+        <p:spPr>
+          <a:xfrm>
+            <a:off x="1143000" y="685800"/>
+            <a:ext cx="4572000" cy="3429000"/>
+          </a:xfrm>
+          <a:prstGeom prst="rect">
+            <a:avLst/>
+          </a:prstGeom>
+          <a:noFill/>
+          <a:ln w="12700">
+            <a:solidFill>
+              <a:prstClr val="black"/>
+            </a:solidFill>
+          </a:ln>
+        </p:spPr>
+        <p:txBody>
+          <a:bodyPr vert="horz" lIns="91440" tIns="45720" rIns="91440" bIns="45720" rtlCol="0" anchor="ctr"/>
+          <a:lstStyle/>
+          <a:p>
+            <a:endParaRPr lang="en-US"/>
+          </a:p>
+        </p:txBody>
+      </p:sp>
+      <p:sp>
+        <p:nvSpPr>
+          <p:cNvPr id="5" name="Notes Placeholder 4"/>
+          <p:cNvSpPr>
+            <a:spLocks noGrp="1"/>
+          </p:cNvSpPr>
+          <p:nvPr>
+            <p:ph type="body" sz="quarter" idx="3"/>
+          </p:nvPr>
+        </p:nvSpPr>
+        <p:spPr>
+          <a:xfrm>
+            <a:off x="685800" y="4343400"/>
+            <a:ext cx="5486400" cy="4114800"/>
+          </a:xfrm>
+          <a:prstGeom prst="rect">
+            <a:avLst/>
+          </a:prstGeom>
+        </p:spPr>
+        <p:txBody>
+          <a:bodyPr vert="horz" lIns="91440" tIns="45720" rIns="91440" bIns="45720" rtlCol="0"/>
+          <a:lstStyle/>
+          <a:p>
+            <a:pPr lvl="0"/>
+            <a:r>
+              <a:rPr lang="en-US" smtClean="0"/>
+              <a:t>Click to edit Master text styles</a:t>
+            </a:r>
+          </a:p>
+          <a:p>
+            <a:pPr lvl="1"/>
+            <a:r>
+              <a:rPr lang="en-US" smtClean="0"/>
+              <a:t>Second level</a:t>
+            </a:r>
+          </a:p>
+          <a:p>
+            <a:pPr lvl="2"/>
+            <a:r>
+              <a:rPr lang="en-US" smtClean="0"/>
+              <a:t>Third level</a:t>
+            </a:r>
+          </a:p>
+          <a:p>
+            <a:pPr lvl="3"/>
+            <a:r>
+              <a:rPr lang="en-US" smtClean="0"/>
+              <a:t>Fourth level</a:t>
+            </a:r>
+          </a:p>
+          <a:p>
+            <a:pPr lvl="4"/>
+            <a:r>
+              <a:rPr lang="en-US" smtClean="0"/>
+              <a:t>Fifth level</a:t>
+            </a:r>
+            <a:endParaRPr lang="en-US"/>
+          </a:p>
+        </p:txBody>
+      </p:sp>
+      <p:sp>
+        <p:nvSpPr>
+          <p:cNvPr id="6" name="Footer Placeholder 5"/>
+          <p:cNvSpPr>
+            <a:spLocks noGrp="1"/>
+          </p:cNvSpPr>
+          <p:nvPr>
+            <p:ph type="ftr" sz="quarter" idx="4"/>
+          </p:nvPr>
+        </p:nvSpPr>
+        <p:spPr>
+          <a:xfrm>
+            <a:off x="0" y="8685213"/>
+            <a:ext cx="2971800" cy="457200"/>
+          </a:xfrm>
+          <a:prstGeom prst="rect">
+            <a:avLst/>
+          </a:prstGeom>
+        </p:spPr>
+        <p:txBody>
+          <a:bodyPr vert="horz" lIns="91440" tIns="45720" rIns="91440" bIns="45720" rtlCol="0" anchor="b"/>
+          <a:lstStyle>
+            <a:lvl1pPr algn="l">
+              <a:defRPr sz="1200"/>
+            </a:lvl1pPr>
+          </a:lstStyle>
+          <a:p>
+            <a:endParaRPr lang="en-US"/>
+          </a:p>
+        </p:txBody>
+      </p:sp>
+      <p:sp>
+        <p:nvSpPr>
+          <p:cNvPr id="7" name="Slide Number Placeholder 6"/>
+          <p:cNvSpPr>
+            <a:spLocks noGrp="1"/>
+          </p:cNvSpPr>
+          <p:nvPr>
+            <p:ph type="sldNum" sz="quarter" idx="5"/>
+          </p:nvPr>
+        </p:nvSpPr>
+        <p:spPr>
+          <a:xfrm>
+            <a:off x="3884613" y="8685213"/>
+            <a:ext cx="2971800" cy="457200"/>
+          </a:xfrm>
+          <a:prstGeom prst="rect">
+            <a:avLst/>
+          </a:prstGeom>
+        </p:spPr>
+        <p:txBody>
+          <a:bodyPr vert="horz" lIns="91440" tIns="45720" rIns="91440" bIns="45720" rtlCol="0" anchor="b"/>
+          <a:lstStyle>
+            <a:lvl1pPr algn="r">
+              <a:defRPr sz="1200"/>
+            </a:lvl1pPr>
+          </a:lstStyle>
+          <a:p>
+            <a:fld id="{7ABBC0B4-C33E-46CE-9706-C9D67F40DB9D}" type="slidenum">
+              <a:rPr lang="en-US" smtClean="0"/>
+              <a:t>‹#›</a:t>
+            </a:fld>
+            <a:endParaRPr lang="en-US"/>
+          </a:p>
+        </p:txBody>
+      </p:sp>
+    </p:spTree>
+    <p:extLst>
+      <p:ext uri="{BB962C8B-B14F-4D97-AF65-F5344CB8AC3E}">
+        <p14:creationId xmlns:p14="http://schemas.microsoft.com/office/powerpoint/2010/main" val="347362202"/>
+      </p:ext>
+    </p:extLst>
+  </p:cSld>
+  <p:clrMap bg1="lt1" tx1="dk1" bg2="lt2" tx2="dk2" accent1="accent1" accent2="accent2" accent3="accent3" accent4="accent4" accent5="accent5" accent6="accent6" hlink="hlink" folHlink="folHlink"/>
+  <p:notesStyle>
+    <a:lvl1pPr marL="0" algn="l" defTabSz="914400" rtl="0" eaLnBrk="1" latinLnBrk="0" hangingPunct="1">
+      <a:defRPr sz="1200" kern="1200">
+        <a:solidFill>
+          <a:schemeClr val="tx1"/>
+        </a:solidFill>
+        <a:latin typeface="+mn-lt"/>
+        <a:ea typeface="+mn-ea"/>
+        <a:cs typeface="+mn-cs"/>
+      </a:defRPr>
+    </a:lvl1pPr>
+    <a:lvl2pPr marL="457200" algn="l" defTabSz="914400" rtl="0" eaLnBrk="1" latinLnBrk="0" hangingPunct="1">
+      <a:defRPr sz="1200" kern="1200">
+        <a:solidFill>
+          <a:schemeClr val="tx1"/>
+        </a:solidFill>
+        <a:latin typeface="+mn-lt"/>
+        <a:ea typeface="+mn-ea"/>
+        <a:cs typeface="+mn-cs"/>
+      </a:defRPr>
+    </a:lvl2pPr>
+    <a:lvl3pPr marL="914400" algn="l" defTabSz="914400" rtl="0" eaLnBrk="1" latinLnBrk="0" hangingPunct="1">
+      <a:defRPr sz="1200" kern="1200">
+        <a:solidFill>
+          <a:schemeClr val="tx1"/>
+        </a:solidFill>
+        <a:latin typeface="+mn-lt"/>
+        <a:ea typeface="+mn-ea"/>
+        <a:cs typeface="+mn-cs"/>
+      </a:defRPr>
+    </a:lvl3pPr>
+    <a:lvl4pPr marL="1371600" algn="l" defTabSz="914400" rtl="0" eaLnBrk="1" latinLnBrk="0" hangingPunct="1">
+      <a:defRPr sz="1200" kern="1200">
+        <a:solidFill>
+          <a:schemeClr val="tx1"/>
+        </a:solidFill>
+        <a:latin typeface="+mn-lt"/>
+        <a:ea typeface="+mn-ea"/>
+        <a:cs typeface="+mn-cs"/>
+      </a:defRPr>
+    </a:lvl4pPr>
+    <a:lvl5pPr marL="1828800" algn="l" defTabSz="914400" rtl="0" eaLnBrk="1" latinLnBrk="0" hangingPunct="1">
+      <a:defRPr sz="1200" kern="1200">
+        <a:solidFill>
+          <a:schemeClr val="tx1"/>
+        </a:solidFill>
+        <a:latin typeface="+mn-lt"/>
+        <a:ea typeface="+mn-ea"/>
+        <a:cs typeface="+mn-cs"/>
+      </a:defRPr>
+    </a:lvl5pPr>
+    <a:lvl6pPr marL="2286000" algn="l" defTabSz="914400" rtl="0" eaLnBrk="1" latinLnBrk="0" hangingPunct="1">
+      <a:defRPr sz="1200" kern="1200">
+        <a:solidFill>
+          <a:schemeClr val="tx1"/>
+        </a:solidFill>
+        <a:latin typeface="+mn-lt"/>
+        <a:ea typeface="+mn-ea"/>
+        <a:cs typeface="+mn-cs"/>
+      </a:defRPr>
+    </a:lvl6pPr>
+    <a:lvl7pPr marL="2743200" algn="l" defTabSz="914400" rtl="0" eaLnBrk="1" latinLnBrk="0" hangingPunct="1">
+      <a:defRPr sz="1200" kern="1200">
+        <a:solidFill>
+          <a:schemeClr val="tx1"/>
+        </a:solidFill>
+        <a:latin typeface="+mn-lt"/>
+        <a:ea typeface="+mn-ea"/>
+        <a:cs typeface="+mn-cs"/>
+      </a:defRPr>
+    </a:lvl7pPr>
+    <a:lvl8pPr marL="3200400" algn="l" defTabSz="914400" rtl="0" eaLnBrk="1" latinLnBrk="0" hangingPunct="1">
+      <a:defRPr sz="1200" kern="1200">
+        <a:solidFill>
+          <a:schemeClr val="tx1"/>
+        </a:solidFill>
+        <a:latin typeface="+mn-lt"/>
+        <a:ea typeface="+mn-ea"/>
+        <a:cs typeface="+mn-cs"/>
+      </a:defRPr>
+    </a:lvl8pPr>
+    <a:lvl9pPr marL="3657600" algn="l" defTabSz="914400" rtl="0" eaLnBrk="1" latinLnBrk="0" hangingPunct="1">
+      <a:defRPr sz="1200" kern="1200">
+        <a:solidFill>
+          <a:schemeClr val="tx1"/>
+        </a:solidFill>
+        <a:latin typeface="+mn-lt"/>
+        <a:ea typeface="+mn-ea"/>
+        <a:cs typeface="+mn-cs"/>
+      </a:defRPr>
+    </a:lvl9pPr>
+  </p:notesStyle>
+</p:notesMaster>
+</file>
+
+<file path=ppt/notesSlides/notesSlide1.xml><?xml version="1.0" encoding="utf-8"?>
+<p:notes xmlns:a="http://schemas.openxmlformats.org/drawingml/2006/main" xmlns:r="http://schemas.openxmlformats.org/officeDocument/2006/relationships" xmlns:p="http://schemas.openxmlformats.org/presentationml/2006/main">
+  <p:cSld>
+    <p:spTree>
+      <p:nvGrpSpPr>
+        <p:cNvPr id="1" name=""/>
+        <p:cNvGrpSpPr/>
+        <p:nvPr/>
+      </p:nvGrpSpPr>
+      <p:grpSpPr>
+        <a:xfrm>
+          <a:off x="0" y="0"/>
+          <a:ext cx="0" cy="0"/>
+          <a:chOff x="0" y="0"/>
+          <a:chExt cx="0" cy="0"/>
+        </a:xfrm>
+      </p:grpSpPr>
+      <p:sp>
+        <p:nvSpPr>
+          <p:cNvPr id="2" name="Slide Image Placeholder 1"/>
+          <p:cNvSpPr>
+            <a:spLocks noGrp="1" noRot="1" noChangeAspect="1"/>
+          </p:cNvSpPr>
+          <p:nvPr>
+            <p:ph type="sldImg"/>
+          </p:nvPr>
+        </p:nvSpPr>
+        <p:spPr/>
+      </p:sp>
+      <p:sp>
+        <p:nvSpPr>
+          <p:cNvPr id="3" name="Notes Placeholder 2"/>
+          <p:cNvSpPr>
+            <a:spLocks noGrp="1"/>
+          </p:cNvSpPr>
+          <p:nvPr>
+            <p:ph type="body" idx="1"/>
+          </p:nvPr>
+        </p:nvSpPr>
+        <p:spPr/>
+        <p:txBody>
+          <a:bodyPr/>
+          <a:lstStyle/>
+          <a:p>
+            <a:r>
+              <a:rPr lang="en-US" dirty="0" smtClean="0"/>
+              <a:t>Our initial step was to download “raw” file from the NYT, where each grab pulled down 20 documents.</a:t>
+            </a:r>
+          </a:p>
+          <a:p>
+            <a:endParaRPr lang="en-US" dirty="0" smtClean="0"/>
+          </a:p>
+          <a:p>
+            <a:r>
+              <a:rPr lang="en-US" dirty="0" smtClean="0"/>
+              <a:t>$source and $section</a:t>
+            </a:r>
+            <a:r>
+              <a:rPr lang="en-US" baseline="0" dirty="0" smtClean="0"/>
+              <a:t> were set to “all”, to just grab everything</a:t>
+            </a:r>
+          </a:p>
+          <a:p>
+            <a:endParaRPr lang="en-US" baseline="0" dirty="0" smtClean="0"/>
+          </a:p>
+          <a:p>
+            <a:r>
+              <a:rPr lang="en-US" dirty="0" smtClean="0"/>
+              <a:t>IF</a:t>
+            </a:r>
+            <a:r>
+              <a:rPr lang="en-US" baseline="0" dirty="0" smtClean="0"/>
+              <a:t> you don’t base64_encode </a:t>
+            </a:r>
+            <a:r>
+              <a:rPr lang="en-US" baseline="0" dirty="0" err="1" smtClean="0"/>
+              <a:t>sphp</a:t>
+            </a:r>
+            <a:r>
+              <a:rPr lang="en-US" baseline="0" dirty="0" smtClean="0"/>
+              <a:t> files, transferring can corrupt…</a:t>
+            </a:r>
+            <a:endParaRPr lang="en-US" dirty="0"/>
+          </a:p>
+        </p:txBody>
+      </p:sp>
+      <p:sp>
+        <p:nvSpPr>
+          <p:cNvPr id="4" name="Slide Number Placeholder 3"/>
+          <p:cNvSpPr>
+            <a:spLocks noGrp="1"/>
+          </p:cNvSpPr>
+          <p:nvPr>
+            <p:ph type="sldNum" sz="quarter" idx="10"/>
+          </p:nvPr>
+        </p:nvSpPr>
+        <p:spPr/>
+        <p:txBody>
+          <a:bodyPr/>
+          <a:lstStyle/>
+          <a:p>
+            <a:fld id="{7ABBC0B4-C33E-46CE-9706-C9D67F40DB9D}" type="slidenum">
+              <a:rPr lang="en-US" smtClean="0"/>
+              <a:t>2</a:t>
+            </a:fld>
+            <a:endParaRPr lang="en-US"/>
+          </a:p>
+        </p:txBody>
+      </p:sp>
+    </p:spTree>
+    <p:extLst>
+      <p:ext uri="{BB962C8B-B14F-4D97-AF65-F5344CB8AC3E}">
+        <p14:creationId xmlns:p14="http://schemas.microsoft.com/office/powerpoint/2010/main" val="3287877424"/>
+      </p:ext>
+    </p:extLst>
+  </p:cSld>
+  <p:clrMapOvr>
+    <a:masterClrMapping/>
+  </p:clrMapOvr>
+</p:notes>
+</file>
+
+<file path=ppt/notesSlides/notesSlide2.xml><?xml version="1.0" encoding="utf-8"?>
+<p:notes xmlns:a="http://schemas.openxmlformats.org/drawingml/2006/main" xmlns:r="http://schemas.openxmlformats.org/officeDocument/2006/relationships" xmlns:p="http://schemas.openxmlformats.org/presentationml/2006/main">
+  <p:cSld>
+    <p:spTree>
+      <p:nvGrpSpPr>
+        <p:cNvPr id="1" name=""/>
+        <p:cNvGrpSpPr/>
+        <p:nvPr/>
+      </p:nvGrpSpPr>
+      <p:grpSpPr>
+        <a:xfrm>
+          <a:off x="0" y="0"/>
+          <a:ext cx="0" cy="0"/>
+          <a:chOff x="0" y="0"/>
+          <a:chExt cx="0" cy="0"/>
+        </a:xfrm>
+      </p:grpSpPr>
+      <p:sp>
+        <p:nvSpPr>
+          <p:cNvPr id="2" name="Slide Image Placeholder 1"/>
+          <p:cNvSpPr>
+            <a:spLocks noGrp="1" noRot="1" noChangeAspect="1"/>
+          </p:cNvSpPr>
+          <p:nvPr>
+            <p:ph type="sldImg"/>
+          </p:nvPr>
+        </p:nvSpPr>
+        <p:spPr/>
+      </p:sp>
+      <p:sp>
+        <p:nvSpPr>
+          <p:cNvPr id="3" name="Notes Placeholder 2"/>
+          <p:cNvSpPr>
+            <a:spLocks noGrp="1"/>
+          </p:cNvSpPr>
+          <p:nvPr>
+            <p:ph type="body" idx="1"/>
+          </p:nvPr>
+        </p:nvSpPr>
+        <p:spPr/>
+        <p:txBody>
+          <a:bodyPr/>
+          <a:lstStyle/>
+          <a:p>
+            <a:r>
+              <a:rPr lang="en-US" dirty="0" smtClean="0"/>
+              <a:t>42 Sections total.</a:t>
+            </a:r>
+          </a:p>
+          <a:p>
+            <a:endParaRPr lang="en-US" dirty="0" smtClean="0"/>
+          </a:p>
+          <a:p>
+            <a:r>
+              <a:rPr lang="en-US" dirty="0" smtClean="0"/>
+              <a:t>Notice that (blank) is just under 1000 of the documents.</a:t>
+            </a:r>
+            <a:endParaRPr lang="en-US" dirty="0"/>
+          </a:p>
+        </p:txBody>
+      </p:sp>
+      <p:sp>
+        <p:nvSpPr>
+          <p:cNvPr id="4" name="Slide Number Placeholder 3"/>
+          <p:cNvSpPr>
+            <a:spLocks noGrp="1"/>
+          </p:cNvSpPr>
+          <p:nvPr>
+            <p:ph type="sldNum" sz="quarter" idx="10"/>
+          </p:nvPr>
+        </p:nvSpPr>
+        <p:spPr/>
+        <p:txBody>
+          <a:bodyPr/>
+          <a:lstStyle/>
+          <a:p>
+            <a:fld id="{7ABBC0B4-C33E-46CE-9706-C9D67F40DB9D}" type="slidenum">
+              <a:rPr lang="en-US" smtClean="0"/>
+              <a:t>4</a:t>
+            </a:fld>
+            <a:endParaRPr lang="en-US"/>
+          </a:p>
+        </p:txBody>
+      </p:sp>
+    </p:spTree>
+    <p:extLst>
+      <p:ext uri="{BB962C8B-B14F-4D97-AF65-F5344CB8AC3E}">
+        <p14:creationId xmlns:p14="http://schemas.microsoft.com/office/powerpoint/2010/main" val="2447325274"/>
+      </p:ext>
+    </p:extLst>
+  </p:cSld>
+  <p:clrMapOvr>
+    <a:masterClrMapping/>
+  </p:clrMapOvr>
+</p:notes>
 </file>
 
 <file path=ppt/slideLayouts/slideLayout1.xml><?xml version="1.0" encoding="utf-8"?>
@@ -1953,7 +2908,7 @@
             <a:fld id="{E30E2307-1E40-4E12-8716-25BFDA8E7013}" type="datetime1">
               <a:rPr lang="en-US" smtClean="0"/>
               <a:pPr/>
-              <a:t>10/15/14</a:t>
+              <a:t>10/17/2014</a:t>
             </a:fld>
             <a:endParaRPr lang="en-US"/>
           </a:p>
@@ -2136,7 +3091,7 @@
             <a:fld id="{E5CFCF5A-EA79-452C-A52C-1A2668C2E7DF}" type="datetime1">
               <a:rPr lang="en-US" smtClean="0"/>
               <a:pPr/>
-              <a:t>10/15/14</a:t>
+              <a:t>10/17/2014</a:t>
             </a:fld>
             <a:endParaRPr lang="en-US"/>
           </a:p>
@@ -2289,7 +3244,7 @@
             <a:fld id="{2E5C4C28-BD4B-4892-9A2D-6E19BD753A9A}" type="datetime1">
               <a:rPr lang="en-US" smtClean="0"/>
               <a:pPr/>
-              <a:t>10/15/14</a:t>
+              <a:t>10/17/2014</a:t>
             </a:fld>
             <a:endParaRPr lang="en-US"/>
           </a:p>
@@ -4117,7 +5072,7 @@
             <a:fld id="{61FD9D02-426E-46C9-9EE9-0DE1EF8B2838}" type="datetime1">
               <a:rPr lang="en-US" smtClean="0"/>
               <a:pPr/>
-              <a:t>10/15/14</a:t>
+              <a:t>10/17/2014</a:t>
             </a:fld>
             <a:endParaRPr lang="en-US"/>
           </a:p>
@@ -5989,7 +6944,7 @@
             <a:fld id="{7B8AEBBE-F8B2-42CF-9895-E86A608384EB}" type="datetime1">
               <a:rPr lang="en-US" smtClean="0"/>
               <a:pPr/>
-              <a:t>10/15/14</a:t>
+              <a:t>10/17/2014</a:t>
             </a:fld>
             <a:endParaRPr lang="en-US"/>
           </a:p>
@@ -6104,7 +7059,7 @@
             <a:fld id="{E1FAA6B6-10E5-4810-BC9F-DA72D8452E73}" type="datetime1">
               <a:rPr lang="en-US" smtClean="0"/>
               <a:pPr/>
-              <a:t>10/15/14</a:t>
+              <a:t>10/17/2014</a:t>
             </a:fld>
             <a:endParaRPr lang="en-US"/>
           </a:p>
@@ -6647,7 +7602,7 @@
             <a:fld id="{6D18D072-EF12-4AA2-BD71-ABC68B06D0E2}" type="datetime1">
               <a:rPr lang="en-US" smtClean="0"/>
               <a:pPr/>
-              <a:t>10/15/14</a:t>
+              <a:t>10/17/2014</a:t>
             </a:fld>
             <a:endParaRPr lang="en-US"/>
           </a:p>
@@ -6762,7 +7717,7 @@
             <a:fld id="{B8CDBF60-6CC3-4B74-A60D-3486985E4346}" type="datetime1">
               <a:rPr lang="en-US" smtClean="0"/>
               <a:pPr/>
-              <a:t>10/15/14</a:t>
+              <a:t>10/17/2014</a:t>
             </a:fld>
             <a:endParaRPr lang="en-US"/>
           </a:p>
@@ -8475,7 +9430,7 @@
             <a:fld id="{22714818-984F-4759-BF72-A33BDC1963BD}" type="datetime1">
               <a:rPr lang="en-US" smtClean="0"/>
               <a:pPr/>
-              <a:t>10/15/14</a:t>
+              <a:t>10/17/2014</a:t>
             </a:fld>
             <a:endParaRPr lang="en-US"/>
           </a:p>
@@ -8628,7 +9583,7 @@
             <a:fld id="{9EA7E191-5F94-4FC1-B823-BD7CABF7FA06}" type="datetime1">
               <a:rPr lang="en-US" smtClean="0"/>
               <a:pPr/>
-              <a:t>10/15/14</a:t>
+              <a:t>10/17/2014</a:t>
             </a:fld>
             <a:endParaRPr lang="en-US"/>
           </a:p>
@@ -12245,7 +13200,7 @@
             <a:fld id="{88856D55-EFBE-4F9B-8A5F-09D42CA22A9B}" type="datetime1">
               <a:rPr lang="en-US" smtClean="0"/>
               <a:pPr/>
-              <a:t>10/15/14</a:t>
+              <a:t>10/17/2014</a:t>
             </a:fld>
             <a:endParaRPr lang="en-US"/>
           </a:p>
@@ -14106,7 +15061,7 @@
             <a:fld id="{9D1D110F-3F4E-48D9-B8AA-5D0E825AFDBA}" type="datetime1">
               <a:rPr lang="en-US" smtClean="0"/>
               <a:pPr/>
-              <a:t>10/15/14</a:t>
+              <a:t>10/17/2014</a:t>
             </a:fld>
             <a:endParaRPr lang="en-US"/>
           </a:p>
@@ -14642,8 +15597,12 @@
           <a:lstStyle/>
           <a:p>
             <a:r>
+              <a:rPr lang="en-US" dirty="0"/>
+              <a:t>Clustering Abstracts </a:t>
+            </a:r>
+            <a:r>
               <a:rPr lang="en-US" dirty="0" smtClean="0"/>
-              <a:t>Abstracts Clustering of the  New </a:t>
+              <a:t>of the  New </a:t>
             </a:r>
             <a:r>
               <a:rPr lang="en-US" dirty="0"/>
@@ -14669,31 +15628,27 @@
         </p:nvSpPr>
         <p:spPr/>
         <p:txBody>
-          <a:bodyPr/>
+          <a:bodyPr>
+            <a:normAutofit/>
+          </a:bodyPr>
           <a:lstStyle/>
+          <a:p>
+            <a:endParaRPr lang="en-US" dirty="0" smtClean="0"/>
+          </a:p>
           <a:p>
             <a:r>
               <a:rPr lang="en-US" dirty="0" smtClean="0"/>
-              <a:t>Daniel </a:t>
+              <a:t>Matthew Letter </a:t>
+            </a:r>
+            <a:r>
+              <a:rPr lang="en-US" dirty="0" smtClean="0"/>
+              <a:t>&amp; Daniel </a:t>
             </a:r>
             <a:r>
               <a:rPr lang="en-US" dirty="0" err="1" smtClean="0"/>
               <a:t>Waybright</a:t>
             </a:r>
             <a:endParaRPr lang="en-US" dirty="0" smtClean="0"/>
-          </a:p>
-          <a:p>
-            <a:r>
-              <a:rPr lang="en-US" dirty="0" smtClean="0"/>
-              <a:t>&amp;</a:t>
-            </a:r>
-          </a:p>
-          <a:p>
-            <a:r>
-              <a:rPr lang="en-US" dirty="0" smtClean="0"/>
-              <a:t>Matthew Letter</a:t>
-            </a:r>
-            <a:endParaRPr lang="en-US" dirty="0"/>
           </a:p>
         </p:txBody>
       </p:sp>
@@ -14707,10 +15662,119 @@
   <p:clrMapOvr>
     <a:masterClrMapping/>
   </p:clrMapOvr>
+  <p:timing>
+    <p:tnLst>
+      <p:par>
+        <p:cTn id="1" dur="indefinite" restart="never" nodeType="tmRoot"/>
+      </p:par>
+    </p:tnLst>
+  </p:timing>
 </p:sld>
 </file>
 
 <file path=ppt/slides/slide10.xml><?xml version="1.0" encoding="utf-8"?>
+<p:sld xmlns:a="http://schemas.openxmlformats.org/drawingml/2006/main" xmlns:r="http://schemas.openxmlformats.org/officeDocument/2006/relationships" xmlns:p="http://schemas.openxmlformats.org/presentationml/2006/main">
+  <p:cSld>
+    <p:spTree>
+      <p:nvGrpSpPr>
+        <p:cNvPr id="1" name=""/>
+        <p:cNvGrpSpPr/>
+        <p:nvPr/>
+      </p:nvGrpSpPr>
+      <p:grpSpPr>
+        <a:xfrm>
+          <a:off x="0" y="0"/>
+          <a:ext cx="0" cy="0"/>
+          <a:chOff x="0" y="0"/>
+          <a:chExt cx="0" cy="0"/>
+        </a:xfrm>
+      </p:grpSpPr>
+      <p:sp>
+        <p:nvSpPr>
+          <p:cNvPr id="2" name="Content Placeholder 1"/>
+          <p:cNvSpPr>
+            <a:spLocks noGrp="1"/>
+          </p:cNvSpPr>
+          <p:nvPr>
+            <p:ph idx="1"/>
+          </p:nvPr>
+        </p:nvSpPr>
+        <p:spPr/>
+        <p:txBody>
+          <a:bodyPr/>
+          <a:lstStyle/>
+          <a:p>
+            <a:endParaRPr lang="en-US"/>
+          </a:p>
+        </p:txBody>
+      </p:sp>
+      <p:sp>
+        <p:nvSpPr>
+          <p:cNvPr id="3" name="Title 2"/>
+          <p:cNvSpPr>
+            <a:spLocks noGrp="1"/>
+          </p:cNvSpPr>
+          <p:nvPr>
+            <p:ph type="title"/>
+          </p:nvPr>
+        </p:nvSpPr>
+        <p:spPr/>
+        <p:txBody>
+          <a:bodyPr>
+            <a:normAutofit fontScale="90000"/>
+          </a:bodyPr>
+          <a:lstStyle/>
+          <a:p>
+            <a:r>
+              <a:rPr lang="en-US" dirty="0"/>
+              <a:t>20 </a:t>
+            </a:r>
+            <a:r>
+              <a:rPr lang="en-US" dirty="0" smtClean="0"/>
+              <a:t>Most </a:t>
+            </a:r>
+            <a:r>
+              <a:rPr lang="en-US" dirty="0"/>
+              <a:t>D</a:t>
+            </a:r>
+            <a:r>
+              <a:rPr lang="en-US" dirty="0" smtClean="0"/>
+              <a:t>iscriminative </a:t>
+            </a:r>
+            <a:r>
+              <a:rPr lang="en-US" dirty="0"/>
+              <a:t>T</a:t>
+            </a:r>
+            <a:r>
+              <a:rPr lang="en-US" dirty="0" smtClean="0"/>
+              <a:t>erms </a:t>
+            </a:r>
+            <a:r>
+              <a:rPr lang="en-US"/>
+              <a:t>per C</a:t>
+            </a:r>
+            <a:r>
+              <a:rPr lang="en-US" smtClean="0"/>
+              <a:t>luster</a:t>
+            </a:r>
+            <a:endParaRPr lang="en-US" dirty="0"/>
+          </a:p>
+        </p:txBody>
+      </p:sp>
+    </p:spTree>
+    <p:extLst>
+      <p:ext uri="{BB962C8B-B14F-4D97-AF65-F5344CB8AC3E}">
+        <p14:creationId xmlns:p14="http://schemas.microsoft.com/office/powerpoint/2010/main" val="1381074220"/>
+      </p:ext>
+    </p:extLst>
+  </p:cSld>
+  <p:clrMapOvr>
+    <a:masterClrMapping/>
+  </p:clrMapOvr>
+</p:sld>
+</file>
+
+<file path=ppt/slides/slide11.xml><?xml version="1.0" encoding="utf-8"?>
 <p:sld xmlns:a="http://schemas.openxmlformats.org/drawingml/2006/main" xmlns:r="http://schemas.openxmlformats.org/officeDocument/2006/relationships" xmlns:p="http://schemas.openxmlformats.org/presentationml/2006/main">
   <p:cSld>
     <p:spTree>
@@ -14781,11 +15845,7 @@
             </a:r>
             <a:r>
               <a:rPr lang="en-US" dirty="0"/>
-              <a:t>and </a:t>
-            </a:r>
-            <a:r>
-              <a:rPr lang="en-US" dirty="0"/>
-              <a:t>T</a:t>
+              <a:t>and T</a:t>
             </a:r>
             <a:r>
               <a:rPr lang="en-US" dirty="0" smtClean="0"/>
@@ -14837,12 +15897,124 @@
         </p:nvSpPr>
         <p:spPr/>
         <p:txBody>
-          <a:bodyPr/>
+          <a:bodyPr>
+            <a:normAutofit lnSpcReduction="10000"/>
+          </a:bodyPr>
           <a:lstStyle/>
+          <a:p>
+            <a:r>
+              <a:rPr lang="en-US" dirty="0" smtClean="0"/>
+              <a:t>Anatomy of a Request</a:t>
+            </a:r>
+          </a:p>
           <a:p>
             <a:pPr marL="0" indent="0">
               <a:buNone/>
             </a:pPr>
+            <a:r>
+              <a:rPr lang="en-US" sz="2000" dirty="0"/>
+              <a:t>$URL = $</a:t>
+            </a:r>
+            <a:r>
+              <a:rPr lang="en-US" sz="2000" dirty="0" err="1"/>
+              <a:t>baseURL</a:t>
+            </a:r>
+            <a:r>
+              <a:rPr lang="en-US" sz="2000" dirty="0"/>
+              <a:t> . $</a:t>
+            </a:r>
+            <a:r>
+              <a:rPr lang="en-US" sz="2000" dirty="0" smtClean="0"/>
+              <a:t>source </a:t>
+            </a:r>
+            <a:r>
+              <a:rPr lang="en-US" sz="2000" dirty="0"/>
+              <a:t>. $section . $format . "?" . $offset . $</a:t>
+            </a:r>
+            <a:r>
+              <a:rPr lang="en-US" sz="2000" dirty="0" smtClean="0"/>
+              <a:t>key;</a:t>
+            </a:r>
+          </a:p>
+          <a:p>
+            <a:pPr marL="0" indent="0">
+              <a:buNone/>
+            </a:pPr>
+            <a:r>
+              <a:rPr lang="en-US" sz="2000" dirty="0"/>
+              <a:t>$raw = @</a:t>
+            </a:r>
+            <a:r>
+              <a:rPr lang="en-US" sz="2000" dirty="0" err="1"/>
+              <a:t>file_get_contents</a:t>
+            </a:r>
+            <a:r>
+              <a:rPr lang="en-US" sz="2000" dirty="0"/>
+              <a:t>( $URL </a:t>
+            </a:r>
+            <a:r>
+              <a:rPr lang="en-US" sz="2000" dirty="0" smtClean="0"/>
+              <a:t>);</a:t>
+            </a:r>
+          </a:p>
+          <a:p>
+            <a:pPr marL="0" indent="0">
+              <a:buNone/>
+            </a:pPr>
+            <a:r>
+              <a:rPr lang="en-US" sz="2000" dirty="0" smtClean="0"/>
+              <a:t>$response = </a:t>
+            </a:r>
+            <a:r>
+              <a:rPr lang="en-US" sz="2000" dirty="0" err="1" smtClean="0"/>
+              <a:t>unserialize</a:t>
+            </a:r>
+            <a:r>
+              <a:rPr lang="en-US" sz="2000" dirty="0" smtClean="0"/>
+              <a:t>( $raw );</a:t>
+            </a:r>
+          </a:p>
+          <a:p>
+            <a:pPr marL="0" indent="0">
+              <a:buNone/>
+            </a:pPr>
+            <a:endParaRPr lang="en-US" sz="2000" dirty="0"/>
+          </a:p>
+          <a:p>
+            <a:r>
+              <a:rPr lang="en-US" dirty="0" smtClean="0"/>
+              <a:t>Reattempt if encounter errors</a:t>
+            </a:r>
+          </a:p>
+          <a:p>
+            <a:pPr marL="0" indent="0">
+              <a:buNone/>
+            </a:pPr>
+            <a:r>
+              <a:rPr lang="en-US" sz="2000" dirty="0" smtClean="0"/>
+              <a:t>if</a:t>
+            </a:r>
+            <a:r>
+              <a:rPr lang="en-US" sz="2000" dirty="0"/>
+              <a:t>( $response["status"] == "OK" ) </a:t>
+            </a:r>
+            <a:r>
+              <a:rPr lang="en-US" sz="2000" dirty="0" smtClean="0"/>
+              <a:t>{ … }</a:t>
+            </a:r>
+            <a:endParaRPr lang="en-US" sz="2000" dirty="0"/>
+          </a:p>
+          <a:p>
+            <a:pPr marL="0" indent="0">
+              <a:buNone/>
+            </a:pPr>
+            <a:endParaRPr lang="en-US" sz="2000" dirty="0" smtClean="0"/>
+          </a:p>
+          <a:p>
+            <a:r>
+              <a:rPr lang="en-US" dirty="0" smtClean="0"/>
+              <a:t>Store all raw files!!!</a:t>
+            </a:r>
             <a:endParaRPr lang="en-US" dirty="0"/>
           </a:p>
         </p:txBody>
@@ -14888,6 +16060,13 @@
   <p:clrMapOvr>
     <a:masterClrMapping/>
   </p:clrMapOvr>
+  <p:timing>
+    <p:tnLst>
+      <p:par>
+        <p:cTn id="1" dur="indefinite" restart="never" nodeType="tmRoot"/>
+      </p:par>
+    </p:tnLst>
+  </p:timing>
 </p:sld>
 </file>
 
@@ -14920,9 +16099,33 @@
         </p:nvSpPr>
         <p:spPr/>
         <p:txBody>
-          <a:bodyPr/>
+          <a:bodyPr>
+            <a:normAutofit lnSpcReduction="10000"/>
+          </a:bodyPr>
           <a:lstStyle/>
           <a:p>
+            <a:r>
+              <a:rPr lang="en-US" dirty="0" smtClean="0"/>
+              <a:t>Combine all raw files into a single PHP array where the URL is the “unique” key, thereby eliminating duplicates.</a:t>
+            </a:r>
+          </a:p>
+          <a:p>
+            <a:endParaRPr lang="en-US" dirty="0" smtClean="0"/>
+          </a:p>
+          <a:p>
+            <a:r>
+              <a:rPr lang="en-US" dirty="0" smtClean="0"/>
+              <a:t>We then mapped each URL to a unique numerical ID, and output a file containing the abstract and has the ID as filename.</a:t>
+            </a:r>
+          </a:p>
+          <a:p>
+            <a:endParaRPr lang="en-US" dirty="0"/>
+          </a:p>
+          <a:p>
+            <a:r>
+              <a:rPr lang="en-US" dirty="0" smtClean="0"/>
+              <a:t>Downloaded a combined 41,116 unique documents.</a:t>
+            </a:r>
             <a:endParaRPr lang="en-US" dirty="0"/>
           </a:p>
         </p:txBody>
@@ -14960,10 +16163,78 @@
   <p:clrMapOvr>
     <a:masterClrMapping/>
   </p:clrMapOvr>
+  <p:timing>
+    <p:tnLst>
+      <p:par>
+        <p:cTn id="1" dur="indefinite" restart="never" nodeType="tmRoot"/>
+      </p:par>
+    </p:tnLst>
+  </p:timing>
 </p:sld>
 </file>
 
 <file path=ppt/slides/slide4.xml><?xml version="1.0" encoding="utf-8"?>
+<p:sld xmlns:a="http://schemas.openxmlformats.org/drawingml/2006/main" xmlns:r="http://schemas.openxmlformats.org/officeDocument/2006/relationships" xmlns:p="http://schemas.openxmlformats.org/presentationml/2006/main">
+  <p:cSld>
+    <p:spTree>
+      <p:nvGrpSpPr>
+        <p:cNvPr id="1" name=""/>
+        <p:cNvGrpSpPr/>
+        <p:nvPr/>
+      </p:nvGrpSpPr>
+      <p:grpSpPr>
+        <a:xfrm>
+          <a:off x="0" y="0"/>
+          <a:ext cx="0" cy="0"/>
+          <a:chOff x="0" y="0"/>
+          <a:chExt cx="0" cy="0"/>
+        </a:xfrm>
+      </p:grpSpPr>
+      <p:graphicFrame>
+        <p:nvGraphicFramePr>
+          <p:cNvPr id="4" name="Chart 3"/>
+          <p:cNvGraphicFramePr>
+            <a:graphicFrameLocks/>
+          </p:cNvGraphicFramePr>
+          <p:nvPr>
+            <p:extLst>
+              <p:ext uri="{D42A27DB-BD31-4B8C-83A1-F6EECF244321}">
+                <p14:modId xmlns:p14="http://schemas.microsoft.com/office/powerpoint/2010/main" val="3241117351"/>
+              </p:ext>
+            </p:extLst>
+          </p:nvPr>
+        </p:nvGraphicFramePr>
+        <p:xfrm>
+          <a:off x="0" y="1366574"/>
+          <a:ext cx="9144000" cy="5395966"/>
+        </p:xfrm>
+        <a:graphic>
+          <a:graphicData uri="http://schemas.openxmlformats.org/drawingml/2006/chart">
+            <c:chart xmlns:c="http://schemas.openxmlformats.org/drawingml/2006/chart" xmlns:r="http://schemas.openxmlformats.org/officeDocument/2006/relationships" r:id="rId3"/>
+          </a:graphicData>
+        </a:graphic>
+      </p:graphicFrame>
+    </p:spTree>
+    <p:extLst>
+      <p:ext uri="{BB962C8B-B14F-4D97-AF65-F5344CB8AC3E}">
+        <p14:creationId xmlns:p14="http://schemas.microsoft.com/office/powerpoint/2010/main" val="1658881212"/>
+      </p:ext>
+    </p:extLst>
+  </p:cSld>
+  <p:clrMapOvr>
+    <a:masterClrMapping/>
+  </p:clrMapOvr>
+  <p:timing>
+    <p:tnLst>
+      <p:par>
+        <p:cTn id="1" dur="indefinite" restart="never" nodeType="tmRoot"/>
+      </p:par>
+    </p:tnLst>
+  </p:timing>
+</p:sld>
+</file>
+
+<file path=ppt/slides/slide5.xml><?xml version="1.0" encoding="utf-8"?>
 <p:sld xmlns:a="http://schemas.openxmlformats.org/drawingml/2006/main" xmlns:r="http://schemas.openxmlformats.org/officeDocument/2006/relationships" xmlns:p="http://schemas.openxmlformats.org/presentationml/2006/main">
   <p:cSld>
     <p:spTree>
@@ -14995,7 +16266,11 @@
           <a:bodyPr/>
           <a:lstStyle/>
           <a:p>
-            <a:endParaRPr lang="en-US"/>
+            <a:r>
+              <a:rPr lang="en-US" dirty="0" smtClean="0"/>
+              <a:t>Porter Stemmer in Java</a:t>
+            </a:r>
+            <a:endParaRPr lang="en-US" dirty="0"/>
           </a:p>
         </p:txBody>
       </p:sp>
@@ -15044,10 +16319,17 @@
   <p:clrMapOvr>
     <a:masterClrMapping/>
   </p:clrMapOvr>
+  <p:timing>
+    <p:tnLst>
+      <p:par>
+        <p:cTn id="1" dur="indefinite" restart="never" nodeType="tmRoot"/>
+      </p:par>
+    </p:tnLst>
+  </p:timing>
 </p:sld>
 </file>
 
-<file path=ppt/slides/slide5.xml><?xml version="1.0" encoding="utf-8"?>
+<file path=ppt/slides/slide6.xml><?xml version="1.0" encoding="utf-8"?>
 <p:sld xmlns:a="http://schemas.openxmlformats.org/drawingml/2006/main" xmlns:r="http://schemas.openxmlformats.org/officeDocument/2006/relationships" xmlns:p="http://schemas.openxmlformats.org/presentationml/2006/main">
   <p:cSld>
     <p:spTree>
@@ -15120,10 +16402,17 @@
   <p:clrMapOvr>
     <a:masterClrMapping/>
   </p:clrMapOvr>
+  <p:timing>
+    <p:tnLst>
+      <p:par>
+        <p:cTn id="1" dur="indefinite" restart="never" nodeType="tmRoot"/>
+      </p:par>
+    </p:tnLst>
+  </p:timing>
 </p:sld>
 </file>
 
-<file path=ppt/slides/slide6.xml><?xml version="1.0" encoding="utf-8"?>
+<file path=ppt/slides/slide7.xml><?xml version="1.0" encoding="utf-8"?>
 <p:sld xmlns:a="http://schemas.openxmlformats.org/drawingml/2006/main" xmlns:r="http://schemas.openxmlformats.org/officeDocument/2006/relationships" xmlns:p="http://schemas.openxmlformats.org/presentationml/2006/main">
   <p:cSld>
     <p:spTree>
@@ -15218,10 +16507,17 @@
   <p:clrMapOvr>
     <a:masterClrMapping/>
   </p:clrMapOvr>
+  <p:timing>
+    <p:tnLst>
+      <p:par>
+        <p:cTn id="1" dur="indefinite" restart="never" nodeType="tmRoot"/>
+      </p:par>
+    </p:tnLst>
+  </p:timing>
 </p:sld>
 </file>
 
-<file path=ppt/slides/slide7.xml><?xml version="1.0" encoding="utf-8"?>
+<file path=ppt/slides/slide8.xml><?xml version="1.0" encoding="utf-8"?>
 <p:sld xmlns:a="http://schemas.openxmlformats.org/drawingml/2006/main" xmlns:r="http://schemas.openxmlformats.org/officeDocument/2006/relationships" xmlns:p="http://schemas.openxmlformats.org/presentationml/2006/main">
   <p:cSld>
     <p:spTree>
@@ -15253,7 +16549,19 @@
           <a:bodyPr/>
           <a:lstStyle/>
           <a:p>
-            <a:endParaRPr lang="en-US"/>
+            <a:r>
+              <a:rPr lang="en-US" dirty="0"/>
+              <a:t>Program took 3853121 </a:t>
+            </a:r>
+            <a:r>
+              <a:rPr lang="en-US" dirty="0" err="1"/>
+              <a:t>ms</a:t>
+            </a:r>
+            <a:r>
+              <a:rPr lang="en-US" dirty="0"/>
+              <a:t> (Minutes: 64.21868333333333)</a:t>
+            </a:r>
+            <a:endParaRPr lang="en-US" dirty="0"/>
           </a:p>
         </p:txBody>
       </p:sp>
@@ -15297,7 +16605,7 @@
 </p:sld>
 </file>
 
-<file path=ppt/slides/slide8.xml><?xml version="1.0" encoding="utf-8"?>
+<file path=ppt/slides/slide9.xml><?xml version="1.0" encoding="utf-8"?>
 <p:sld xmlns:a="http://schemas.openxmlformats.org/drawingml/2006/main" xmlns:r="http://schemas.openxmlformats.org/officeDocument/2006/relationships" xmlns:p="http://schemas.openxmlformats.org/presentationml/2006/main">
   <p:cSld>
     <p:spTree>
@@ -15329,7 +16637,7 @@
           <a:bodyPr/>
           <a:lstStyle/>
           <a:p>
-            <a:endParaRPr lang="en-US"/>
+            <a:endParaRPr lang="en-US" dirty="0"/>
           </a:p>
         </p:txBody>
       </p:sp>
@@ -15378,112 +16686,6 @@
     <p:extLst>
       <p:ext uri="{BB962C8B-B14F-4D97-AF65-F5344CB8AC3E}">
         <p14:creationId xmlns:p14="http://schemas.microsoft.com/office/powerpoint/2010/main" val="1275797778"/>
-      </p:ext>
-    </p:extLst>
-  </p:cSld>
-  <p:clrMapOvr>
-    <a:masterClrMapping/>
-  </p:clrMapOvr>
-</p:sld>
-</file>
-
-<file path=ppt/slides/slide9.xml><?xml version="1.0" encoding="utf-8"?>
-<p:sld xmlns:a="http://schemas.openxmlformats.org/drawingml/2006/main" xmlns:r="http://schemas.openxmlformats.org/officeDocument/2006/relationships" xmlns:p="http://schemas.openxmlformats.org/presentationml/2006/main">
-  <p:cSld>
-    <p:spTree>
-      <p:nvGrpSpPr>
-        <p:cNvPr id="1" name=""/>
-        <p:cNvGrpSpPr/>
-        <p:nvPr/>
-      </p:nvGrpSpPr>
-      <p:grpSpPr>
-        <a:xfrm>
-          <a:off x="0" y="0"/>
-          <a:ext cx="0" cy="0"/>
-          <a:chOff x="0" y="0"/>
-          <a:chExt cx="0" cy="0"/>
-        </a:xfrm>
-      </p:grpSpPr>
-      <p:sp>
-        <p:nvSpPr>
-          <p:cNvPr id="2" name="Content Placeholder 1"/>
-          <p:cNvSpPr>
-            <a:spLocks noGrp="1"/>
-          </p:cNvSpPr>
-          <p:nvPr>
-            <p:ph idx="1"/>
-          </p:nvPr>
-        </p:nvSpPr>
-        <p:spPr/>
-        <p:txBody>
-          <a:bodyPr/>
-          <a:lstStyle/>
-          <a:p>
-            <a:endParaRPr lang="en-US"/>
-          </a:p>
-        </p:txBody>
-      </p:sp>
-      <p:sp>
-        <p:nvSpPr>
-          <p:cNvPr id="3" name="Title 2"/>
-          <p:cNvSpPr>
-            <a:spLocks noGrp="1"/>
-          </p:cNvSpPr>
-          <p:nvPr>
-            <p:ph type="title"/>
-          </p:nvPr>
-        </p:nvSpPr>
-        <p:spPr/>
-        <p:txBody>
-          <a:bodyPr>
-            <a:normAutofit fontScale="90000"/>
-          </a:bodyPr>
-          <a:lstStyle/>
-          <a:p>
-            <a:r>
-              <a:rPr lang="en-US" dirty="0"/>
-              <a:t>20 </a:t>
-            </a:r>
-            <a:r>
-              <a:rPr lang="en-US" dirty="0" smtClean="0"/>
-              <a:t>Most </a:t>
-            </a:r>
-            <a:r>
-              <a:rPr lang="en-US" dirty="0"/>
-              <a:t>D</a:t>
-            </a:r>
-            <a:r>
-              <a:rPr lang="en-US" dirty="0" smtClean="0"/>
-              <a:t>iscriminative </a:t>
-            </a:r>
-            <a:r>
-              <a:rPr lang="en-US" dirty="0"/>
-              <a:t>T</a:t>
-            </a:r>
-            <a:r>
-              <a:rPr lang="en-US" dirty="0" smtClean="0"/>
-              <a:t>erms </a:t>
-            </a:r>
-            <a:r>
-              <a:rPr lang="en-US"/>
-              <a:t>per </a:t>
-            </a:r>
-            <a:r>
-              <a:rPr lang="en-US"/>
-              <a:t>C</a:t>
-            </a:r>
-            <a:r>
-              <a:rPr lang="en-US" smtClean="0"/>
-              <a:t>luster</a:t>
-            </a:r>
-            <a:endParaRPr lang="en-US" dirty="0"/>
-          </a:p>
-        </p:txBody>
-      </p:sp>
-    </p:spTree>
-    <p:extLst>
-      <p:ext uri="{BB962C8B-B14F-4D97-AF65-F5344CB8AC3E}">
-        <p14:creationId xmlns:p14="http://schemas.microsoft.com/office/powerpoint/2010/main" val="1381074220"/>
       </p:ext>
     </p:extLst>
   </p:cSld>
@@ -15787,4 +16989,289 @@
   <a:objectDefaults/>
   <a:extraClrSchemeLst/>
 </a:theme>
+</file>
+
+<file path=ppt/theme/theme2.xml><?xml version="1.0" encoding="utf-8"?>
+<a:theme xmlns:a="http://schemas.openxmlformats.org/drawingml/2006/main" name="Office Theme">
+  <a:themeElements>
+    <a:clrScheme name="Office">
+      <a:dk1>
+        <a:sysClr val="windowText" lastClr="000000"/>
+      </a:dk1>
+      <a:lt1>
+        <a:sysClr val="window" lastClr="FFFFFF"/>
+      </a:lt1>
+      <a:dk2>
+        <a:srgbClr val="1F497D"/>
+      </a:dk2>
+      <a:lt2>
+        <a:srgbClr val="EEECE1"/>
+      </a:lt2>
+      <a:accent1>
+        <a:srgbClr val="4F81BD"/>
+      </a:accent1>
+      <a:accent2>
+        <a:srgbClr val="C0504D"/>
+      </a:accent2>
+      <a:accent3>
+        <a:srgbClr val="9BBB59"/>
+      </a:accent3>
+      <a:accent4>
+        <a:srgbClr val="8064A2"/>
+      </a:accent4>
+      <a:accent5>
+        <a:srgbClr val="4BACC6"/>
+      </a:accent5>
+      <a:accent6>
+        <a:srgbClr val="F79646"/>
+      </a:accent6>
+      <a:hlink>
+        <a:srgbClr val="0000FF"/>
+      </a:hlink>
+      <a:folHlink>
+        <a:srgbClr val="800080"/>
+      </a:folHlink>
+    </a:clrScheme>
+    <a:fontScheme name="Office">
+      <a:majorFont>
+        <a:latin typeface="Calibri"/>
+        <a:ea typeface=""/>
+        <a:cs typeface=""/>
+        <a:font script="Jpan" typeface="ＭＳ Ｐゴシック"/>
+        <a:font script="Hang" typeface="맑은 고딕"/>
+        <a:font script="Hans" typeface="宋体"/>
+        <a:font script="Hant" typeface="新細明體"/>
+        <a:font script="Arab" typeface="Times New Roman"/>
+        <a:font script="Hebr" typeface="Times New Roman"/>
+        <a:font script="Thai" typeface="Angsana New"/>
+        <a:font script="Ethi" typeface="Nyala"/>
+        <a:font script="Beng" typeface="Vrinda"/>
+        <a:font script="Gujr" typeface="Shruti"/>
+        <a:font script="Khmr" typeface="MoolBoran"/>
+        <a:font script="Knda" typeface="Tunga"/>
+        <a:font script="Guru" typeface="Raavi"/>
+        <a:font script="Cans" typeface="Euphemia"/>
+        <a:font script="Cher" typeface="Plantagenet Cherokee"/>
+        <a:font script="Yiii" typeface="Microsoft Yi Baiti"/>
+        <a:font script="Tibt" typeface="Microsoft Himalaya"/>
+        <a:font script="Thaa" typeface="MV Boli"/>
+        <a:font script="Deva" typeface="Mangal"/>
+        <a:font script="Telu" typeface="Gautami"/>
+        <a:font script="Taml" typeface="Latha"/>
+        <a:font script="Syrc" typeface="Estrangelo Edessa"/>
+        <a:font script="Orya" typeface="Kalinga"/>
+        <a:font script="Mlym" typeface="Kartika"/>
+        <a:font script="Laoo" typeface="DokChampa"/>
+        <a:font script="Sinh" typeface="Iskoola Pota"/>
+        <a:font script="Mong" typeface="Mongolian Baiti"/>
+        <a:font script="Viet" typeface="Times New Roman"/>
+        <a:font script="Uigh" typeface="Microsoft Uighur"/>
+        <a:font script="Geor" typeface="Sylfaen"/>
+      </a:majorFont>
+      <a:minorFont>
+        <a:latin typeface="Calibri"/>
+        <a:ea typeface=""/>
+        <a:cs typeface=""/>
+        <a:font script="Jpan" typeface="ＭＳ Ｐゴシック"/>
+        <a:font script="Hang" typeface="맑은 고딕"/>
+        <a:font script="Hans" typeface="宋体"/>
+        <a:font script="Hant" typeface="新細明體"/>
+        <a:font script="Arab" typeface="Arial"/>
+        <a:font script="Hebr" typeface="Arial"/>
+        <a:font script="Thai" typeface="Cordia New"/>
+        <a:font script="Ethi" typeface="Nyala"/>
+        <a:font script="Beng" typeface="Vrinda"/>
+        <a:font script="Gujr" typeface="Shruti"/>
+        <a:font script="Khmr" typeface="DaunPenh"/>
+        <a:font script="Knda" typeface="Tunga"/>
+        <a:font script="Guru" typeface="Raavi"/>
+        <a:font script="Cans" typeface="Euphemia"/>
+        <a:font script="Cher" typeface="Plantagenet Cherokee"/>
+        <a:font script="Yiii" typeface="Microsoft Yi Baiti"/>
+        <a:font script="Tibt" typeface="Microsoft Himalaya"/>
+        <a:font script="Thaa" typeface="MV Boli"/>
+        <a:font script="Deva" typeface="Mangal"/>
+        <a:font script="Telu" typeface="Gautami"/>
+        <a:font script="Taml" typeface="Latha"/>
+        <a:font script="Syrc" typeface="Estrangelo Edessa"/>
+        <a:font script="Orya" typeface="Kalinga"/>
+        <a:font script="Mlym" typeface="Kartika"/>
+        <a:font script="Laoo" typeface="DokChampa"/>
+        <a:font script="Sinh" typeface="Iskoola Pota"/>
+        <a:font script="Mong" typeface="Mongolian Baiti"/>
+        <a:font script="Viet" typeface="Arial"/>
+        <a:font script="Uigh" typeface="Microsoft Uighur"/>
+        <a:font script="Geor" typeface="Sylfaen"/>
+      </a:minorFont>
+    </a:fontScheme>
+    <a:fmtScheme name="Office">
+      <a:fillStyleLst>
+        <a:solidFill>
+          <a:schemeClr val="phClr"/>
+        </a:solidFill>
+        <a:gradFill rotWithShape="1">
+          <a:gsLst>
+            <a:gs pos="0">
+              <a:schemeClr val="phClr">
+                <a:tint val="50000"/>
+                <a:satMod val="300000"/>
+              </a:schemeClr>
+            </a:gs>
+            <a:gs pos="35000">
+              <a:schemeClr val="phClr">
+                <a:tint val="37000"/>
+                <a:satMod val="300000"/>
+              </a:schemeClr>
+            </a:gs>
+            <a:gs pos="100000">
+              <a:schemeClr val="phClr">
+                <a:tint val="15000"/>
+                <a:satMod val="350000"/>
+              </a:schemeClr>
+            </a:gs>
+          </a:gsLst>
+          <a:lin ang="16200000" scaled="1"/>
+        </a:gradFill>
+        <a:gradFill rotWithShape="1">
+          <a:gsLst>
+            <a:gs pos="0">
+              <a:schemeClr val="phClr">
+                <a:shade val="51000"/>
+                <a:satMod val="130000"/>
+              </a:schemeClr>
+            </a:gs>
+            <a:gs pos="80000">
+              <a:schemeClr val="phClr">
+                <a:shade val="93000"/>
+                <a:satMod val="130000"/>
+              </a:schemeClr>
+            </a:gs>
+            <a:gs pos="100000">
+              <a:schemeClr val="phClr">
+                <a:shade val="94000"/>
+                <a:satMod val="135000"/>
+              </a:schemeClr>
+            </a:gs>
+          </a:gsLst>
+          <a:lin ang="16200000" scaled="0"/>
+        </a:gradFill>
+      </a:fillStyleLst>
+      <a:lnStyleLst>
+        <a:ln w="9525" cap="flat" cmpd="sng" algn="ctr">
+          <a:solidFill>
+            <a:schemeClr val="phClr">
+              <a:shade val="95000"/>
+              <a:satMod val="105000"/>
+            </a:schemeClr>
+          </a:solidFill>
+          <a:prstDash val="solid"/>
+        </a:ln>
+        <a:ln w="25400" cap="flat" cmpd="sng" algn="ctr">
+          <a:solidFill>
+            <a:schemeClr val="phClr"/>
+          </a:solidFill>
+          <a:prstDash val="solid"/>
+        </a:ln>
+        <a:ln w="38100" cap="flat" cmpd="sng" algn="ctr">
+          <a:solidFill>
+            <a:schemeClr val="phClr"/>
+          </a:solidFill>
+          <a:prstDash val="solid"/>
+        </a:ln>
+      </a:lnStyleLst>
+      <a:effectStyleLst>
+        <a:effectStyle>
+          <a:effectLst>
+            <a:outerShdw blurRad="40000" dist="20000" dir="5400000" rotWithShape="0">
+              <a:srgbClr val="000000">
+                <a:alpha val="38000"/>
+              </a:srgbClr>
+            </a:outerShdw>
+          </a:effectLst>
+        </a:effectStyle>
+        <a:effectStyle>
+          <a:effectLst>
+            <a:outerShdw blurRad="40000" dist="23000" dir="5400000" rotWithShape="0">
+              <a:srgbClr val="000000">
+                <a:alpha val="35000"/>
+              </a:srgbClr>
+            </a:outerShdw>
+          </a:effectLst>
+        </a:effectStyle>
+        <a:effectStyle>
+          <a:effectLst>
+            <a:outerShdw blurRad="40000" dist="23000" dir="5400000" rotWithShape="0">
+              <a:srgbClr val="000000">
+                <a:alpha val="35000"/>
+              </a:srgbClr>
+            </a:outerShdw>
+          </a:effectLst>
+          <a:scene3d>
+            <a:camera prst="orthographicFront">
+              <a:rot lat="0" lon="0" rev="0"/>
+            </a:camera>
+            <a:lightRig rig="threePt" dir="t">
+              <a:rot lat="0" lon="0" rev="1200000"/>
+            </a:lightRig>
+          </a:scene3d>
+          <a:sp3d>
+            <a:bevelT w="63500" h="25400"/>
+          </a:sp3d>
+        </a:effectStyle>
+      </a:effectStyleLst>
+      <a:bgFillStyleLst>
+        <a:solidFill>
+          <a:schemeClr val="phClr"/>
+        </a:solidFill>
+        <a:gradFill rotWithShape="1">
+          <a:gsLst>
+            <a:gs pos="0">
+              <a:schemeClr val="phClr">
+                <a:tint val="40000"/>
+                <a:satMod val="350000"/>
+              </a:schemeClr>
+            </a:gs>
+            <a:gs pos="40000">
+              <a:schemeClr val="phClr">
+                <a:tint val="45000"/>
+                <a:shade val="99000"/>
+                <a:satMod val="350000"/>
+              </a:schemeClr>
+            </a:gs>
+            <a:gs pos="100000">
+              <a:schemeClr val="phClr">
+                <a:shade val="20000"/>
+                <a:satMod val="255000"/>
+              </a:schemeClr>
+            </a:gs>
+          </a:gsLst>
+          <a:path path="circle">
+            <a:fillToRect l="50000" t="-80000" r="50000" b="180000"/>
+          </a:path>
+        </a:gradFill>
+        <a:gradFill rotWithShape="1">
+          <a:gsLst>
+            <a:gs pos="0">
+              <a:schemeClr val="phClr">
+                <a:tint val="80000"/>
+                <a:satMod val="300000"/>
+              </a:schemeClr>
+            </a:gs>
+            <a:gs pos="100000">
+              <a:schemeClr val="phClr">
+                <a:shade val="30000"/>
+                <a:satMod val="200000"/>
+              </a:schemeClr>
+            </a:gs>
+          </a:gsLst>
+          <a:path path="circle">
+            <a:fillToRect l="50000" t="50000" r="50000" b="50000"/>
+          </a:path>
+        </a:gradFill>
+      </a:bgFillStyleLst>
+    </a:fmtScheme>
+  </a:themeElements>
+  <a:objectDefaults/>
+  <a:extraClrSchemeLst/>
+</a:theme>
 </file>
</xml_diff>

<commit_message>
Revert "Updated presentation a little"
This reverts commit fdee1126a79c2576bcda7a31ca31c32049950308.
</commit_message>
<xml_diff>
--- a/Presentation.pptx
+++ b/Presentation.pptx
@@ -4,21 +4,17 @@
   <p:sldMasterIdLst>
     <p:sldMasterId id="2147483744" r:id="rId1"/>
   </p:sldMasterIdLst>
-  <p:notesMasterIdLst>
-    <p:notesMasterId r:id="rId13"/>
-  </p:notesMasterIdLst>
   <p:sldIdLst>
     <p:sldId id="256" r:id="rId2"/>
     <p:sldId id="257" r:id="rId3"/>
     <p:sldId id="258" r:id="rId4"/>
-    <p:sldId id="266" r:id="rId5"/>
-    <p:sldId id="259" r:id="rId6"/>
-    <p:sldId id="260" r:id="rId7"/>
-    <p:sldId id="261" r:id="rId8"/>
-    <p:sldId id="262" r:id="rId9"/>
-    <p:sldId id="263" r:id="rId10"/>
-    <p:sldId id="265" r:id="rId11"/>
-    <p:sldId id="264" r:id="rId12"/>
+    <p:sldId id="259" r:id="rId5"/>
+    <p:sldId id="260" r:id="rId6"/>
+    <p:sldId id="261" r:id="rId7"/>
+    <p:sldId id="262" r:id="rId8"/>
+    <p:sldId id="263" r:id="rId9"/>
+    <p:sldId id="265" r:id="rId10"/>
+    <p:sldId id="264" r:id="rId11"/>
   </p:sldIdLst>
   <p:sldSz cx="9144000" cy="6858000" type="screen4x3"/>
   <p:notesSz cx="6858000" cy="9144000"/>
@@ -125,7 +121,6 @@
             <p14:sldId id="256"/>
             <p14:sldId id="257"/>
             <p14:sldId id="258"/>
-            <p14:sldId id="266"/>
           </p14:sldIdLst>
         </p14:section>
         <p14:section name="Untitled Section" id="{B9274524-FC6C-E543-980E-10A83BD2F653}">
@@ -143,956 +138,6 @@
     </p:ext>
   </p:extLst>
 </p:presentation>
-</file>
-
-<file path=ppt/charts/chart1.xml><?xml version="1.0" encoding="utf-8"?>
-<c:chartSpace xmlns:c="http://schemas.openxmlformats.org/drawingml/2006/chart" xmlns:a="http://schemas.openxmlformats.org/drawingml/2006/main" xmlns:r="http://schemas.openxmlformats.org/officeDocument/2006/relationships">
-  <c:date1904 val="0"/>
-  <c:lang val="en-US"/>
-  <c:roundedCorners val="0"/>
-  <mc:AlternateContent xmlns:mc="http://schemas.openxmlformats.org/markup-compatibility/2006">
-    <mc:Choice xmlns:c14="http://schemas.microsoft.com/office/drawing/2007/8/2/chart" Requires="c14">
-      <c14:style val="102"/>
-    </mc:Choice>
-    <mc:Fallback>
-      <c:style val="2"/>
-    </mc:Fallback>
-  </mc:AlternateContent>
-  <c:chart>
-    <c:title>
-      <c:tx>
-        <c:rich>
-          <a:bodyPr/>
-          <a:lstStyle/>
-          <a:p>
-            <a:pPr>
-              <a:defRPr/>
-            </a:pPr>
-            <a:r>
-              <a:rPr lang="en-US"/>
-              <a:t>NY Times Section Breakdown</a:t>
-            </a:r>
-          </a:p>
-        </c:rich>
-      </c:tx>
-      <c:layout/>
-      <c:overlay val="0"/>
-    </c:title>
-    <c:autoTitleDeleted val="0"/>
-    <c:plotArea>
-      <c:layout/>
-      <c:barChart>
-        <c:barDir val="col"/>
-        <c:grouping val="clustered"/>
-        <c:varyColors val="0"/>
-        <c:ser>
-          <c:idx val="0"/>
-          <c:order val="0"/>
-          <c:tx>
-            <c:strRef>
-              <c:f>Chart!$E$3</c:f>
-              <c:strCache>
-                <c:ptCount val="1"/>
-                <c:pt idx="0">
-                  <c:v>Count</c:v>
-                </c:pt>
-              </c:strCache>
-            </c:strRef>
-          </c:tx>
-          <c:invertIfNegative val="0"/>
-          <c:cat>
-            <c:strRef>
-              <c:f>Chart!$D$4:$D$45</c:f>
-              <c:strCache>
-                <c:ptCount val="42"/>
-                <c:pt idx="0">
-                  <c:v>Business Day</c:v>
-                </c:pt>
-                <c:pt idx="1">
-                  <c:v>World</c:v>
-                </c:pt>
-                <c:pt idx="2">
-                  <c:v>Sports</c:v>
-                </c:pt>
-                <c:pt idx="3">
-                  <c:v>Opinion</c:v>
-                </c:pt>
-                <c:pt idx="4">
-                  <c:v>U.S.</c:v>
-                </c:pt>
-                <c:pt idx="5">
-                  <c:v>Arts</c:v>
-                </c:pt>
-                <c:pt idx="6">
-                  <c:v>N.Y. / Region</c:v>
-                </c:pt>
-                <c:pt idx="7">
-                  <c:v>Fashion &amp; Style</c:v>
-                </c:pt>
-                <c:pt idx="8">
-                  <c:v>Technology</c:v>
-                </c:pt>
-                <c:pt idx="9">
-                  <c:v>Movies</c:v>
-                </c:pt>
-                <c:pt idx="10">
-                  <c:v>(blank)</c:v>
-                </c:pt>
-                <c:pt idx="11">
-                  <c:v>Books</c:v>
-                </c:pt>
-                <c:pt idx="12">
-                  <c:v>The Upshot</c:v>
-                </c:pt>
-                <c:pt idx="13">
-                  <c:v>Health</c:v>
-                </c:pt>
-                <c:pt idx="14">
-                  <c:v>T:Style</c:v>
-                </c:pt>
-                <c:pt idx="15">
-                  <c:v>Multimedia/Photos</c:v>
-                </c:pt>
-                <c:pt idx="16">
-                  <c:v>Travel</c:v>
-                </c:pt>
-                <c:pt idx="17">
-                  <c:v>Magazine</c:v>
-                </c:pt>
-                <c:pt idx="18">
-                  <c:v>Automobiles</c:v>
-                </c:pt>
-                <c:pt idx="19">
-                  <c:v>Theater</c:v>
-                </c:pt>
-                <c:pt idx="20">
-                  <c:v>Science</c:v>
-                </c:pt>
-                <c:pt idx="21">
-                  <c:v>Dining &amp; Wine</c:v>
-                </c:pt>
-                <c:pt idx="22">
-                  <c:v>Real Estate</c:v>
-                </c:pt>
-                <c:pt idx="23">
-                  <c:v>Corrections</c:v>
-                </c:pt>
-                <c:pt idx="24">
-                  <c:v>Home &amp; Garden</c:v>
-                </c:pt>
-                <c:pt idx="25">
-                  <c:v>Multimedia</c:v>
-                </c:pt>
-                <c:pt idx="26">
-                  <c:v>Crosswords/Games</c:v>
-                </c:pt>
-                <c:pt idx="27">
-                  <c:v>Your Money</c:v>
-                </c:pt>
-                <c:pt idx="28">
-                  <c:v>Crosswords &amp; Games</c:v>
-                </c:pt>
-                <c:pt idx="29">
-                  <c:v>Great Homes &amp; Destinations</c:v>
-                </c:pt>
-                <c:pt idx="30">
-                  <c:v>Style</c:v>
-                </c:pt>
-                <c:pt idx="31">
-                  <c:v>T Magazine</c:v>
-                </c:pt>
-                <c:pt idx="32">
-                  <c:v>Education</c:v>
-                </c:pt>
-                <c:pt idx="33">
-                  <c:v>Sunday Review</c:v>
-                </c:pt>
-                <c:pt idx="34">
-                  <c:v>Job Market</c:v>
-                </c:pt>
-                <c:pt idx="35">
-                  <c:v>Great Homes and Destinations</c:v>
-                </c:pt>
-                <c:pt idx="36">
-                  <c:v>Open</c:v>
-                </c:pt>
-                <c:pt idx="37">
-                  <c:v>Blogs</c:v>
-                </c:pt>
-                <c:pt idx="38">
-                  <c:v>Public Editor</c:v>
-                </c:pt>
-                <c:pt idx="39">
-                  <c:v>Obituaries</c:v>
-                </c:pt>
-                <c:pt idx="40">
-                  <c:v>Feeds</c:v>
-                </c:pt>
-                <c:pt idx="41">
-                  <c:v>Afternoon Update</c:v>
-                </c:pt>
-              </c:strCache>
-            </c:strRef>
-          </c:cat>
-          <c:val>
-            <c:numRef>
-              <c:f>Chart!$E$4:$E$45</c:f>
-              <c:numCache>
-                <c:formatCode>General</c:formatCode>
-                <c:ptCount val="42"/>
-                <c:pt idx="0">
-                  <c:v>4784</c:v>
-                </c:pt>
-                <c:pt idx="1">
-                  <c:v>4639</c:v>
-                </c:pt>
-                <c:pt idx="2">
-                  <c:v>4408</c:v>
-                </c:pt>
-                <c:pt idx="3">
-                  <c:v>4113</c:v>
-                </c:pt>
-                <c:pt idx="4">
-                  <c:v>3964</c:v>
-                </c:pt>
-                <c:pt idx="5">
-                  <c:v>3627</c:v>
-                </c:pt>
-                <c:pt idx="6">
-                  <c:v>2897</c:v>
-                </c:pt>
-                <c:pt idx="7">
-                  <c:v>1563</c:v>
-                </c:pt>
-                <c:pt idx="8">
-                  <c:v>1007</c:v>
-                </c:pt>
-                <c:pt idx="9">
-                  <c:v>932</c:v>
-                </c:pt>
-                <c:pt idx="10">
-                  <c:v>926</c:v>
-                </c:pt>
-                <c:pt idx="11">
-                  <c:v>795</c:v>
-                </c:pt>
-                <c:pt idx="12">
-                  <c:v>784</c:v>
-                </c:pt>
-                <c:pt idx="13">
-                  <c:v>590</c:v>
-                </c:pt>
-                <c:pt idx="14">
-                  <c:v>588</c:v>
-                </c:pt>
-                <c:pt idx="15">
-                  <c:v>572</c:v>
-                </c:pt>
-                <c:pt idx="16">
-                  <c:v>497</c:v>
-                </c:pt>
-                <c:pt idx="17">
-                  <c:v>486</c:v>
-                </c:pt>
-                <c:pt idx="18">
-                  <c:v>470</c:v>
-                </c:pt>
-                <c:pt idx="19">
-                  <c:v>464</c:v>
-                </c:pt>
-                <c:pt idx="20">
-                  <c:v>453</c:v>
-                </c:pt>
-                <c:pt idx="21">
-                  <c:v>447</c:v>
-                </c:pt>
-                <c:pt idx="22">
-                  <c:v>374</c:v>
-                </c:pt>
-                <c:pt idx="23">
-                  <c:v>321</c:v>
-                </c:pt>
-                <c:pt idx="24">
-                  <c:v>248</c:v>
-                </c:pt>
-                <c:pt idx="25">
-                  <c:v>243</c:v>
-                </c:pt>
-                <c:pt idx="26">
-                  <c:v>214</c:v>
-                </c:pt>
-                <c:pt idx="27">
-                  <c:v>175</c:v>
-                </c:pt>
-                <c:pt idx="28">
-                  <c:v>93</c:v>
-                </c:pt>
-                <c:pt idx="29">
-                  <c:v>85</c:v>
-                </c:pt>
-                <c:pt idx="30">
-                  <c:v>82</c:v>
-                </c:pt>
-                <c:pt idx="31">
-                  <c:v>74</c:v>
-                </c:pt>
-                <c:pt idx="32">
-                  <c:v>60</c:v>
-                </c:pt>
-                <c:pt idx="33">
-                  <c:v>44</c:v>
-                </c:pt>
-                <c:pt idx="34">
-                  <c:v>39</c:v>
-                </c:pt>
-                <c:pt idx="35">
-                  <c:v>26</c:v>
-                </c:pt>
-                <c:pt idx="36">
-                  <c:v>10</c:v>
-                </c:pt>
-                <c:pt idx="37">
-                  <c:v>8</c:v>
-                </c:pt>
-                <c:pt idx="38">
-                  <c:v>6</c:v>
-                </c:pt>
-                <c:pt idx="39">
-                  <c:v>5</c:v>
-                </c:pt>
-                <c:pt idx="40">
-                  <c:v>2</c:v>
-                </c:pt>
-                <c:pt idx="41">
-                  <c:v>1</c:v>
-                </c:pt>
-              </c:numCache>
-            </c:numRef>
-          </c:val>
-        </c:ser>
-        <c:dLbls>
-          <c:showLegendKey val="0"/>
-          <c:showVal val="0"/>
-          <c:showCatName val="0"/>
-          <c:showSerName val="0"/>
-          <c:showPercent val="0"/>
-          <c:showBubbleSize val="0"/>
-        </c:dLbls>
-        <c:gapWidth val="150"/>
-        <c:axId val="58002048"/>
-        <c:axId val="59788288"/>
-      </c:barChart>
-      <c:catAx>
-        <c:axId val="58002048"/>
-        <c:scaling>
-          <c:orientation val="minMax"/>
-        </c:scaling>
-        <c:delete val="0"/>
-        <c:axPos val="b"/>
-        <c:majorTickMark val="out"/>
-        <c:minorTickMark val="none"/>
-        <c:tickLblPos val="nextTo"/>
-        <c:crossAx val="59788288"/>
-        <c:crosses val="autoZero"/>
-        <c:auto val="1"/>
-        <c:lblAlgn val="ctr"/>
-        <c:lblOffset val="100"/>
-        <c:noMultiLvlLbl val="0"/>
-      </c:catAx>
-      <c:valAx>
-        <c:axId val="59788288"/>
-        <c:scaling>
-          <c:orientation val="minMax"/>
-        </c:scaling>
-        <c:delete val="0"/>
-        <c:axPos val="l"/>
-        <c:majorGridlines/>
-        <c:numFmt formatCode="General" sourceLinked="1"/>
-        <c:majorTickMark val="out"/>
-        <c:minorTickMark val="none"/>
-        <c:tickLblPos val="nextTo"/>
-        <c:crossAx val="58002048"/>
-        <c:crosses val="autoZero"/>
-        <c:crossBetween val="between"/>
-      </c:valAx>
-    </c:plotArea>
-    <c:plotVisOnly val="1"/>
-    <c:dispBlanksAs val="gap"/>
-    <c:showDLblsOverMax val="0"/>
-  </c:chart>
-  <c:externalData r:id="rId1">
-    <c:autoUpdate val="0"/>
-  </c:externalData>
-</c:chartSpace>
-</file>
-
-<file path=ppt/notesMasters/notesMaster1.xml><?xml version="1.0" encoding="utf-8"?>
-<p:notesMaster xmlns:a="http://schemas.openxmlformats.org/drawingml/2006/main" xmlns:r="http://schemas.openxmlformats.org/officeDocument/2006/relationships" xmlns:p="http://schemas.openxmlformats.org/presentationml/2006/main">
-  <p:cSld>
-    <p:bg>
-      <p:bgRef idx="1001">
-        <a:schemeClr val="bg1"/>
-      </p:bgRef>
-    </p:bg>
-    <p:spTree>
-      <p:nvGrpSpPr>
-        <p:cNvPr id="1" name=""/>
-        <p:cNvGrpSpPr/>
-        <p:nvPr/>
-      </p:nvGrpSpPr>
-      <p:grpSpPr>
-        <a:xfrm>
-          <a:off x="0" y="0"/>
-          <a:ext cx="0" cy="0"/>
-          <a:chOff x="0" y="0"/>
-          <a:chExt cx="0" cy="0"/>
-        </a:xfrm>
-      </p:grpSpPr>
-      <p:sp>
-        <p:nvSpPr>
-          <p:cNvPr id="2" name="Header Placeholder 1"/>
-          <p:cNvSpPr>
-            <a:spLocks noGrp="1"/>
-          </p:cNvSpPr>
-          <p:nvPr>
-            <p:ph type="hdr" sz="quarter"/>
-          </p:nvPr>
-        </p:nvSpPr>
-        <p:spPr>
-          <a:xfrm>
-            <a:off x="0" y="0"/>
-            <a:ext cx="2971800" cy="457200"/>
-          </a:xfrm>
-          <a:prstGeom prst="rect">
-            <a:avLst/>
-          </a:prstGeom>
-        </p:spPr>
-        <p:txBody>
-          <a:bodyPr vert="horz" lIns="91440" tIns="45720" rIns="91440" bIns="45720" rtlCol="0"/>
-          <a:lstStyle>
-            <a:lvl1pPr algn="l">
-              <a:defRPr sz="1200"/>
-            </a:lvl1pPr>
-          </a:lstStyle>
-          <a:p>
-            <a:endParaRPr lang="en-US"/>
-          </a:p>
-        </p:txBody>
-      </p:sp>
-      <p:sp>
-        <p:nvSpPr>
-          <p:cNvPr id="3" name="Date Placeholder 2"/>
-          <p:cNvSpPr>
-            <a:spLocks noGrp="1"/>
-          </p:cNvSpPr>
-          <p:nvPr>
-            <p:ph type="dt" idx="1"/>
-          </p:nvPr>
-        </p:nvSpPr>
-        <p:spPr>
-          <a:xfrm>
-            <a:off x="3884613" y="0"/>
-            <a:ext cx="2971800" cy="457200"/>
-          </a:xfrm>
-          <a:prstGeom prst="rect">
-            <a:avLst/>
-          </a:prstGeom>
-        </p:spPr>
-        <p:txBody>
-          <a:bodyPr vert="horz" lIns="91440" tIns="45720" rIns="91440" bIns="45720" rtlCol="0"/>
-          <a:lstStyle>
-            <a:lvl1pPr algn="r">
-              <a:defRPr sz="1200"/>
-            </a:lvl1pPr>
-          </a:lstStyle>
-          <a:p>
-            <a:fld id="{DB2AF06D-7C49-4CDB-96A5-20BEE046A6A6}" type="datetimeFigureOut">
-              <a:rPr lang="en-US" smtClean="0"/>
-              <a:t>10/18/2014</a:t>
-            </a:fld>
-            <a:endParaRPr lang="en-US"/>
-          </a:p>
-        </p:txBody>
-      </p:sp>
-      <p:sp>
-        <p:nvSpPr>
-          <p:cNvPr id="4" name="Slide Image Placeholder 3"/>
-          <p:cNvSpPr>
-            <a:spLocks noGrp="1" noRot="1" noChangeAspect="1"/>
-          </p:cNvSpPr>
-          <p:nvPr>
-            <p:ph type="sldImg" idx="2"/>
-          </p:nvPr>
-        </p:nvSpPr>
-        <p:spPr>
-          <a:xfrm>
-            <a:off x="1143000" y="685800"/>
-            <a:ext cx="4572000" cy="3429000"/>
-          </a:xfrm>
-          <a:prstGeom prst="rect">
-            <a:avLst/>
-          </a:prstGeom>
-          <a:noFill/>
-          <a:ln w="12700">
-            <a:solidFill>
-              <a:prstClr val="black"/>
-            </a:solidFill>
-          </a:ln>
-        </p:spPr>
-        <p:txBody>
-          <a:bodyPr vert="horz" lIns="91440" tIns="45720" rIns="91440" bIns="45720" rtlCol="0" anchor="ctr"/>
-          <a:lstStyle/>
-          <a:p>
-            <a:endParaRPr lang="en-US"/>
-          </a:p>
-        </p:txBody>
-      </p:sp>
-      <p:sp>
-        <p:nvSpPr>
-          <p:cNvPr id="5" name="Notes Placeholder 4"/>
-          <p:cNvSpPr>
-            <a:spLocks noGrp="1"/>
-          </p:cNvSpPr>
-          <p:nvPr>
-            <p:ph type="body" sz="quarter" idx="3"/>
-          </p:nvPr>
-        </p:nvSpPr>
-        <p:spPr>
-          <a:xfrm>
-            <a:off x="685800" y="4343400"/>
-            <a:ext cx="5486400" cy="4114800"/>
-          </a:xfrm>
-          <a:prstGeom prst="rect">
-            <a:avLst/>
-          </a:prstGeom>
-        </p:spPr>
-        <p:txBody>
-          <a:bodyPr vert="horz" lIns="91440" tIns="45720" rIns="91440" bIns="45720" rtlCol="0"/>
-          <a:lstStyle/>
-          <a:p>
-            <a:pPr lvl="0"/>
-            <a:r>
-              <a:rPr lang="en-US" smtClean="0"/>
-              <a:t>Click to edit Master text styles</a:t>
-            </a:r>
-          </a:p>
-          <a:p>
-            <a:pPr lvl="1"/>
-            <a:r>
-              <a:rPr lang="en-US" smtClean="0"/>
-              <a:t>Second level</a:t>
-            </a:r>
-          </a:p>
-          <a:p>
-            <a:pPr lvl="2"/>
-            <a:r>
-              <a:rPr lang="en-US" smtClean="0"/>
-              <a:t>Third level</a:t>
-            </a:r>
-          </a:p>
-          <a:p>
-            <a:pPr lvl="3"/>
-            <a:r>
-              <a:rPr lang="en-US" smtClean="0"/>
-              <a:t>Fourth level</a:t>
-            </a:r>
-          </a:p>
-          <a:p>
-            <a:pPr lvl="4"/>
-            <a:r>
-              <a:rPr lang="en-US" smtClean="0"/>
-              <a:t>Fifth level</a:t>
-            </a:r>
-            <a:endParaRPr lang="en-US"/>
-          </a:p>
-        </p:txBody>
-      </p:sp>
-      <p:sp>
-        <p:nvSpPr>
-          <p:cNvPr id="6" name="Footer Placeholder 5"/>
-          <p:cNvSpPr>
-            <a:spLocks noGrp="1"/>
-          </p:cNvSpPr>
-          <p:nvPr>
-            <p:ph type="ftr" sz="quarter" idx="4"/>
-          </p:nvPr>
-        </p:nvSpPr>
-        <p:spPr>
-          <a:xfrm>
-            <a:off x="0" y="8685213"/>
-            <a:ext cx="2971800" cy="457200"/>
-          </a:xfrm>
-          <a:prstGeom prst="rect">
-            <a:avLst/>
-          </a:prstGeom>
-        </p:spPr>
-        <p:txBody>
-          <a:bodyPr vert="horz" lIns="91440" tIns="45720" rIns="91440" bIns="45720" rtlCol="0" anchor="b"/>
-          <a:lstStyle>
-            <a:lvl1pPr algn="l">
-              <a:defRPr sz="1200"/>
-            </a:lvl1pPr>
-          </a:lstStyle>
-          <a:p>
-            <a:endParaRPr lang="en-US"/>
-          </a:p>
-        </p:txBody>
-      </p:sp>
-      <p:sp>
-        <p:nvSpPr>
-          <p:cNvPr id="7" name="Slide Number Placeholder 6"/>
-          <p:cNvSpPr>
-            <a:spLocks noGrp="1"/>
-          </p:cNvSpPr>
-          <p:nvPr>
-            <p:ph type="sldNum" sz="quarter" idx="5"/>
-          </p:nvPr>
-        </p:nvSpPr>
-        <p:spPr>
-          <a:xfrm>
-            <a:off x="3884613" y="8685213"/>
-            <a:ext cx="2971800" cy="457200"/>
-          </a:xfrm>
-          <a:prstGeom prst="rect">
-            <a:avLst/>
-          </a:prstGeom>
-        </p:spPr>
-        <p:txBody>
-          <a:bodyPr vert="horz" lIns="91440" tIns="45720" rIns="91440" bIns="45720" rtlCol="0" anchor="b"/>
-          <a:lstStyle>
-            <a:lvl1pPr algn="r">
-              <a:defRPr sz="1200"/>
-            </a:lvl1pPr>
-          </a:lstStyle>
-          <a:p>
-            <a:fld id="{7ABBC0B4-C33E-46CE-9706-C9D67F40DB9D}" type="slidenum">
-              <a:rPr lang="en-US" smtClean="0"/>
-              <a:t>‹#›</a:t>
-            </a:fld>
-            <a:endParaRPr lang="en-US"/>
-          </a:p>
-        </p:txBody>
-      </p:sp>
-    </p:spTree>
-    <p:extLst>
-      <p:ext uri="{BB962C8B-B14F-4D97-AF65-F5344CB8AC3E}">
-        <p14:creationId xmlns:p14="http://schemas.microsoft.com/office/powerpoint/2010/main" val="347362202"/>
-      </p:ext>
-    </p:extLst>
-  </p:cSld>
-  <p:clrMap bg1="lt1" tx1="dk1" bg2="lt2" tx2="dk2" accent1="accent1" accent2="accent2" accent3="accent3" accent4="accent4" accent5="accent5" accent6="accent6" hlink="hlink" folHlink="folHlink"/>
-  <p:notesStyle>
-    <a:lvl1pPr marL="0" algn="l" defTabSz="914400" rtl="0" eaLnBrk="1" latinLnBrk="0" hangingPunct="1">
-      <a:defRPr sz="1200" kern="1200">
-        <a:solidFill>
-          <a:schemeClr val="tx1"/>
-        </a:solidFill>
-        <a:latin typeface="+mn-lt"/>
-        <a:ea typeface="+mn-ea"/>
-        <a:cs typeface="+mn-cs"/>
-      </a:defRPr>
-    </a:lvl1pPr>
-    <a:lvl2pPr marL="457200" algn="l" defTabSz="914400" rtl="0" eaLnBrk="1" latinLnBrk="0" hangingPunct="1">
-      <a:defRPr sz="1200" kern="1200">
-        <a:solidFill>
-          <a:schemeClr val="tx1"/>
-        </a:solidFill>
-        <a:latin typeface="+mn-lt"/>
-        <a:ea typeface="+mn-ea"/>
-        <a:cs typeface="+mn-cs"/>
-      </a:defRPr>
-    </a:lvl2pPr>
-    <a:lvl3pPr marL="914400" algn="l" defTabSz="914400" rtl="0" eaLnBrk="1" latinLnBrk="0" hangingPunct="1">
-      <a:defRPr sz="1200" kern="1200">
-        <a:solidFill>
-          <a:schemeClr val="tx1"/>
-        </a:solidFill>
-        <a:latin typeface="+mn-lt"/>
-        <a:ea typeface="+mn-ea"/>
-        <a:cs typeface="+mn-cs"/>
-      </a:defRPr>
-    </a:lvl3pPr>
-    <a:lvl4pPr marL="1371600" algn="l" defTabSz="914400" rtl="0" eaLnBrk="1" latinLnBrk="0" hangingPunct="1">
-      <a:defRPr sz="1200" kern="1200">
-        <a:solidFill>
-          <a:schemeClr val="tx1"/>
-        </a:solidFill>
-        <a:latin typeface="+mn-lt"/>
-        <a:ea typeface="+mn-ea"/>
-        <a:cs typeface="+mn-cs"/>
-      </a:defRPr>
-    </a:lvl4pPr>
-    <a:lvl5pPr marL="1828800" algn="l" defTabSz="914400" rtl="0" eaLnBrk="1" latinLnBrk="0" hangingPunct="1">
-      <a:defRPr sz="1200" kern="1200">
-        <a:solidFill>
-          <a:schemeClr val="tx1"/>
-        </a:solidFill>
-        <a:latin typeface="+mn-lt"/>
-        <a:ea typeface="+mn-ea"/>
-        <a:cs typeface="+mn-cs"/>
-      </a:defRPr>
-    </a:lvl5pPr>
-    <a:lvl6pPr marL="2286000" algn="l" defTabSz="914400" rtl="0" eaLnBrk="1" latinLnBrk="0" hangingPunct="1">
-      <a:defRPr sz="1200" kern="1200">
-        <a:solidFill>
-          <a:schemeClr val="tx1"/>
-        </a:solidFill>
-        <a:latin typeface="+mn-lt"/>
-        <a:ea typeface="+mn-ea"/>
-        <a:cs typeface="+mn-cs"/>
-      </a:defRPr>
-    </a:lvl6pPr>
-    <a:lvl7pPr marL="2743200" algn="l" defTabSz="914400" rtl="0" eaLnBrk="1" latinLnBrk="0" hangingPunct="1">
-      <a:defRPr sz="1200" kern="1200">
-        <a:solidFill>
-          <a:schemeClr val="tx1"/>
-        </a:solidFill>
-        <a:latin typeface="+mn-lt"/>
-        <a:ea typeface="+mn-ea"/>
-        <a:cs typeface="+mn-cs"/>
-      </a:defRPr>
-    </a:lvl7pPr>
-    <a:lvl8pPr marL="3200400" algn="l" defTabSz="914400" rtl="0" eaLnBrk="1" latinLnBrk="0" hangingPunct="1">
-      <a:defRPr sz="1200" kern="1200">
-        <a:solidFill>
-          <a:schemeClr val="tx1"/>
-        </a:solidFill>
-        <a:latin typeface="+mn-lt"/>
-        <a:ea typeface="+mn-ea"/>
-        <a:cs typeface="+mn-cs"/>
-      </a:defRPr>
-    </a:lvl8pPr>
-    <a:lvl9pPr marL="3657600" algn="l" defTabSz="914400" rtl="0" eaLnBrk="1" latinLnBrk="0" hangingPunct="1">
-      <a:defRPr sz="1200" kern="1200">
-        <a:solidFill>
-          <a:schemeClr val="tx1"/>
-        </a:solidFill>
-        <a:latin typeface="+mn-lt"/>
-        <a:ea typeface="+mn-ea"/>
-        <a:cs typeface="+mn-cs"/>
-      </a:defRPr>
-    </a:lvl9pPr>
-  </p:notesStyle>
-</p:notesMaster>
-</file>
-
-<file path=ppt/notesSlides/notesSlide1.xml><?xml version="1.0" encoding="utf-8"?>
-<p:notes xmlns:a="http://schemas.openxmlformats.org/drawingml/2006/main" xmlns:r="http://schemas.openxmlformats.org/officeDocument/2006/relationships" xmlns:p="http://schemas.openxmlformats.org/presentationml/2006/main">
-  <p:cSld>
-    <p:spTree>
-      <p:nvGrpSpPr>
-        <p:cNvPr id="1" name=""/>
-        <p:cNvGrpSpPr/>
-        <p:nvPr/>
-      </p:nvGrpSpPr>
-      <p:grpSpPr>
-        <a:xfrm>
-          <a:off x="0" y="0"/>
-          <a:ext cx="0" cy="0"/>
-          <a:chOff x="0" y="0"/>
-          <a:chExt cx="0" cy="0"/>
-        </a:xfrm>
-      </p:grpSpPr>
-      <p:sp>
-        <p:nvSpPr>
-          <p:cNvPr id="2" name="Slide Image Placeholder 1"/>
-          <p:cNvSpPr>
-            <a:spLocks noGrp="1" noRot="1" noChangeAspect="1"/>
-          </p:cNvSpPr>
-          <p:nvPr>
-            <p:ph type="sldImg"/>
-          </p:nvPr>
-        </p:nvSpPr>
-        <p:spPr/>
-      </p:sp>
-      <p:sp>
-        <p:nvSpPr>
-          <p:cNvPr id="3" name="Notes Placeholder 2"/>
-          <p:cNvSpPr>
-            <a:spLocks noGrp="1"/>
-          </p:cNvSpPr>
-          <p:nvPr>
-            <p:ph type="body" idx="1"/>
-          </p:nvPr>
-        </p:nvSpPr>
-        <p:spPr/>
-        <p:txBody>
-          <a:bodyPr/>
-          <a:lstStyle/>
-          <a:p>
-            <a:r>
-              <a:rPr lang="en-US" dirty="0" smtClean="0"/>
-              <a:t>Our initial step was to download “raw” file from the NYT, where each grab pulled down 20 documents.</a:t>
-            </a:r>
-          </a:p>
-          <a:p>
-            <a:endParaRPr lang="en-US" dirty="0" smtClean="0"/>
-          </a:p>
-          <a:p>
-            <a:r>
-              <a:rPr lang="en-US" dirty="0" smtClean="0"/>
-              <a:t>$source and $section</a:t>
-            </a:r>
-            <a:r>
-              <a:rPr lang="en-US" baseline="0" dirty="0" smtClean="0"/>
-              <a:t> were set to “all”, to just grab everything</a:t>
-            </a:r>
-          </a:p>
-          <a:p>
-            <a:endParaRPr lang="en-US" baseline="0" dirty="0" smtClean="0"/>
-          </a:p>
-          <a:p>
-            <a:r>
-              <a:rPr lang="en-US" dirty="0" smtClean="0"/>
-              <a:t>IF</a:t>
-            </a:r>
-            <a:r>
-              <a:rPr lang="en-US" baseline="0" dirty="0" smtClean="0"/>
-              <a:t> you don’t base64_encode </a:t>
-            </a:r>
-            <a:r>
-              <a:rPr lang="en-US" baseline="0" dirty="0" err="1" smtClean="0"/>
-              <a:t>sphp</a:t>
-            </a:r>
-            <a:r>
-              <a:rPr lang="en-US" baseline="0" dirty="0" smtClean="0"/>
-              <a:t> files, transferring can corrupt…</a:t>
-            </a:r>
-            <a:endParaRPr lang="en-US" dirty="0"/>
-          </a:p>
-        </p:txBody>
-      </p:sp>
-      <p:sp>
-        <p:nvSpPr>
-          <p:cNvPr id="4" name="Slide Number Placeholder 3"/>
-          <p:cNvSpPr>
-            <a:spLocks noGrp="1"/>
-          </p:cNvSpPr>
-          <p:nvPr>
-            <p:ph type="sldNum" sz="quarter" idx="10"/>
-          </p:nvPr>
-        </p:nvSpPr>
-        <p:spPr/>
-        <p:txBody>
-          <a:bodyPr/>
-          <a:lstStyle/>
-          <a:p>
-            <a:fld id="{7ABBC0B4-C33E-46CE-9706-C9D67F40DB9D}" type="slidenum">
-              <a:rPr lang="en-US" smtClean="0"/>
-              <a:t>2</a:t>
-            </a:fld>
-            <a:endParaRPr lang="en-US"/>
-          </a:p>
-        </p:txBody>
-      </p:sp>
-    </p:spTree>
-    <p:extLst>
-      <p:ext uri="{BB962C8B-B14F-4D97-AF65-F5344CB8AC3E}">
-        <p14:creationId xmlns:p14="http://schemas.microsoft.com/office/powerpoint/2010/main" val="3287877424"/>
-      </p:ext>
-    </p:extLst>
-  </p:cSld>
-  <p:clrMapOvr>
-    <a:masterClrMapping/>
-  </p:clrMapOvr>
-</p:notes>
-</file>
-
-<file path=ppt/notesSlides/notesSlide2.xml><?xml version="1.0" encoding="utf-8"?>
-<p:notes xmlns:a="http://schemas.openxmlformats.org/drawingml/2006/main" xmlns:r="http://schemas.openxmlformats.org/officeDocument/2006/relationships" xmlns:p="http://schemas.openxmlformats.org/presentationml/2006/main">
-  <p:cSld>
-    <p:spTree>
-      <p:nvGrpSpPr>
-        <p:cNvPr id="1" name=""/>
-        <p:cNvGrpSpPr/>
-        <p:nvPr/>
-      </p:nvGrpSpPr>
-      <p:grpSpPr>
-        <a:xfrm>
-          <a:off x="0" y="0"/>
-          <a:ext cx="0" cy="0"/>
-          <a:chOff x="0" y="0"/>
-          <a:chExt cx="0" cy="0"/>
-        </a:xfrm>
-      </p:grpSpPr>
-      <p:sp>
-        <p:nvSpPr>
-          <p:cNvPr id="2" name="Slide Image Placeholder 1"/>
-          <p:cNvSpPr>
-            <a:spLocks noGrp="1" noRot="1" noChangeAspect="1"/>
-          </p:cNvSpPr>
-          <p:nvPr>
-            <p:ph type="sldImg"/>
-          </p:nvPr>
-        </p:nvSpPr>
-        <p:spPr/>
-      </p:sp>
-      <p:sp>
-        <p:nvSpPr>
-          <p:cNvPr id="3" name="Notes Placeholder 2"/>
-          <p:cNvSpPr>
-            <a:spLocks noGrp="1"/>
-          </p:cNvSpPr>
-          <p:nvPr>
-            <p:ph type="body" idx="1"/>
-          </p:nvPr>
-        </p:nvSpPr>
-        <p:spPr/>
-        <p:txBody>
-          <a:bodyPr/>
-          <a:lstStyle/>
-          <a:p>
-            <a:r>
-              <a:rPr lang="en-US" dirty="0" smtClean="0"/>
-              <a:t>42 Sections total.</a:t>
-            </a:r>
-          </a:p>
-          <a:p>
-            <a:endParaRPr lang="en-US" dirty="0" smtClean="0"/>
-          </a:p>
-          <a:p>
-            <a:r>
-              <a:rPr lang="en-US" dirty="0" smtClean="0"/>
-              <a:t>Notice that (blank) is just under 1000 of the documents.</a:t>
-            </a:r>
-            <a:endParaRPr lang="en-US" dirty="0"/>
-          </a:p>
-        </p:txBody>
-      </p:sp>
-      <p:sp>
-        <p:nvSpPr>
-          <p:cNvPr id="4" name="Slide Number Placeholder 3"/>
-          <p:cNvSpPr>
-            <a:spLocks noGrp="1"/>
-          </p:cNvSpPr>
-          <p:nvPr>
-            <p:ph type="sldNum" sz="quarter" idx="10"/>
-          </p:nvPr>
-        </p:nvSpPr>
-        <p:spPr/>
-        <p:txBody>
-          <a:bodyPr/>
-          <a:lstStyle/>
-          <a:p>
-            <a:fld id="{7ABBC0B4-C33E-46CE-9706-C9D67F40DB9D}" type="slidenum">
-              <a:rPr lang="en-US" smtClean="0"/>
-              <a:t>4</a:t>
-            </a:fld>
-            <a:endParaRPr lang="en-US"/>
-          </a:p>
-        </p:txBody>
-      </p:sp>
-    </p:spTree>
-    <p:extLst>
-      <p:ext uri="{BB962C8B-B14F-4D97-AF65-F5344CB8AC3E}">
-        <p14:creationId xmlns:p14="http://schemas.microsoft.com/office/powerpoint/2010/main" val="2447325274"/>
-      </p:ext>
-    </p:extLst>
-  </p:cSld>
-  <p:clrMapOvr>
-    <a:masterClrMapping/>
-  </p:clrMapOvr>
-</p:notes>
 </file>
 
 <file path=ppt/slideLayouts/slideLayout1.xml><?xml version="1.0" encoding="utf-8"?>
@@ -2908,7 +1953,7 @@
             <a:fld id="{E30E2307-1E40-4E12-8716-25BFDA8E7013}" type="datetime1">
               <a:rPr lang="en-US" smtClean="0"/>
               <a:pPr/>
-              <a:t>10/17/2014</a:t>
+              <a:t>10/15/14</a:t>
             </a:fld>
             <a:endParaRPr lang="en-US"/>
           </a:p>
@@ -3091,7 +2136,7 @@
             <a:fld id="{E5CFCF5A-EA79-452C-A52C-1A2668C2E7DF}" type="datetime1">
               <a:rPr lang="en-US" smtClean="0"/>
               <a:pPr/>
-              <a:t>10/17/2014</a:t>
+              <a:t>10/15/14</a:t>
             </a:fld>
             <a:endParaRPr lang="en-US"/>
           </a:p>
@@ -3244,7 +2289,7 @@
             <a:fld id="{2E5C4C28-BD4B-4892-9A2D-6E19BD753A9A}" type="datetime1">
               <a:rPr lang="en-US" smtClean="0"/>
               <a:pPr/>
-              <a:t>10/17/2014</a:t>
+              <a:t>10/15/14</a:t>
             </a:fld>
             <a:endParaRPr lang="en-US"/>
           </a:p>
@@ -5072,7 +4117,7 @@
             <a:fld id="{61FD9D02-426E-46C9-9EE9-0DE1EF8B2838}" type="datetime1">
               <a:rPr lang="en-US" smtClean="0"/>
               <a:pPr/>
-              <a:t>10/17/2014</a:t>
+              <a:t>10/15/14</a:t>
             </a:fld>
             <a:endParaRPr lang="en-US"/>
           </a:p>
@@ -6944,7 +5989,7 @@
             <a:fld id="{7B8AEBBE-F8B2-42CF-9895-E86A608384EB}" type="datetime1">
               <a:rPr lang="en-US" smtClean="0"/>
               <a:pPr/>
-              <a:t>10/17/2014</a:t>
+              <a:t>10/15/14</a:t>
             </a:fld>
             <a:endParaRPr lang="en-US"/>
           </a:p>
@@ -7059,7 +6104,7 @@
             <a:fld id="{E1FAA6B6-10E5-4810-BC9F-DA72D8452E73}" type="datetime1">
               <a:rPr lang="en-US" smtClean="0"/>
               <a:pPr/>
-              <a:t>10/17/2014</a:t>
+              <a:t>10/15/14</a:t>
             </a:fld>
             <a:endParaRPr lang="en-US"/>
           </a:p>
@@ -7602,7 +6647,7 @@
             <a:fld id="{6D18D072-EF12-4AA2-BD71-ABC68B06D0E2}" type="datetime1">
               <a:rPr lang="en-US" smtClean="0"/>
               <a:pPr/>
-              <a:t>10/17/2014</a:t>
+              <a:t>10/15/14</a:t>
             </a:fld>
             <a:endParaRPr lang="en-US"/>
           </a:p>
@@ -7717,7 +6762,7 @@
             <a:fld id="{B8CDBF60-6CC3-4B74-A60D-3486985E4346}" type="datetime1">
               <a:rPr lang="en-US" smtClean="0"/>
               <a:pPr/>
-              <a:t>10/17/2014</a:t>
+              <a:t>10/15/14</a:t>
             </a:fld>
             <a:endParaRPr lang="en-US"/>
           </a:p>
@@ -9430,7 +8475,7 @@
             <a:fld id="{22714818-984F-4759-BF72-A33BDC1963BD}" type="datetime1">
               <a:rPr lang="en-US" smtClean="0"/>
               <a:pPr/>
-              <a:t>10/17/2014</a:t>
+              <a:t>10/15/14</a:t>
             </a:fld>
             <a:endParaRPr lang="en-US"/>
           </a:p>
@@ -9583,7 +8628,7 @@
             <a:fld id="{9EA7E191-5F94-4FC1-B823-BD7CABF7FA06}" type="datetime1">
               <a:rPr lang="en-US" smtClean="0"/>
               <a:pPr/>
-              <a:t>10/17/2014</a:t>
+              <a:t>10/15/14</a:t>
             </a:fld>
             <a:endParaRPr lang="en-US"/>
           </a:p>
@@ -13200,7 +12245,7 @@
             <a:fld id="{88856D55-EFBE-4F9B-8A5F-09D42CA22A9B}" type="datetime1">
               <a:rPr lang="en-US" smtClean="0"/>
               <a:pPr/>
-              <a:t>10/17/2014</a:t>
+              <a:t>10/15/14</a:t>
             </a:fld>
             <a:endParaRPr lang="en-US"/>
           </a:p>
@@ -15061,7 +14106,7 @@
             <a:fld id="{9D1D110F-3F4E-48D9-B8AA-5D0E825AFDBA}" type="datetime1">
               <a:rPr lang="en-US" smtClean="0"/>
               <a:pPr/>
-              <a:t>10/17/2014</a:t>
+              <a:t>10/15/14</a:t>
             </a:fld>
             <a:endParaRPr lang="en-US"/>
           </a:p>
@@ -15597,12 +14642,8 @@
           <a:lstStyle/>
           <a:p>
             <a:r>
-              <a:rPr lang="en-US" dirty="0"/>
-              <a:t>Clustering Abstracts </a:t>
-            </a:r>
-            <a:r>
               <a:rPr lang="en-US" dirty="0" smtClean="0"/>
-              <a:t>of the  New </a:t>
+              <a:t>Abstracts Clustering of the  New </a:t>
             </a:r>
             <a:r>
               <a:rPr lang="en-US" dirty="0"/>
@@ -15628,27 +14669,31 @@
         </p:nvSpPr>
         <p:spPr/>
         <p:txBody>
-          <a:bodyPr>
-            <a:normAutofit/>
-          </a:bodyPr>
+          <a:bodyPr/>
           <a:lstStyle/>
-          <a:p>
-            <a:endParaRPr lang="en-US" dirty="0" smtClean="0"/>
-          </a:p>
           <a:p>
             <a:r>
               <a:rPr lang="en-US" dirty="0" smtClean="0"/>
-              <a:t>Matthew Letter </a:t>
-            </a:r>
-            <a:r>
-              <a:rPr lang="en-US" dirty="0" smtClean="0"/>
-              <a:t>&amp; Daniel </a:t>
+              <a:t>Daniel </a:t>
             </a:r>
             <a:r>
               <a:rPr lang="en-US" dirty="0" err="1" smtClean="0"/>
               <a:t>Waybright</a:t>
             </a:r>
             <a:endParaRPr lang="en-US" dirty="0" smtClean="0"/>
+          </a:p>
+          <a:p>
+            <a:r>
+              <a:rPr lang="en-US" dirty="0" smtClean="0"/>
+              <a:t>&amp;</a:t>
+            </a:r>
+          </a:p>
+          <a:p>
+            <a:r>
+              <a:rPr lang="en-US" dirty="0" smtClean="0"/>
+              <a:t>Matthew Letter</a:t>
+            </a:r>
+            <a:endParaRPr lang="en-US" dirty="0"/>
           </a:p>
         </p:txBody>
       </p:sp>
@@ -15662,119 +14707,10 @@
   <p:clrMapOvr>
     <a:masterClrMapping/>
   </p:clrMapOvr>
-  <p:timing>
-    <p:tnLst>
-      <p:par>
-        <p:cTn id="1" dur="indefinite" restart="never" nodeType="tmRoot"/>
-      </p:par>
-    </p:tnLst>
-  </p:timing>
 </p:sld>
 </file>
 
 <file path=ppt/slides/slide10.xml><?xml version="1.0" encoding="utf-8"?>
-<p:sld xmlns:a="http://schemas.openxmlformats.org/drawingml/2006/main" xmlns:r="http://schemas.openxmlformats.org/officeDocument/2006/relationships" xmlns:p="http://schemas.openxmlformats.org/presentationml/2006/main">
-  <p:cSld>
-    <p:spTree>
-      <p:nvGrpSpPr>
-        <p:cNvPr id="1" name=""/>
-        <p:cNvGrpSpPr/>
-        <p:nvPr/>
-      </p:nvGrpSpPr>
-      <p:grpSpPr>
-        <a:xfrm>
-          <a:off x="0" y="0"/>
-          <a:ext cx="0" cy="0"/>
-          <a:chOff x="0" y="0"/>
-          <a:chExt cx="0" cy="0"/>
-        </a:xfrm>
-      </p:grpSpPr>
-      <p:sp>
-        <p:nvSpPr>
-          <p:cNvPr id="2" name="Content Placeholder 1"/>
-          <p:cNvSpPr>
-            <a:spLocks noGrp="1"/>
-          </p:cNvSpPr>
-          <p:nvPr>
-            <p:ph idx="1"/>
-          </p:nvPr>
-        </p:nvSpPr>
-        <p:spPr/>
-        <p:txBody>
-          <a:bodyPr/>
-          <a:lstStyle/>
-          <a:p>
-            <a:endParaRPr lang="en-US"/>
-          </a:p>
-        </p:txBody>
-      </p:sp>
-      <p:sp>
-        <p:nvSpPr>
-          <p:cNvPr id="3" name="Title 2"/>
-          <p:cNvSpPr>
-            <a:spLocks noGrp="1"/>
-          </p:cNvSpPr>
-          <p:nvPr>
-            <p:ph type="title"/>
-          </p:nvPr>
-        </p:nvSpPr>
-        <p:spPr/>
-        <p:txBody>
-          <a:bodyPr>
-            <a:normAutofit fontScale="90000"/>
-          </a:bodyPr>
-          <a:lstStyle/>
-          <a:p>
-            <a:r>
-              <a:rPr lang="en-US" dirty="0"/>
-              <a:t>20 </a:t>
-            </a:r>
-            <a:r>
-              <a:rPr lang="en-US" dirty="0" smtClean="0"/>
-              <a:t>Most </a:t>
-            </a:r>
-            <a:r>
-              <a:rPr lang="en-US" dirty="0"/>
-              <a:t>D</a:t>
-            </a:r>
-            <a:r>
-              <a:rPr lang="en-US" dirty="0" smtClean="0"/>
-              <a:t>iscriminative </a:t>
-            </a:r>
-            <a:r>
-              <a:rPr lang="en-US" dirty="0"/>
-              <a:t>T</a:t>
-            </a:r>
-            <a:r>
-              <a:rPr lang="en-US" dirty="0" smtClean="0"/>
-              <a:t>erms </a:t>
-            </a:r>
-            <a:r>
-              <a:rPr lang="en-US"/>
-              <a:t>per C</a:t>
-            </a:r>
-            <a:r>
-              <a:rPr lang="en-US" smtClean="0"/>
-              <a:t>luster</a:t>
-            </a:r>
-            <a:endParaRPr lang="en-US" dirty="0"/>
-          </a:p>
-        </p:txBody>
-      </p:sp>
-    </p:spTree>
-    <p:extLst>
-      <p:ext uri="{BB962C8B-B14F-4D97-AF65-F5344CB8AC3E}">
-        <p14:creationId xmlns:p14="http://schemas.microsoft.com/office/powerpoint/2010/main" val="1381074220"/>
-      </p:ext>
-    </p:extLst>
-  </p:cSld>
-  <p:clrMapOvr>
-    <a:masterClrMapping/>
-  </p:clrMapOvr>
-</p:sld>
-</file>
-
-<file path=ppt/slides/slide11.xml><?xml version="1.0" encoding="utf-8"?>
 <p:sld xmlns:a="http://schemas.openxmlformats.org/drawingml/2006/main" xmlns:r="http://schemas.openxmlformats.org/officeDocument/2006/relationships" xmlns:p="http://schemas.openxmlformats.org/presentationml/2006/main">
   <p:cSld>
     <p:spTree>
@@ -15845,7 +14781,11 @@
             </a:r>
             <a:r>
               <a:rPr lang="en-US" dirty="0"/>
-              <a:t>and T</a:t>
+              <a:t>and </a:t>
+            </a:r>
+            <a:r>
+              <a:rPr lang="en-US" dirty="0"/>
+              <a:t>T</a:t>
             </a:r>
             <a:r>
               <a:rPr lang="en-US" dirty="0" smtClean="0"/>
@@ -15897,124 +14837,12 @@
         </p:nvSpPr>
         <p:spPr/>
         <p:txBody>
-          <a:bodyPr>
-            <a:normAutofit lnSpcReduction="10000"/>
-          </a:bodyPr>
+          <a:bodyPr/>
           <a:lstStyle/>
-          <a:p>
-            <a:r>
-              <a:rPr lang="en-US" dirty="0" smtClean="0"/>
-              <a:t>Anatomy of a Request</a:t>
-            </a:r>
-          </a:p>
           <a:p>
             <a:pPr marL="0" indent="0">
               <a:buNone/>
             </a:pPr>
-            <a:r>
-              <a:rPr lang="en-US" sz="2000" dirty="0"/>
-              <a:t>$URL = $</a:t>
-            </a:r>
-            <a:r>
-              <a:rPr lang="en-US" sz="2000" dirty="0" err="1"/>
-              <a:t>baseURL</a:t>
-            </a:r>
-            <a:r>
-              <a:rPr lang="en-US" sz="2000" dirty="0"/>
-              <a:t> . $</a:t>
-            </a:r>
-            <a:r>
-              <a:rPr lang="en-US" sz="2000" dirty="0" smtClean="0"/>
-              <a:t>source </a:t>
-            </a:r>
-            <a:r>
-              <a:rPr lang="en-US" sz="2000" dirty="0"/>
-              <a:t>. $section . $format . "?" . $offset . $</a:t>
-            </a:r>
-            <a:r>
-              <a:rPr lang="en-US" sz="2000" dirty="0" smtClean="0"/>
-              <a:t>key;</a:t>
-            </a:r>
-          </a:p>
-          <a:p>
-            <a:pPr marL="0" indent="0">
-              <a:buNone/>
-            </a:pPr>
-            <a:r>
-              <a:rPr lang="en-US" sz="2000" dirty="0"/>
-              <a:t>$raw = @</a:t>
-            </a:r>
-            <a:r>
-              <a:rPr lang="en-US" sz="2000" dirty="0" err="1"/>
-              <a:t>file_get_contents</a:t>
-            </a:r>
-            <a:r>
-              <a:rPr lang="en-US" sz="2000" dirty="0"/>
-              <a:t>( $URL </a:t>
-            </a:r>
-            <a:r>
-              <a:rPr lang="en-US" sz="2000" dirty="0" smtClean="0"/>
-              <a:t>);</a:t>
-            </a:r>
-          </a:p>
-          <a:p>
-            <a:pPr marL="0" indent="0">
-              <a:buNone/>
-            </a:pPr>
-            <a:r>
-              <a:rPr lang="en-US" sz="2000" dirty="0" smtClean="0"/>
-              <a:t>$response = </a:t>
-            </a:r>
-            <a:r>
-              <a:rPr lang="en-US" sz="2000" dirty="0" err="1" smtClean="0"/>
-              <a:t>unserialize</a:t>
-            </a:r>
-            <a:r>
-              <a:rPr lang="en-US" sz="2000" dirty="0" smtClean="0"/>
-              <a:t>( $raw );</a:t>
-            </a:r>
-          </a:p>
-          <a:p>
-            <a:pPr marL="0" indent="0">
-              <a:buNone/>
-            </a:pPr>
-            <a:endParaRPr lang="en-US" sz="2000" dirty="0"/>
-          </a:p>
-          <a:p>
-            <a:r>
-              <a:rPr lang="en-US" dirty="0" smtClean="0"/>
-              <a:t>Reattempt if encounter errors</a:t>
-            </a:r>
-          </a:p>
-          <a:p>
-            <a:pPr marL="0" indent="0">
-              <a:buNone/>
-            </a:pPr>
-            <a:r>
-              <a:rPr lang="en-US" sz="2000" dirty="0" smtClean="0"/>
-              <a:t>if</a:t>
-            </a:r>
-            <a:r>
-              <a:rPr lang="en-US" sz="2000" dirty="0"/>
-              <a:t>( $response["status"] == "OK" ) </a:t>
-            </a:r>
-            <a:r>
-              <a:rPr lang="en-US" sz="2000" dirty="0" smtClean="0"/>
-              <a:t>{ … }</a:t>
-            </a:r>
-            <a:endParaRPr lang="en-US" sz="2000" dirty="0"/>
-          </a:p>
-          <a:p>
-            <a:pPr marL="0" indent="0">
-              <a:buNone/>
-            </a:pPr>
-            <a:endParaRPr lang="en-US" sz="2000" dirty="0" smtClean="0"/>
-          </a:p>
-          <a:p>
-            <a:r>
-              <a:rPr lang="en-US" dirty="0" smtClean="0"/>
-              <a:t>Store all raw files!!!</a:t>
-            </a:r>
             <a:endParaRPr lang="en-US" dirty="0"/>
           </a:p>
         </p:txBody>
@@ -16060,13 +14888,6 @@
   <p:clrMapOvr>
     <a:masterClrMapping/>
   </p:clrMapOvr>
-  <p:timing>
-    <p:tnLst>
-      <p:par>
-        <p:cTn id="1" dur="indefinite" restart="never" nodeType="tmRoot"/>
-      </p:par>
-    </p:tnLst>
-  </p:timing>
 </p:sld>
 </file>
 
@@ -16099,33 +14920,9 @@
         </p:nvSpPr>
         <p:spPr/>
         <p:txBody>
-          <a:bodyPr>
-            <a:normAutofit lnSpcReduction="10000"/>
-          </a:bodyPr>
+          <a:bodyPr/>
           <a:lstStyle/>
           <a:p>
-            <a:r>
-              <a:rPr lang="en-US" dirty="0" smtClean="0"/>
-              <a:t>Combine all raw files into a single PHP array where the URL is the “unique” key, thereby eliminating duplicates.</a:t>
-            </a:r>
-          </a:p>
-          <a:p>
-            <a:endParaRPr lang="en-US" dirty="0" smtClean="0"/>
-          </a:p>
-          <a:p>
-            <a:r>
-              <a:rPr lang="en-US" dirty="0" smtClean="0"/>
-              <a:t>We then mapped each URL to a unique numerical ID, and output a file containing the abstract and has the ID as filename.</a:t>
-            </a:r>
-          </a:p>
-          <a:p>
-            <a:endParaRPr lang="en-US" dirty="0"/>
-          </a:p>
-          <a:p>
-            <a:r>
-              <a:rPr lang="en-US" dirty="0" smtClean="0"/>
-              <a:t>Downloaded a combined 41,116 unique documents.</a:t>
-            </a:r>
             <a:endParaRPr lang="en-US" dirty="0"/>
           </a:p>
         </p:txBody>
@@ -16163,78 +14960,10 @@
   <p:clrMapOvr>
     <a:masterClrMapping/>
   </p:clrMapOvr>
-  <p:timing>
-    <p:tnLst>
-      <p:par>
-        <p:cTn id="1" dur="indefinite" restart="never" nodeType="tmRoot"/>
-      </p:par>
-    </p:tnLst>
-  </p:timing>
 </p:sld>
 </file>
 
 <file path=ppt/slides/slide4.xml><?xml version="1.0" encoding="utf-8"?>
-<p:sld xmlns:a="http://schemas.openxmlformats.org/drawingml/2006/main" xmlns:r="http://schemas.openxmlformats.org/officeDocument/2006/relationships" xmlns:p="http://schemas.openxmlformats.org/presentationml/2006/main">
-  <p:cSld>
-    <p:spTree>
-      <p:nvGrpSpPr>
-        <p:cNvPr id="1" name=""/>
-        <p:cNvGrpSpPr/>
-        <p:nvPr/>
-      </p:nvGrpSpPr>
-      <p:grpSpPr>
-        <a:xfrm>
-          <a:off x="0" y="0"/>
-          <a:ext cx="0" cy="0"/>
-          <a:chOff x="0" y="0"/>
-          <a:chExt cx="0" cy="0"/>
-        </a:xfrm>
-      </p:grpSpPr>
-      <p:graphicFrame>
-        <p:nvGraphicFramePr>
-          <p:cNvPr id="4" name="Chart 3"/>
-          <p:cNvGraphicFramePr>
-            <a:graphicFrameLocks/>
-          </p:cNvGraphicFramePr>
-          <p:nvPr>
-            <p:extLst>
-              <p:ext uri="{D42A27DB-BD31-4B8C-83A1-F6EECF244321}">
-                <p14:modId xmlns:p14="http://schemas.microsoft.com/office/powerpoint/2010/main" val="3241117351"/>
-              </p:ext>
-            </p:extLst>
-          </p:nvPr>
-        </p:nvGraphicFramePr>
-        <p:xfrm>
-          <a:off x="0" y="1366574"/>
-          <a:ext cx="9144000" cy="5395966"/>
-        </p:xfrm>
-        <a:graphic>
-          <a:graphicData uri="http://schemas.openxmlformats.org/drawingml/2006/chart">
-            <c:chart xmlns:c="http://schemas.openxmlformats.org/drawingml/2006/chart" xmlns:r="http://schemas.openxmlformats.org/officeDocument/2006/relationships" r:id="rId3"/>
-          </a:graphicData>
-        </a:graphic>
-      </p:graphicFrame>
-    </p:spTree>
-    <p:extLst>
-      <p:ext uri="{BB962C8B-B14F-4D97-AF65-F5344CB8AC3E}">
-        <p14:creationId xmlns:p14="http://schemas.microsoft.com/office/powerpoint/2010/main" val="1658881212"/>
-      </p:ext>
-    </p:extLst>
-  </p:cSld>
-  <p:clrMapOvr>
-    <a:masterClrMapping/>
-  </p:clrMapOvr>
-  <p:timing>
-    <p:tnLst>
-      <p:par>
-        <p:cTn id="1" dur="indefinite" restart="never" nodeType="tmRoot"/>
-      </p:par>
-    </p:tnLst>
-  </p:timing>
-</p:sld>
-</file>
-
-<file path=ppt/slides/slide5.xml><?xml version="1.0" encoding="utf-8"?>
 <p:sld xmlns:a="http://schemas.openxmlformats.org/drawingml/2006/main" xmlns:r="http://schemas.openxmlformats.org/officeDocument/2006/relationships" xmlns:p="http://schemas.openxmlformats.org/presentationml/2006/main">
   <p:cSld>
     <p:spTree>
@@ -16266,11 +14995,7 @@
           <a:bodyPr/>
           <a:lstStyle/>
           <a:p>
-            <a:r>
-              <a:rPr lang="en-US" dirty="0" smtClean="0"/>
-              <a:t>Porter Stemmer in Java</a:t>
-            </a:r>
-            <a:endParaRPr lang="en-US" dirty="0"/>
+            <a:endParaRPr lang="en-US"/>
           </a:p>
         </p:txBody>
       </p:sp>
@@ -16319,17 +15044,10 @@
   <p:clrMapOvr>
     <a:masterClrMapping/>
   </p:clrMapOvr>
-  <p:timing>
-    <p:tnLst>
-      <p:par>
-        <p:cTn id="1" dur="indefinite" restart="never" nodeType="tmRoot"/>
-      </p:par>
-    </p:tnLst>
-  </p:timing>
 </p:sld>
 </file>
 
-<file path=ppt/slides/slide6.xml><?xml version="1.0" encoding="utf-8"?>
+<file path=ppt/slides/slide5.xml><?xml version="1.0" encoding="utf-8"?>
 <p:sld xmlns:a="http://schemas.openxmlformats.org/drawingml/2006/main" xmlns:r="http://schemas.openxmlformats.org/officeDocument/2006/relationships" xmlns:p="http://schemas.openxmlformats.org/presentationml/2006/main">
   <p:cSld>
     <p:spTree>
@@ -16402,17 +15120,10 @@
   <p:clrMapOvr>
     <a:masterClrMapping/>
   </p:clrMapOvr>
-  <p:timing>
-    <p:tnLst>
-      <p:par>
-        <p:cTn id="1" dur="indefinite" restart="never" nodeType="tmRoot"/>
-      </p:par>
-    </p:tnLst>
-  </p:timing>
 </p:sld>
 </file>
 
-<file path=ppt/slides/slide7.xml><?xml version="1.0" encoding="utf-8"?>
+<file path=ppt/slides/slide6.xml><?xml version="1.0" encoding="utf-8"?>
 <p:sld xmlns:a="http://schemas.openxmlformats.org/drawingml/2006/main" xmlns:r="http://schemas.openxmlformats.org/officeDocument/2006/relationships" xmlns:p="http://schemas.openxmlformats.org/presentationml/2006/main">
   <p:cSld>
     <p:spTree>
@@ -16507,17 +15218,10 @@
   <p:clrMapOvr>
     <a:masterClrMapping/>
   </p:clrMapOvr>
-  <p:timing>
-    <p:tnLst>
-      <p:par>
-        <p:cTn id="1" dur="indefinite" restart="never" nodeType="tmRoot"/>
-      </p:par>
-    </p:tnLst>
-  </p:timing>
 </p:sld>
 </file>
 
-<file path=ppt/slides/slide8.xml><?xml version="1.0" encoding="utf-8"?>
+<file path=ppt/slides/slide7.xml><?xml version="1.0" encoding="utf-8"?>
 <p:sld xmlns:a="http://schemas.openxmlformats.org/drawingml/2006/main" xmlns:r="http://schemas.openxmlformats.org/officeDocument/2006/relationships" xmlns:p="http://schemas.openxmlformats.org/presentationml/2006/main">
   <p:cSld>
     <p:spTree>
@@ -16549,19 +15253,7 @@
           <a:bodyPr/>
           <a:lstStyle/>
           <a:p>
-            <a:r>
-              <a:rPr lang="en-US" dirty="0"/>
-              <a:t>Program took 3853121 </a:t>
-            </a:r>
-            <a:r>
-              <a:rPr lang="en-US" dirty="0" err="1"/>
-              <a:t>ms</a:t>
-            </a:r>
-            <a:r>
-              <a:rPr lang="en-US" dirty="0"/>
-              <a:t> (Minutes: 64.21868333333333)</a:t>
-            </a:r>
-            <a:endParaRPr lang="en-US" dirty="0"/>
+            <a:endParaRPr lang="en-US"/>
           </a:p>
         </p:txBody>
       </p:sp>
@@ -16605,7 +15297,7 @@
 </p:sld>
 </file>
 
-<file path=ppt/slides/slide9.xml><?xml version="1.0" encoding="utf-8"?>
+<file path=ppt/slides/slide8.xml><?xml version="1.0" encoding="utf-8"?>
 <p:sld xmlns:a="http://schemas.openxmlformats.org/drawingml/2006/main" xmlns:r="http://schemas.openxmlformats.org/officeDocument/2006/relationships" xmlns:p="http://schemas.openxmlformats.org/presentationml/2006/main">
   <p:cSld>
     <p:spTree>
@@ -16637,7 +15329,7 @@
           <a:bodyPr/>
           <a:lstStyle/>
           <a:p>
-            <a:endParaRPr lang="en-US" dirty="0"/>
+            <a:endParaRPr lang="en-US"/>
           </a:p>
         </p:txBody>
       </p:sp>
@@ -16686,6 +15378,112 @@
     <p:extLst>
       <p:ext uri="{BB962C8B-B14F-4D97-AF65-F5344CB8AC3E}">
         <p14:creationId xmlns:p14="http://schemas.microsoft.com/office/powerpoint/2010/main" val="1275797778"/>
+      </p:ext>
+    </p:extLst>
+  </p:cSld>
+  <p:clrMapOvr>
+    <a:masterClrMapping/>
+  </p:clrMapOvr>
+</p:sld>
+</file>
+
+<file path=ppt/slides/slide9.xml><?xml version="1.0" encoding="utf-8"?>
+<p:sld xmlns:a="http://schemas.openxmlformats.org/drawingml/2006/main" xmlns:r="http://schemas.openxmlformats.org/officeDocument/2006/relationships" xmlns:p="http://schemas.openxmlformats.org/presentationml/2006/main">
+  <p:cSld>
+    <p:spTree>
+      <p:nvGrpSpPr>
+        <p:cNvPr id="1" name=""/>
+        <p:cNvGrpSpPr/>
+        <p:nvPr/>
+      </p:nvGrpSpPr>
+      <p:grpSpPr>
+        <a:xfrm>
+          <a:off x="0" y="0"/>
+          <a:ext cx="0" cy="0"/>
+          <a:chOff x="0" y="0"/>
+          <a:chExt cx="0" cy="0"/>
+        </a:xfrm>
+      </p:grpSpPr>
+      <p:sp>
+        <p:nvSpPr>
+          <p:cNvPr id="2" name="Content Placeholder 1"/>
+          <p:cNvSpPr>
+            <a:spLocks noGrp="1"/>
+          </p:cNvSpPr>
+          <p:nvPr>
+            <p:ph idx="1"/>
+          </p:nvPr>
+        </p:nvSpPr>
+        <p:spPr/>
+        <p:txBody>
+          <a:bodyPr/>
+          <a:lstStyle/>
+          <a:p>
+            <a:endParaRPr lang="en-US"/>
+          </a:p>
+        </p:txBody>
+      </p:sp>
+      <p:sp>
+        <p:nvSpPr>
+          <p:cNvPr id="3" name="Title 2"/>
+          <p:cNvSpPr>
+            <a:spLocks noGrp="1"/>
+          </p:cNvSpPr>
+          <p:nvPr>
+            <p:ph type="title"/>
+          </p:nvPr>
+        </p:nvSpPr>
+        <p:spPr/>
+        <p:txBody>
+          <a:bodyPr>
+            <a:normAutofit fontScale="90000"/>
+          </a:bodyPr>
+          <a:lstStyle/>
+          <a:p>
+            <a:r>
+              <a:rPr lang="en-US" dirty="0"/>
+              <a:t>20 </a:t>
+            </a:r>
+            <a:r>
+              <a:rPr lang="en-US" dirty="0" smtClean="0"/>
+              <a:t>Most </a:t>
+            </a:r>
+            <a:r>
+              <a:rPr lang="en-US" dirty="0"/>
+              <a:t>D</a:t>
+            </a:r>
+            <a:r>
+              <a:rPr lang="en-US" dirty="0" smtClean="0"/>
+              <a:t>iscriminative </a:t>
+            </a:r>
+            <a:r>
+              <a:rPr lang="en-US" dirty="0"/>
+              <a:t>T</a:t>
+            </a:r>
+            <a:r>
+              <a:rPr lang="en-US" dirty="0" smtClean="0"/>
+              <a:t>erms </a:t>
+            </a:r>
+            <a:r>
+              <a:rPr lang="en-US"/>
+              <a:t>per </a:t>
+            </a:r>
+            <a:r>
+              <a:rPr lang="en-US"/>
+              <a:t>C</a:t>
+            </a:r>
+            <a:r>
+              <a:rPr lang="en-US" smtClean="0"/>
+              <a:t>luster</a:t>
+            </a:r>
+            <a:endParaRPr lang="en-US" dirty="0"/>
+          </a:p>
+        </p:txBody>
+      </p:sp>
+    </p:spTree>
+    <p:extLst>
+      <p:ext uri="{BB962C8B-B14F-4D97-AF65-F5344CB8AC3E}">
+        <p14:creationId xmlns:p14="http://schemas.microsoft.com/office/powerpoint/2010/main" val="1381074220"/>
       </p:ext>
     </p:extLst>
   </p:cSld>
@@ -16989,289 +15787,4 @@
   <a:objectDefaults/>
   <a:extraClrSchemeLst/>
 </a:theme>
-</file>
-
-<file path=ppt/theme/theme2.xml><?xml version="1.0" encoding="utf-8"?>
-<a:theme xmlns:a="http://schemas.openxmlformats.org/drawingml/2006/main" name="Office Theme">
-  <a:themeElements>
-    <a:clrScheme name="Office">
-      <a:dk1>
-        <a:sysClr val="windowText" lastClr="000000"/>
-      </a:dk1>
-      <a:lt1>
-        <a:sysClr val="window" lastClr="FFFFFF"/>
-      </a:lt1>
-      <a:dk2>
-        <a:srgbClr val="1F497D"/>
-      </a:dk2>
-      <a:lt2>
-        <a:srgbClr val="EEECE1"/>
-      </a:lt2>
-      <a:accent1>
-        <a:srgbClr val="4F81BD"/>
-      </a:accent1>
-      <a:accent2>
-        <a:srgbClr val="C0504D"/>
-      </a:accent2>
-      <a:accent3>
-        <a:srgbClr val="9BBB59"/>
-      </a:accent3>
-      <a:accent4>
-        <a:srgbClr val="8064A2"/>
-      </a:accent4>
-      <a:accent5>
-        <a:srgbClr val="4BACC6"/>
-      </a:accent5>
-      <a:accent6>
-        <a:srgbClr val="F79646"/>
-      </a:accent6>
-      <a:hlink>
-        <a:srgbClr val="0000FF"/>
-      </a:hlink>
-      <a:folHlink>
-        <a:srgbClr val="800080"/>
-      </a:folHlink>
-    </a:clrScheme>
-    <a:fontScheme name="Office">
-      <a:majorFont>
-        <a:latin typeface="Calibri"/>
-        <a:ea typeface=""/>
-        <a:cs typeface=""/>
-        <a:font script="Jpan" typeface="ＭＳ Ｐゴシック"/>
-        <a:font script="Hang" typeface="맑은 고딕"/>
-        <a:font script="Hans" typeface="宋体"/>
-        <a:font script="Hant" typeface="新細明體"/>
-        <a:font script="Arab" typeface="Times New Roman"/>
-        <a:font script="Hebr" typeface="Times New Roman"/>
-        <a:font script="Thai" typeface="Angsana New"/>
-        <a:font script="Ethi" typeface="Nyala"/>
-        <a:font script="Beng" typeface="Vrinda"/>
-        <a:font script="Gujr" typeface="Shruti"/>
-        <a:font script="Khmr" typeface="MoolBoran"/>
-        <a:font script="Knda" typeface="Tunga"/>
-        <a:font script="Guru" typeface="Raavi"/>
-        <a:font script="Cans" typeface="Euphemia"/>
-        <a:font script="Cher" typeface="Plantagenet Cherokee"/>
-        <a:font script="Yiii" typeface="Microsoft Yi Baiti"/>
-        <a:font script="Tibt" typeface="Microsoft Himalaya"/>
-        <a:font script="Thaa" typeface="MV Boli"/>
-        <a:font script="Deva" typeface="Mangal"/>
-        <a:font script="Telu" typeface="Gautami"/>
-        <a:font script="Taml" typeface="Latha"/>
-        <a:font script="Syrc" typeface="Estrangelo Edessa"/>
-        <a:font script="Orya" typeface="Kalinga"/>
-        <a:font script="Mlym" typeface="Kartika"/>
-        <a:font script="Laoo" typeface="DokChampa"/>
-        <a:font script="Sinh" typeface="Iskoola Pota"/>
-        <a:font script="Mong" typeface="Mongolian Baiti"/>
-        <a:font script="Viet" typeface="Times New Roman"/>
-        <a:font script="Uigh" typeface="Microsoft Uighur"/>
-        <a:font script="Geor" typeface="Sylfaen"/>
-      </a:majorFont>
-      <a:minorFont>
-        <a:latin typeface="Calibri"/>
-        <a:ea typeface=""/>
-        <a:cs typeface=""/>
-        <a:font script="Jpan" typeface="ＭＳ Ｐゴシック"/>
-        <a:font script="Hang" typeface="맑은 고딕"/>
-        <a:font script="Hans" typeface="宋体"/>
-        <a:font script="Hant" typeface="新細明體"/>
-        <a:font script="Arab" typeface="Arial"/>
-        <a:font script="Hebr" typeface="Arial"/>
-        <a:font script="Thai" typeface="Cordia New"/>
-        <a:font script="Ethi" typeface="Nyala"/>
-        <a:font script="Beng" typeface="Vrinda"/>
-        <a:font script="Gujr" typeface="Shruti"/>
-        <a:font script="Khmr" typeface="DaunPenh"/>
-        <a:font script="Knda" typeface="Tunga"/>
-        <a:font script="Guru" typeface="Raavi"/>
-        <a:font script="Cans" typeface="Euphemia"/>
-        <a:font script="Cher" typeface="Plantagenet Cherokee"/>
-        <a:font script="Yiii" typeface="Microsoft Yi Baiti"/>
-        <a:font script="Tibt" typeface="Microsoft Himalaya"/>
-        <a:font script="Thaa" typeface="MV Boli"/>
-        <a:font script="Deva" typeface="Mangal"/>
-        <a:font script="Telu" typeface="Gautami"/>
-        <a:font script="Taml" typeface="Latha"/>
-        <a:font script="Syrc" typeface="Estrangelo Edessa"/>
-        <a:font script="Orya" typeface="Kalinga"/>
-        <a:font script="Mlym" typeface="Kartika"/>
-        <a:font script="Laoo" typeface="DokChampa"/>
-        <a:font script="Sinh" typeface="Iskoola Pota"/>
-        <a:font script="Mong" typeface="Mongolian Baiti"/>
-        <a:font script="Viet" typeface="Arial"/>
-        <a:font script="Uigh" typeface="Microsoft Uighur"/>
-        <a:font script="Geor" typeface="Sylfaen"/>
-      </a:minorFont>
-    </a:fontScheme>
-    <a:fmtScheme name="Office">
-      <a:fillStyleLst>
-        <a:solidFill>
-          <a:schemeClr val="phClr"/>
-        </a:solidFill>
-        <a:gradFill rotWithShape="1">
-          <a:gsLst>
-            <a:gs pos="0">
-              <a:schemeClr val="phClr">
-                <a:tint val="50000"/>
-                <a:satMod val="300000"/>
-              </a:schemeClr>
-            </a:gs>
-            <a:gs pos="35000">
-              <a:schemeClr val="phClr">
-                <a:tint val="37000"/>
-                <a:satMod val="300000"/>
-              </a:schemeClr>
-            </a:gs>
-            <a:gs pos="100000">
-              <a:schemeClr val="phClr">
-                <a:tint val="15000"/>
-                <a:satMod val="350000"/>
-              </a:schemeClr>
-            </a:gs>
-          </a:gsLst>
-          <a:lin ang="16200000" scaled="1"/>
-        </a:gradFill>
-        <a:gradFill rotWithShape="1">
-          <a:gsLst>
-            <a:gs pos="0">
-              <a:schemeClr val="phClr">
-                <a:shade val="51000"/>
-                <a:satMod val="130000"/>
-              </a:schemeClr>
-            </a:gs>
-            <a:gs pos="80000">
-              <a:schemeClr val="phClr">
-                <a:shade val="93000"/>
-                <a:satMod val="130000"/>
-              </a:schemeClr>
-            </a:gs>
-            <a:gs pos="100000">
-              <a:schemeClr val="phClr">
-                <a:shade val="94000"/>
-                <a:satMod val="135000"/>
-              </a:schemeClr>
-            </a:gs>
-          </a:gsLst>
-          <a:lin ang="16200000" scaled="0"/>
-        </a:gradFill>
-      </a:fillStyleLst>
-      <a:lnStyleLst>
-        <a:ln w="9525" cap="flat" cmpd="sng" algn="ctr">
-          <a:solidFill>
-            <a:schemeClr val="phClr">
-              <a:shade val="95000"/>
-              <a:satMod val="105000"/>
-            </a:schemeClr>
-          </a:solidFill>
-          <a:prstDash val="solid"/>
-        </a:ln>
-        <a:ln w="25400" cap="flat" cmpd="sng" algn="ctr">
-          <a:solidFill>
-            <a:schemeClr val="phClr"/>
-          </a:solidFill>
-          <a:prstDash val="solid"/>
-        </a:ln>
-        <a:ln w="38100" cap="flat" cmpd="sng" algn="ctr">
-          <a:solidFill>
-            <a:schemeClr val="phClr"/>
-          </a:solidFill>
-          <a:prstDash val="solid"/>
-        </a:ln>
-      </a:lnStyleLst>
-      <a:effectStyleLst>
-        <a:effectStyle>
-          <a:effectLst>
-            <a:outerShdw blurRad="40000" dist="20000" dir="5400000" rotWithShape="0">
-              <a:srgbClr val="000000">
-                <a:alpha val="38000"/>
-              </a:srgbClr>
-            </a:outerShdw>
-          </a:effectLst>
-        </a:effectStyle>
-        <a:effectStyle>
-          <a:effectLst>
-            <a:outerShdw blurRad="40000" dist="23000" dir="5400000" rotWithShape="0">
-              <a:srgbClr val="000000">
-                <a:alpha val="35000"/>
-              </a:srgbClr>
-            </a:outerShdw>
-          </a:effectLst>
-        </a:effectStyle>
-        <a:effectStyle>
-          <a:effectLst>
-            <a:outerShdw blurRad="40000" dist="23000" dir="5400000" rotWithShape="0">
-              <a:srgbClr val="000000">
-                <a:alpha val="35000"/>
-              </a:srgbClr>
-            </a:outerShdw>
-          </a:effectLst>
-          <a:scene3d>
-            <a:camera prst="orthographicFront">
-              <a:rot lat="0" lon="0" rev="0"/>
-            </a:camera>
-            <a:lightRig rig="threePt" dir="t">
-              <a:rot lat="0" lon="0" rev="1200000"/>
-            </a:lightRig>
-          </a:scene3d>
-          <a:sp3d>
-            <a:bevelT w="63500" h="25400"/>
-          </a:sp3d>
-        </a:effectStyle>
-      </a:effectStyleLst>
-      <a:bgFillStyleLst>
-        <a:solidFill>
-          <a:schemeClr val="phClr"/>
-        </a:solidFill>
-        <a:gradFill rotWithShape="1">
-          <a:gsLst>
-            <a:gs pos="0">
-              <a:schemeClr val="phClr">
-                <a:tint val="40000"/>
-                <a:satMod val="350000"/>
-              </a:schemeClr>
-            </a:gs>
-            <a:gs pos="40000">
-              <a:schemeClr val="phClr">
-                <a:tint val="45000"/>
-                <a:shade val="99000"/>
-                <a:satMod val="350000"/>
-              </a:schemeClr>
-            </a:gs>
-            <a:gs pos="100000">
-              <a:schemeClr val="phClr">
-                <a:shade val="20000"/>
-                <a:satMod val="255000"/>
-              </a:schemeClr>
-            </a:gs>
-          </a:gsLst>
-          <a:path path="circle">
-            <a:fillToRect l="50000" t="-80000" r="50000" b="180000"/>
-          </a:path>
-        </a:gradFill>
-        <a:gradFill rotWithShape="1">
-          <a:gsLst>
-            <a:gs pos="0">
-              <a:schemeClr val="phClr">
-                <a:tint val="80000"/>
-                <a:satMod val="300000"/>
-              </a:schemeClr>
-            </a:gs>
-            <a:gs pos="100000">
-              <a:schemeClr val="phClr">
-                <a:shade val="30000"/>
-                <a:satMod val="200000"/>
-              </a:schemeClr>
-            </a:gs>
-          </a:gsLst>
-          <a:path path="circle">
-            <a:fillToRect l="50000" t="50000" r="50000" b="50000"/>
-          </a:path>
-        </a:gradFill>
-      </a:bgFillStyleLst>
-    </a:fmtScheme>
-  </a:themeElements>
-  <a:objectDefaults/>
-  <a:extraClrSchemeLst/>
-</a:theme>
 </file>
</xml_diff>

<commit_message>
Updating slides, just pushing up updates as I go
</commit_message>
<xml_diff>
--- a/Presentation.pptx
+++ b/Presentation.pptx
@@ -4,17 +4,21 @@
   <p:sldMasterIdLst>
     <p:sldMasterId id="2147483744" r:id="rId1"/>
   </p:sldMasterIdLst>
+  <p:notesMasterIdLst>
+    <p:notesMasterId r:id="rId13"/>
+  </p:notesMasterIdLst>
   <p:sldIdLst>
     <p:sldId id="256" r:id="rId2"/>
-    <p:sldId id="257" r:id="rId3"/>
-    <p:sldId id="258" r:id="rId4"/>
-    <p:sldId id="259" r:id="rId5"/>
-    <p:sldId id="260" r:id="rId6"/>
-    <p:sldId id="261" r:id="rId7"/>
-    <p:sldId id="262" r:id="rId8"/>
-    <p:sldId id="263" r:id="rId9"/>
-    <p:sldId id="265" r:id="rId10"/>
-    <p:sldId id="264" r:id="rId11"/>
+    <p:sldId id="266" r:id="rId3"/>
+    <p:sldId id="267" r:id="rId4"/>
+    <p:sldId id="268" r:id="rId5"/>
+    <p:sldId id="259" r:id="rId6"/>
+    <p:sldId id="260" r:id="rId7"/>
+    <p:sldId id="261" r:id="rId8"/>
+    <p:sldId id="262" r:id="rId9"/>
+    <p:sldId id="263" r:id="rId10"/>
+    <p:sldId id="265" r:id="rId11"/>
+    <p:sldId id="264" r:id="rId12"/>
   </p:sldIdLst>
   <p:sldSz cx="9144000" cy="6858000" type="screen4x3"/>
   <p:notesSz cx="6858000" cy="9144000"/>
@@ -119,8 +123,9 @@
         <p14:section name="Default Section" id="{EAE55A5D-1039-4542-B44D-7FCABECD2C8A}">
           <p14:sldIdLst>
             <p14:sldId id="256"/>
-            <p14:sldId id="257"/>
-            <p14:sldId id="258"/>
+            <p14:sldId id="266"/>
+            <p14:sldId id="267"/>
+            <p14:sldId id="268"/>
           </p14:sldIdLst>
         </p14:section>
         <p14:section name="Untitled Section" id="{B9274524-FC6C-E543-980E-10A83BD2F653}">
@@ -138,6 +143,956 @@
     </p:ext>
   </p:extLst>
 </p:presentation>
+</file>
+
+<file path=ppt/charts/chart1.xml><?xml version="1.0" encoding="utf-8"?>
+<c:chartSpace xmlns:c="http://schemas.openxmlformats.org/drawingml/2006/chart" xmlns:a="http://schemas.openxmlformats.org/drawingml/2006/main" xmlns:r="http://schemas.openxmlformats.org/officeDocument/2006/relationships">
+  <c:date1904 val="0"/>
+  <c:lang val="en-US"/>
+  <c:roundedCorners val="0"/>
+  <mc:AlternateContent xmlns:mc="http://schemas.openxmlformats.org/markup-compatibility/2006">
+    <mc:Choice xmlns:c14="http://schemas.microsoft.com/office/drawing/2007/8/2/chart" Requires="c14">
+      <c14:style val="102"/>
+    </mc:Choice>
+    <mc:Fallback>
+      <c:style val="2"/>
+    </mc:Fallback>
+  </mc:AlternateContent>
+  <c:chart>
+    <c:title>
+      <c:tx>
+        <c:rich>
+          <a:bodyPr/>
+          <a:lstStyle/>
+          <a:p>
+            <a:pPr>
+              <a:defRPr/>
+            </a:pPr>
+            <a:r>
+              <a:rPr lang="en-US"/>
+              <a:t>NY Times Section Breakdown</a:t>
+            </a:r>
+          </a:p>
+        </c:rich>
+      </c:tx>
+      <c:layout/>
+      <c:overlay val="0"/>
+    </c:title>
+    <c:autoTitleDeleted val="0"/>
+    <c:plotArea>
+      <c:layout/>
+      <c:barChart>
+        <c:barDir val="col"/>
+        <c:grouping val="clustered"/>
+        <c:varyColors val="0"/>
+        <c:ser>
+          <c:idx val="0"/>
+          <c:order val="0"/>
+          <c:tx>
+            <c:strRef>
+              <c:f>Chart!$E$3</c:f>
+              <c:strCache>
+                <c:ptCount val="1"/>
+                <c:pt idx="0">
+                  <c:v>Count</c:v>
+                </c:pt>
+              </c:strCache>
+            </c:strRef>
+          </c:tx>
+          <c:invertIfNegative val="0"/>
+          <c:cat>
+            <c:strRef>
+              <c:f>Chart!$D$4:$D$45</c:f>
+              <c:strCache>
+                <c:ptCount val="42"/>
+                <c:pt idx="0">
+                  <c:v>Business Day</c:v>
+                </c:pt>
+                <c:pt idx="1">
+                  <c:v>World</c:v>
+                </c:pt>
+                <c:pt idx="2">
+                  <c:v>Sports</c:v>
+                </c:pt>
+                <c:pt idx="3">
+                  <c:v>Opinion</c:v>
+                </c:pt>
+                <c:pt idx="4">
+                  <c:v>U.S.</c:v>
+                </c:pt>
+                <c:pt idx="5">
+                  <c:v>Arts</c:v>
+                </c:pt>
+                <c:pt idx="6">
+                  <c:v>N.Y. / Region</c:v>
+                </c:pt>
+                <c:pt idx="7">
+                  <c:v>Fashion &amp; Style</c:v>
+                </c:pt>
+                <c:pt idx="8">
+                  <c:v>Technology</c:v>
+                </c:pt>
+                <c:pt idx="9">
+                  <c:v>Movies</c:v>
+                </c:pt>
+                <c:pt idx="10">
+                  <c:v>(blank)</c:v>
+                </c:pt>
+                <c:pt idx="11">
+                  <c:v>Books</c:v>
+                </c:pt>
+                <c:pt idx="12">
+                  <c:v>The Upshot</c:v>
+                </c:pt>
+                <c:pt idx="13">
+                  <c:v>Health</c:v>
+                </c:pt>
+                <c:pt idx="14">
+                  <c:v>T:Style</c:v>
+                </c:pt>
+                <c:pt idx="15">
+                  <c:v>Multimedia/Photos</c:v>
+                </c:pt>
+                <c:pt idx="16">
+                  <c:v>Travel</c:v>
+                </c:pt>
+                <c:pt idx="17">
+                  <c:v>Magazine</c:v>
+                </c:pt>
+                <c:pt idx="18">
+                  <c:v>Automobiles</c:v>
+                </c:pt>
+                <c:pt idx="19">
+                  <c:v>Theater</c:v>
+                </c:pt>
+                <c:pt idx="20">
+                  <c:v>Science</c:v>
+                </c:pt>
+                <c:pt idx="21">
+                  <c:v>Dining &amp; Wine</c:v>
+                </c:pt>
+                <c:pt idx="22">
+                  <c:v>Real Estate</c:v>
+                </c:pt>
+                <c:pt idx="23">
+                  <c:v>Corrections</c:v>
+                </c:pt>
+                <c:pt idx="24">
+                  <c:v>Home &amp; Garden</c:v>
+                </c:pt>
+                <c:pt idx="25">
+                  <c:v>Multimedia</c:v>
+                </c:pt>
+                <c:pt idx="26">
+                  <c:v>Crosswords/Games</c:v>
+                </c:pt>
+                <c:pt idx="27">
+                  <c:v>Your Money</c:v>
+                </c:pt>
+                <c:pt idx="28">
+                  <c:v>Crosswords &amp; Games</c:v>
+                </c:pt>
+                <c:pt idx="29">
+                  <c:v>Great Homes &amp; Destinations</c:v>
+                </c:pt>
+                <c:pt idx="30">
+                  <c:v>Style</c:v>
+                </c:pt>
+                <c:pt idx="31">
+                  <c:v>T Magazine</c:v>
+                </c:pt>
+                <c:pt idx="32">
+                  <c:v>Education</c:v>
+                </c:pt>
+                <c:pt idx="33">
+                  <c:v>Sunday Review</c:v>
+                </c:pt>
+                <c:pt idx="34">
+                  <c:v>Job Market</c:v>
+                </c:pt>
+                <c:pt idx="35">
+                  <c:v>Great Homes and Destinations</c:v>
+                </c:pt>
+                <c:pt idx="36">
+                  <c:v>Open</c:v>
+                </c:pt>
+                <c:pt idx="37">
+                  <c:v>Blogs</c:v>
+                </c:pt>
+                <c:pt idx="38">
+                  <c:v>Public Editor</c:v>
+                </c:pt>
+                <c:pt idx="39">
+                  <c:v>Obituaries</c:v>
+                </c:pt>
+                <c:pt idx="40">
+                  <c:v>Feeds</c:v>
+                </c:pt>
+                <c:pt idx="41">
+                  <c:v>Afternoon Update</c:v>
+                </c:pt>
+              </c:strCache>
+            </c:strRef>
+          </c:cat>
+          <c:val>
+            <c:numRef>
+              <c:f>Chart!$E$4:$E$45</c:f>
+              <c:numCache>
+                <c:formatCode>General</c:formatCode>
+                <c:ptCount val="42"/>
+                <c:pt idx="0">
+                  <c:v>4784</c:v>
+                </c:pt>
+                <c:pt idx="1">
+                  <c:v>4639</c:v>
+                </c:pt>
+                <c:pt idx="2">
+                  <c:v>4408</c:v>
+                </c:pt>
+                <c:pt idx="3">
+                  <c:v>4113</c:v>
+                </c:pt>
+                <c:pt idx="4">
+                  <c:v>3964</c:v>
+                </c:pt>
+                <c:pt idx="5">
+                  <c:v>3627</c:v>
+                </c:pt>
+                <c:pt idx="6">
+                  <c:v>2897</c:v>
+                </c:pt>
+                <c:pt idx="7">
+                  <c:v>1563</c:v>
+                </c:pt>
+                <c:pt idx="8">
+                  <c:v>1007</c:v>
+                </c:pt>
+                <c:pt idx="9">
+                  <c:v>932</c:v>
+                </c:pt>
+                <c:pt idx="10">
+                  <c:v>926</c:v>
+                </c:pt>
+                <c:pt idx="11">
+                  <c:v>795</c:v>
+                </c:pt>
+                <c:pt idx="12">
+                  <c:v>784</c:v>
+                </c:pt>
+                <c:pt idx="13">
+                  <c:v>590</c:v>
+                </c:pt>
+                <c:pt idx="14">
+                  <c:v>588</c:v>
+                </c:pt>
+                <c:pt idx="15">
+                  <c:v>572</c:v>
+                </c:pt>
+                <c:pt idx="16">
+                  <c:v>497</c:v>
+                </c:pt>
+                <c:pt idx="17">
+                  <c:v>486</c:v>
+                </c:pt>
+                <c:pt idx="18">
+                  <c:v>470</c:v>
+                </c:pt>
+                <c:pt idx="19">
+                  <c:v>464</c:v>
+                </c:pt>
+                <c:pt idx="20">
+                  <c:v>453</c:v>
+                </c:pt>
+                <c:pt idx="21">
+                  <c:v>447</c:v>
+                </c:pt>
+                <c:pt idx="22">
+                  <c:v>374</c:v>
+                </c:pt>
+                <c:pt idx="23">
+                  <c:v>321</c:v>
+                </c:pt>
+                <c:pt idx="24">
+                  <c:v>248</c:v>
+                </c:pt>
+                <c:pt idx="25">
+                  <c:v>243</c:v>
+                </c:pt>
+                <c:pt idx="26">
+                  <c:v>214</c:v>
+                </c:pt>
+                <c:pt idx="27">
+                  <c:v>175</c:v>
+                </c:pt>
+                <c:pt idx="28">
+                  <c:v>93</c:v>
+                </c:pt>
+                <c:pt idx="29">
+                  <c:v>85</c:v>
+                </c:pt>
+                <c:pt idx="30">
+                  <c:v>82</c:v>
+                </c:pt>
+                <c:pt idx="31">
+                  <c:v>74</c:v>
+                </c:pt>
+                <c:pt idx="32">
+                  <c:v>60</c:v>
+                </c:pt>
+                <c:pt idx="33">
+                  <c:v>44</c:v>
+                </c:pt>
+                <c:pt idx="34">
+                  <c:v>39</c:v>
+                </c:pt>
+                <c:pt idx="35">
+                  <c:v>26</c:v>
+                </c:pt>
+                <c:pt idx="36">
+                  <c:v>10</c:v>
+                </c:pt>
+                <c:pt idx="37">
+                  <c:v>8</c:v>
+                </c:pt>
+                <c:pt idx="38">
+                  <c:v>6</c:v>
+                </c:pt>
+                <c:pt idx="39">
+                  <c:v>5</c:v>
+                </c:pt>
+                <c:pt idx="40">
+                  <c:v>2</c:v>
+                </c:pt>
+                <c:pt idx="41">
+                  <c:v>1</c:v>
+                </c:pt>
+              </c:numCache>
+            </c:numRef>
+          </c:val>
+        </c:ser>
+        <c:dLbls>
+          <c:showLegendKey val="0"/>
+          <c:showVal val="0"/>
+          <c:showCatName val="0"/>
+          <c:showSerName val="0"/>
+          <c:showPercent val="0"/>
+          <c:showBubbleSize val="0"/>
+        </c:dLbls>
+        <c:gapWidth val="150"/>
+        <c:axId val="119494912"/>
+        <c:axId val="119746560"/>
+      </c:barChart>
+      <c:catAx>
+        <c:axId val="119494912"/>
+        <c:scaling>
+          <c:orientation val="minMax"/>
+        </c:scaling>
+        <c:delete val="0"/>
+        <c:axPos val="b"/>
+        <c:majorTickMark val="out"/>
+        <c:minorTickMark val="none"/>
+        <c:tickLblPos val="nextTo"/>
+        <c:crossAx val="119746560"/>
+        <c:crosses val="autoZero"/>
+        <c:auto val="1"/>
+        <c:lblAlgn val="ctr"/>
+        <c:lblOffset val="100"/>
+        <c:noMultiLvlLbl val="0"/>
+      </c:catAx>
+      <c:valAx>
+        <c:axId val="119746560"/>
+        <c:scaling>
+          <c:orientation val="minMax"/>
+        </c:scaling>
+        <c:delete val="0"/>
+        <c:axPos val="l"/>
+        <c:majorGridlines/>
+        <c:numFmt formatCode="General" sourceLinked="1"/>
+        <c:majorTickMark val="out"/>
+        <c:minorTickMark val="none"/>
+        <c:tickLblPos val="nextTo"/>
+        <c:crossAx val="119494912"/>
+        <c:crosses val="autoZero"/>
+        <c:crossBetween val="between"/>
+      </c:valAx>
+    </c:plotArea>
+    <c:plotVisOnly val="1"/>
+    <c:dispBlanksAs val="gap"/>
+    <c:showDLblsOverMax val="0"/>
+  </c:chart>
+  <c:externalData r:id="rId1">
+    <c:autoUpdate val="0"/>
+  </c:externalData>
+</c:chartSpace>
+</file>
+
+<file path=ppt/notesMasters/notesMaster1.xml><?xml version="1.0" encoding="utf-8"?>
+<p:notesMaster xmlns:a="http://schemas.openxmlformats.org/drawingml/2006/main" xmlns:r="http://schemas.openxmlformats.org/officeDocument/2006/relationships" xmlns:p="http://schemas.openxmlformats.org/presentationml/2006/main">
+  <p:cSld>
+    <p:bg>
+      <p:bgRef idx="1001">
+        <a:schemeClr val="bg1"/>
+      </p:bgRef>
+    </p:bg>
+    <p:spTree>
+      <p:nvGrpSpPr>
+        <p:cNvPr id="1" name=""/>
+        <p:cNvGrpSpPr/>
+        <p:nvPr/>
+      </p:nvGrpSpPr>
+      <p:grpSpPr>
+        <a:xfrm>
+          <a:off x="0" y="0"/>
+          <a:ext cx="0" cy="0"/>
+          <a:chOff x="0" y="0"/>
+          <a:chExt cx="0" cy="0"/>
+        </a:xfrm>
+      </p:grpSpPr>
+      <p:sp>
+        <p:nvSpPr>
+          <p:cNvPr id="2" name="Header Placeholder 1"/>
+          <p:cNvSpPr>
+            <a:spLocks noGrp="1"/>
+          </p:cNvSpPr>
+          <p:nvPr>
+            <p:ph type="hdr" sz="quarter"/>
+          </p:nvPr>
+        </p:nvSpPr>
+        <p:spPr>
+          <a:xfrm>
+            <a:off x="0" y="0"/>
+            <a:ext cx="2971800" cy="457200"/>
+          </a:xfrm>
+          <a:prstGeom prst="rect">
+            <a:avLst/>
+          </a:prstGeom>
+        </p:spPr>
+        <p:txBody>
+          <a:bodyPr vert="horz" lIns="91440" tIns="45720" rIns="91440" bIns="45720" rtlCol="0"/>
+          <a:lstStyle>
+            <a:lvl1pPr algn="l">
+              <a:defRPr sz="1200"/>
+            </a:lvl1pPr>
+          </a:lstStyle>
+          <a:p>
+            <a:endParaRPr lang="en-US"/>
+          </a:p>
+        </p:txBody>
+      </p:sp>
+      <p:sp>
+        <p:nvSpPr>
+          <p:cNvPr id="3" name="Date Placeholder 2"/>
+          <p:cNvSpPr>
+            <a:spLocks noGrp="1"/>
+          </p:cNvSpPr>
+          <p:nvPr>
+            <p:ph type="dt" idx="1"/>
+          </p:nvPr>
+        </p:nvSpPr>
+        <p:spPr>
+          <a:xfrm>
+            <a:off x="3884613" y="0"/>
+            <a:ext cx="2971800" cy="457200"/>
+          </a:xfrm>
+          <a:prstGeom prst="rect">
+            <a:avLst/>
+          </a:prstGeom>
+        </p:spPr>
+        <p:txBody>
+          <a:bodyPr vert="horz" lIns="91440" tIns="45720" rIns="91440" bIns="45720" rtlCol="0"/>
+          <a:lstStyle>
+            <a:lvl1pPr algn="r">
+              <a:defRPr sz="1200"/>
+            </a:lvl1pPr>
+          </a:lstStyle>
+          <a:p>
+            <a:fld id="{65CFCD1B-74E5-4B96-A2F0-4B61869A9C28}" type="datetimeFigureOut">
+              <a:rPr lang="en-US" smtClean="0"/>
+              <a:t>10/18/2014</a:t>
+            </a:fld>
+            <a:endParaRPr lang="en-US"/>
+          </a:p>
+        </p:txBody>
+      </p:sp>
+      <p:sp>
+        <p:nvSpPr>
+          <p:cNvPr id="4" name="Slide Image Placeholder 3"/>
+          <p:cNvSpPr>
+            <a:spLocks noGrp="1" noRot="1" noChangeAspect="1"/>
+          </p:cNvSpPr>
+          <p:nvPr>
+            <p:ph type="sldImg" idx="2"/>
+          </p:nvPr>
+        </p:nvSpPr>
+        <p:spPr>
+          <a:xfrm>
+            <a:off x="1143000" y="685800"/>
+            <a:ext cx="4572000" cy="3429000"/>
+          </a:xfrm>
+          <a:prstGeom prst="rect">
+            <a:avLst/>
+          </a:prstGeom>
+          <a:noFill/>
+          <a:ln w="12700">
+            <a:solidFill>
+              <a:prstClr val="black"/>
+            </a:solidFill>
+          </a:ln>
+        </p:spPr>
+        <p:txBody>
+          <a:bodyPr vert="horz" lIns="91440" tIns="45720" rIns="91440" bIns="45720" rtlCol="0" anchor="ctr"/>
+          <a:lstStyle/>
+          <a:p>
+            <a:endParaRPr lang="en-US"/>
+          </a:p>
+        </p:txBody>
+      </p:sp>
+      <p:sp>
+        <p:nvSpPr>
+          <p:cNvPr id="5" name="Notes Placeholder 4"/>
+          <p:cNvSpPr>
+            <a:spLocks noGrp="1"/>
+          </p:cNvSpPr>
+          <p:nvPr>
+            <p:ph type="body" sz="quarter" idx="3"/>
+          </p:nvPr>
+        </p:nvSpPr>
+        <p:spPr>
+          <a:xfrm>
+            <a:off x="685800" y="4343400"/>
+            <a:ext cx="5486400" cy="4114800"/>
+          </a:xfrm>
+          <a:prstGeom prst="rect">
+            <a:avLst/>
+          </a:prstGeom>
+        </p:spPr>
+        <p:txBody>
+          <a:bodyPr vert="horz" lIns="91440" tIns="45720" rIns="91440" bIns="45720" rtlCol="0"/>
+          <a:lstStyle/>
+          <a:p>
+            <a:pPr lvl="0"/>
+            <a:r>
+              <a:rPr lang="en-US" smtClean="0"/>
+              <a:t>Click to edit Master text styles</a:t>
+            </a:r>
+          </a:p>
+          <a:p>
+            <a:pPr lvl="1"/>
+            <a:r>
+              <a:rPr lang="en-US" smtClean="0"/>
+              <a:t>Second level</a:t>
+            </a:r>
+          </a:p>
+          <a:p>
+            <a:pPr lvl="2"/>
+            <a:r>
+              <a:rPr lang="en-US" smtClean="0"/>
+              <a:t>Third level</a:t>
+            </a:r>
+          </a:p>
+          <a:p>
+            <a:pPr lvl="3"/>
+            <a:r>
+              <a:rPr lang="en-US" smtClean="0"/>
+              <a:t>Fourth level</a:t>
+            </a:r>
+          </a:p>
+          <a:p>
+            <a:pPr lvl="4"/>
+            <a:r>
+              <a:rPr lang="en-US" smtClean="0"/>
+              <a:t>Fifth level</a:t>
+            </a:r>
+            <a:endParaRPr lang="en-US"/>
+          </a:p>
+        </p:txBody>
+      </p:sp>
+      <p:sp>
+        <p:nvSpPr>
+          <p:cNvPr id="6" name="Footer Placeholder 5"/>
+          <p:cNvSpPr>
+            <a:spLocks noGrp="1"/>
+          </p:cNvSpPr>
+          <p:nvPr>
+            <p:ph type="ftr" sz="quarter" idx="4"/>
+          </p:nvPr>
+        </p:nvSpPr>
+        <p:spPr>
+          <a:xfrm>
+            <a:off x="0" y="8685213"/>
+            <a:ext cx="2971800" cy="457200"/>
+          </a:xfrm>
+          <a:prstGeom prst="rect">
+            <a:avLst/>
+          </a:prstGeom>
+        </p:spPr>
+        <p:txBody>
+          <a:bodyPr vert="horz" lIns="91440" tIns="45720" rIns="91440" bIns="45720" rtlCol="0" anchor="b"/>
+          <a:lstStyle>
+            <a:lvl1pPr algn="l">
+              <a:defRPr sz="1200"/>
+            </a:lvl1pPr>
+          </a:lstStyle>
+          <a:p>
+            <a:endParaRPr lang="en-US"/>
+          </a:p>
+        </p:txBody>
+      </p:sp>
+      <p:sp>
+        <p:nvSpPr>
+          <p:cNvPr id="7" name="Slide Number Placeholder 6"/>
+          <p:cNvSpPr>
+            <a:spLocks noGrp="1"/>
+          </p:cNvSpPr>
+          <p:nvPr>
+            <p:ph type="sldNum" sz="quarter" idx="5"/>
+          </p:nvPr>
+        </p:nvSpPr>
+        <p:spPr>
+          <a:xfrm>
+            <a:off x="3884613" y="8685213"/>
+            <a:ext cx="2971800" cy="457200"/>
+          </a:xfrm>
+          <a:prstGeom prst="rect">
+            <a:avLst/>
+          </a:prstGeom>
+        </p:spPr>
+        <p:txBody>
+          <a:bodyPr vert="horz" lIns="91440" tIns="45720" rIns="91440" bIns="45720" rtlCol="0" anchor="b"/>
+          <a:lstStyle>
+            <a:lvl1pPr algn="r">
+              <a:defRPr sz="1200"/>
+            </a:lvl1pPr>
+          </a:lstStyle>
+          <a:p>
+            <a:fld id="{8CBBA6C1-1265-4386-8E57-91AF3A20C339}" type="slidenum">
+              <a:rPr lang="en-US" smtClean="0"/>
+              <a:t>‹#›</a:t>
+            </a:fld>
+            <a:endParaRPr lang="en-US"/>
+          </a:p>
+        </p:txBody>
+      </p:sp>
+    </p:spTree>
+    <p:extLst>
+      <p:ext uri="{BB962C8B-B14F-4D97-AF65-F5344CB8AC3E}">
+        <p14:creationId xmlns:p14="http://schemas.microsoft.com/office/powerpoint/2010/main" val="2252551985"/>
+      </p:ext>
+    </p:extLst>
+  </p:cSld>
+  <p:clrMap bg1="lt1" tx1="dk1" bg2="lt2" tx2="dk2" accent1="accent1" accent2="accent2" accent3="accent3" accent4="accent4" accent5="accent5" accent6="accent6" hlink="hlink" folHlink="folHlink"/>
+  <p:notesStyle>
+    <a:lvl1pPr marL="0" algn="l" defTabSz="914400" rtl="0" eaLnBrk="1" latinLnBrk="0" hangingPunct="1">
+      <a:defRPr sz="1200" kern="1200">
+        <a:solidFill>
+          <a:schemeClr val="tx1"/>
+        </a:solidFill>
+        <a:latin typeface="+mn-lt"/>
+        <a:ea typeface="+mn-ea"/>
+        <a:cs typeface="+mn-cs"/>
+      </a:defRPr>
+    </a:lvl1pPr>
+    <a:lvl2pPr marL="457200" algn="l" defTabSz="914400" rtl="0" eaLnBrk="1" latinLnBrk="0" hangingPunct="1">
+      <a:defRPr sz="1200" kern="1200">
+        <a:solidFill>
+          <a:schemeClr val="tx1"/>
+        </a:solidFill>
+        <a:latin typeface="+mn-lt"/>
+        <a:ea typeface="+mn-ea"/>
+        <a:cs typeface="+mn-cs"/>
+      </a:defRPr>
+    </a:lvl2pPr>
+    <a:lvl3pPr marL="914400" algn="l" defTabSz="914400" rtl="0" eaLnBrk="1" latinLnBrk="0" hangingPunct="1">
+      <a:defRPr sz="1200" kern="1200">
+        <a:solidFill>
+          <a:schemeClr val="tx1"/>
+        </a:solidFill>
+        <a:latin typeface="+mn-lt"/>
+        <a:ea typeface="+mn-ea"/>
+        <a:cs typeface="+mn-cs"/>
+      </a:defRPr>
+    </a:lvl3pPr>
+    <a:lvl4pPr marL="1371600" algn="l" defTabSz="914400" rtl="0" eaLnBrk="1" latinLnBrk="0" hangingPunct="1">
+      <a:defRPr sz="1200" kern="1200">
+        <a:solidFill>
+          <a:schemeClr val="tx1"/>
+        </a:solidFill>
+        <a:latin typeface="+mn-lt"/>
+        <a:ea typeface="+mn-ea"/>
+        <a:cs typeface="+mn-cs"/>
+      </a:defRPr>
+    </a:lvl4pPr>
+    <a:lvl5pPr marL="1828800" algn="l" defTabSz="914400" rtl="0" eaLnBrk="1" latinLnBrk="0" hangingPunct="1">
+      <a:defRPr sz="1200" kern="1200">
+        <a:solidFill>
+          <a:schemeClr val="tx1"/>
+        </a:solidFill>
+        <a:latin typeface="+mn-lt"/>
+        <a:ea typeface="+mn-ea"/>
+        <a:cs typeface="+mn-cs"/>
+      </a:defRPr>
+    </a:lvl5pPr>
+    <a:lvl6pPr marL="2286000" algn="l" defTabSz="914400" rtl="0" eaLnBrk="1" latinLnBrk="0" hangingPunct="1">
+      <a:defRPr sz="1200" kern="1200">
+        <a:solidFill>
+          <a:schemeClr val="tx1"/>
+        </a:solidFill>
+        <a:latin typeface="+mn-lt"/>
+        <a:ea typeface="+mn-ea"/>
+        <a:cs typeface="+mn-cs"/>
+      </a:defRPr>
+    </a:lvl6pPr>
+    <a:lvl7pPr marL="2743200" algn="l" defTabSz="914400" rtl="0" eaLnBrk="1" latinLnBrk="0" hangingPunct="1">
+      <a:defRPr sz="1200" kern="1200">
+        <a:solidFill>
+          <a:schemeClr val="tx1"/>
+        </a:solidFill>
+        <a:latin typeface="+mn-lt"/>
+        <a:ea typeface="+mn-ea"/>
+        <a:cs typeface="+mn-cs"/>
+      </a:defRPr>
+    </a:lvl7pPr>
+    <a:lvl8pPr marL="3200400" algn="l" defTabSz="914400" rtl="0" eaLnBrk="1" latinLnBrk="0" hangingPunct="1">
+      <a:defRPr sz="1200" kern="1200">
+        <a:solidFill>
+          <a:schemeClr val="tx1"/>
+        </a:solidFill>
+        <a:latin typeface="+mn-lt"/>
+        <a:ea typeface="+mn-ea"/>
+        <a:cs typeface="+mn-cs"/>
+      </a:defRPr>
+    </a:lvl8pPr>
+    <a:lvl9pPr marL="3657600" algn="l" defTabSz="914400" rtl="0" eaLnBrk="1" latinLnBrk="0" hangingPunct="1">
+      <a:defRPr sz="1200" kern="1200">
+        <a:solidFill>
+          <a:schemeClr val="tx1"/>
+        </a:solidFill>
+        <a:latin typeface="+mn-lt"/>
+        <a:ea typeface="+mn-ea"/>
+        <a:cs typeface="+mn-cs"/>
+      </a:defRPr>
+    </a:lvl9pPr>
+  </p:notesStyle>
+</p:notesMaster>
+</file>
+
+<file path=ppt/notesSlides/notesSlide1.xml><?xml version="1.0" encoding="utf-8"?>
+<p:notes xmlns:a="http://schemas.openxmlformats.org/drawingml/2006/main" xmlns:r="http://schemas.openxmlformats.org/officeDocument/2006/relationships" xmlns:p="http://schemas.openxmlformats.org/presentationml/2006/main">
+  <p:cSld>
+    <p:spTree>
+      <p:nvGrpSpPr>
+        <p:cNvPr id="1" name=""/>
+        <p:cNvGrpSpPr/>
+        <p:nvPr/>
+      </p:nvGrpSpPr>
+      <p:grpSpPr>
+        <a:xfrm>
+          <a:off x="0" y="0"/>
+          <a:ext cx="0" cy="0"/>
+          <a:chOff x="0" y="0"/>
+          <a:chExt cx="0" cy="0"/>
+        </a:xfrm>
+      </p:grpSpPr>
+      <p:sp>
+        <p:nvSpPr>
+          <p:cNvPr id="2" name="Slide Image Placeholder 1"/>
+          <p:cNvSpPr>
+            <a:spLocks noGrp="1" noRot="1" noChangeAspect="1"/>
+          </p:cNvSpPr>
+          <p:nvPr>
+            <p:ph type="sldImg"/>
+          </p:nvPr>
+        </p:nvSpPr>
+        <p:spPr/>
+      </p:sp>
+      <p:sp>
+        <p:nvSpPr>
+          <p:cNvPr id="3" name="Notes Placeholder 2"/>
+          <p:cNvSpPr>
+            <a:spLocks noGrp="1"/>
+          </p:cNvSpPr>
+          <p:nvPr>
+            <p:ph type="body" idx="1"/>
+          </p:nvPr>
+        </p:nvSpPr>
+        <p:spPr/>
+        <p:txBody>
+          <a:bodyPr/>
+          <a:lstStyle/>
+          <a:p>
+            <a:r>
+              <a:rPr lang="en-US" dirty="0" smtClean="0"/>
+              <a:t>Our initial step was to download “raw” file from the NYT, where each grab pulled down 20 documents.</a:t>
+            </a:r>
+          </a:p>
+          <a:p>
+            <a:endParaRPr lang="en-US" dirty="0" smtClean="0"/>
+          </a:p>
+          <a:p>
+            <a:r>
+              <a:rPr lang="en-US" dirty="0" smtClean="0"/>
+              <a:t>$source and $section</a:t>
+            </a:r>
+            <a:r>
+              <a:rPr lang="en-US" baseline="0" dirty="0" smtClean="0"/>
+              <a:t> were set to “all”, to just grab everything</a:t>
+            </a:r>
+          </a:p>
+          <a:p>
+            <a:endParaRPr lang="en-US" baseline="0" dirty="0" smtClean="0"/>
+          </a:p>
+          <a:p>
+            <a:r>
+              <a:rPr lang="en-US" dirty="0" smtClean="0"/>
+              <a:t>IF</a:t>
+            </a:r>
+            <a:r>
+              <a:rPr lang="en-US" baseline="0" dirty="0" smtClean="0"/>
+              <a:t> you don’t base64_encode </a:t>
+            </a:r>
+            <a:r>
+              <a:rPr lang="en-US" baseline="0" dirty="0" err="1" smtClean="0"/>
+              <a:t>sphp</a:t>
+            </a:r>
+            <a:r>
+              <a:rPr lang="en-US" baseline="0" dirty="0" smtClean="0"/>
+              <a:t> files, transferring can corrupt…</a:t>
+            </a:r>
+            <a:endParaRPr lang="en-US" dirty="0"/>
+          </a:p>
+        </p:txBody>
+      </p:sp>
+      <p:sp>
+        <p:nvSpPr>
+          <p:cNvPr id="4" name="Slide Number Placeholder 3"/>
+          <p:cNvSpPr>
+            <a:spLocks noGrp="1"/>
+          </p:cNvSpPr>
+          <p:nvPr>
+            <p:ph type="sldNum" sz="quarter" idx="10"/>
+          </p:nvPr>
+        </p:nvSpPr>
+        <p:spPr/>
+        <p:txBody>
+          <a:bodyPr/>
+          <a:lstStyle/>
+          <a:p>
+            <a:fld id="{7ABBC0B4-C33E-46CE-9706-C9D67F40DB9D}" type="slidenum">
+              <a:rPr lang="en-US" smtClean="0"/>
+              <a:t>2</a:t>
+            </a:fld>
+            <a:endParaRPr lang="en-US"/>
+          </a:p>
+        </p:txBody>
+      </p:sp>
+    </p:spTree>
+    <p:extLst>
+      <p:ext uri="{BB962C8B-B14F-4D97-AF65-F5344CB8AC3E}">
+        <p14:creationId xmlns:p14="http://schemas.microsoft.com/office/powerpoint/2010/main" val="3287877424"/>
+      </p:ext>
+    </p:extLst>
+  </p:cSld>
+  <p:clrMapOvr>
+    <a:masterClrMapping/>
+  </p:clrMapOvr>
+</p:notes>
+</file>
+
+<file path=ppt/notesSlides/notesSlide2.xml><?xml version="1.0" encoding="utf-8"?>
+<p:notes xmlns:a="http://schemas.openxmlformats.org/drawingml/2006/main" xmlns:r="http://schemas.openxmlformats.org/officeDocument/2006/relationships" xmlns:p="http://schemas.openxmlformats.org/presentationml/2006/main">
+  <p:cSld>
+    <p:spTree>
+      <p:nvGrpSpPr>
+        <p:cNvPr id="1" name=""/>
+        <p:cNvGrpSpPr/>
+        <p:nvPr/>
+      </p:nvGrpSpPr>
+      <p:grpSpPr>
+        <a:xfrm>
+          <a:off x="0" y="0"/>
+          <a:ext cx="0" cy="0"/>
+          <a:chOff x="0" y="0"/>
+          <a:chExt cx="0" cy="0"/>
+        </a:xfrm>
+      </p:grpSpPr>
+      <p:sp>
+        <p:nvSpPr>
+          <p:cNvPr id="2" name="Slide Image Placeholder 1"/>
+          <p:cNvSpPr>
+            <a:spLocks noGrp="1" noRot="1" noChangeAspect="1"/>
+          </p:cNvSpPr>
+          <p:nvPr>
+            <p:ph type="sldImg"/>
+          </p:nvPr>
+        </p:nvSpPr>
+        <p:spPr/>
+      </p:sp>
+      <p:sp>
+        <p:nvSpPr>
+          <p:cNvPr id="3" name="Notes Placeholder 2"/>
+          <p:cNvSpPr>
+            <a:spLocks noGrp="1"/>
+          </p:cNvSpPr>
+          <p:nvPr>
+            <p:ph type="body" idx="1"/>
+          </p:nvPr>
+        </p:nvSpPr>
+        <p:spPr/>
+        <p:txBody>
+          <a:bodyPr/>
+          <a:lstStyle/>
+          <a:p>
+            <a:r>
+              <a:rPr lang="en-US" dirty="0" smtClean="0"/>
+              <a:t>42 Sections total.</a:t>
+            </a:r>
+          </a:p>
+          <a:p>
+            <a:endParaRPr lang="en-US" dirty="0" smtClean="0"/>
+          </a:p>
+          <a:p>
+            <a:r>
+              <a:rPr lang="en-US" dirty="0" smtClean="0"/>
+              <a:t>Notice that (blank) is just under 1000 of the documents.</a:t>
+            </a:r>
+            <a:endParaRPr lang="en-US" dirty="0"/>
+          </a:p>
+        </p:txBody>
+      </p:sp>
+      <p:sp>
+        <p:nvSpPr>
+          <p:cNvPr id="4" name="Slide Number Placeholder 3"/>
+          <p:cNvSpPr>
+            <a:spLocks noGrp="1"/>
+          </p:cNvSpPr>
+          <p:nvPr>
+            <p:ph type="sldNum" sz="quarter" idx="10"/>
+          </p:nvPr>
+        </p:nvSpPr>
+        <p:spPr/>
+        <p:txBody>
+          <a:bodyPr/>
+          <a:lstStyle/>
+          <a:p>
+            <a:fld id="{7ABBC0B4-C33E-46CE-9706-C9D67F40DB9D}" type="slidenum">
+              <a:rPr lang="en-US" smtClean="0"/>
+              <a:t>4</a:t>
+            </a:fld>
+            <a:endParaRPr lang="en-US"/>
+          </a:p>
+        </p:txBody>
+      </p:sp>
+    </p:spTree>
+    <p:extLst>
+      <p:ext uri="{BB962C8B-B14F-4D97-AF65-F5344CB8AC3E}">
+        <p14:creationId xmlns:p14="http://schemas.microsoft.com/office/powerpoint/2010/main" val="2447325274"/>
+      </p:ext>
+    </p:extLst>
+  </p:cSld>
+  <p:clrMapOvr>
+    <a:masterClrMapping/>
+  </p:clrMapOvr>
+</p:notes>
 </file>
 
 <file path=ppt/slideLayouts/slideLayout1.xml><?xml version="1.0" encoding="utf-8"?>
@@ -1953,7 +2908,7 @@
             <a:fld id="{E30E2307-1E40-4E12-8716-25BFDA8E7013}" type="datetime1">
               <a:rPr lang="en-US" smtClean="0"/>
               <a:pPr/>
-              <a:t>10/15/14</a:t>
+              <a:t>10/18/2014</a:t>
             </a:fld>
             <a:endParaRPr lang="en-US"/>
           </a:p>
@@ -2136,7 +3091,7 @@
             <a:fld id="{E5CFCF5A-EA79-452C-A52C-1A2668C2E7DF}" type="datetime1">
               <a:rPr lang="en-US" smtClean="0"/>
               <a:pPr/>
-              <a:t>10/15/14</a:t>
+              <a:t>10/18/2014</a:t>
             </a:fld>
             <a:endParaRPr lang="en-US"/>
           </a:p>
@@ -2289,7 +3244,7 @@
             <a:fld id="{2E5C4C28-BD4B-4892-9A2D-6E19BD753A9A}" type="datetime1">
               <a:rPr lang="en-US" smtClean="0"/>
               <a:pPr/>
-              <a:t>10/15/14</a:t>
+              <a:t>10/18/2014</a:t>
             </a:fld>
             <a:endParaRPr lang="en-US"/>
           </a:p>
@@ -4117,7 +5072,7 @@
             <a:fld id="{61FD9D02-426E-46C9-9EE9-0DE1EF8B2838}" type="datetime1">
               <a:rPr lang="en-US" smtClean="0"/>
               <a:pPr/>
-              <a:t>10/15/14</a:t>
+              <a:t>10/18/2014</a:t>
             </a:fld>
             <a:endParaRPr lang="en-US"/>
           </a:p>
@@ -5989,7 +6944,7 @@
             <a:fld id="{7B8AEBBE-F8B2-42CF-9895-E86A608384EB}" type="datetime1">
               <a:rPr lang="en-US" smtClean="0"/>
               <a:pPr/>
-              <a:t>10/15/14</a:t>
+              <a:t>10/18/2014</a:t>
             </a:fld>
             <a:endParaRPr lang="en-US"/>
           </a:p>
@@ -6104,7 +7059,7 @@
             <a:fld id="{E1FAA6B6-10E5-4810-BC9F-DA72D8452E73}" type="datetime1">
               <a:rPr lang="en-US" smtClean="0"/>
               <a:pPr/>
-              <a:t>10/15/14</a:t>
+              <a:t>10/18/2014</a:t>
             </a:fld>
             <a:endParaRPr lang="en-US"/>
           </a:p>
@@ -6647,7 +7602,7 @@
             <a:fld id="{6D18D072-EF12-4AA2-BD71-ABC68B06D0E2}" type="datetime1">
               <a:rPr lang="en-US" smtClean="0"/>
               <a:pPr/>
-              <a:t>10/15/14</a:t>
+              <a:t>10/18/2014</a:t>
             </a:fld>
             <a:endParaRPr lang="en-US"/>
           </a:p>
@@ -6762,7 +7717,7 @@
             <a:fld id="{B8CDBF60-6CC3-4B74-A60D-3486985E4346}" type="datetime1">
               <a:rPr lang="en-US" smtClean="0"/>
               <a:pPr/>
-              <a:t>10/15/14</a:t>
+              <a:t>10/18/2014</a:t>
             </a:fld>
             <a:endParaRPr lang="en-US"/>
           </a:p>
@@ -8475,7 +9430,7 @@
             <a:fld id="{22714818-984F-4759-BF72-A33BDC1963BD}" type="datetime1">
               <a:rPr lang="en-US" smtClean="0"/>
               <a:pPr/>
-              <a:t>10/15/14</a:t>
+              <a:t>10/18/2014</a:t>
             </a:fld>
             <a:endParaRPr lang="en-US"/>
           </a:p>
@@ -8628,7 +9583,7 @@
             <a:fld id="{9EA7E191-5F94-4FC1-B823-BD7CABF7FA06}" type="datetime1">
               <a:rPr lang="en-US" smtClean="0"/>
               <a:pPr/>
-              <a:t>10/15/14</a:t>
+              <a:t>10/18/2014</a:t>
             </a:fld>
             <a:endParaRPr lang="en-US"/>
           </a:p>
@@ -12245,7 +13200,7 @@
             <a:fld id="{88856D55-EFBE-4F9B-8A5F-09D42CA22A9B}" type="datetime1">
               <a:rPr lang="en-US" smtClean="0"/>
               <a:pPr/>
-              <a:t>10/15/14</a:t>
+              <a:t>10/18/2014</a:t>
             </a:fld>
             <a:endParaRPr lang="en-US"/>
           </a:p>
@@ -14106,7 +15061,7 @@
             <a:fld id="{9D1D110F-3F4E-48D9-B8AA-5D0E825AFDBA}" type="datetime1">
               <a:rPr lang="en-US" smtClean="0"/>
               <a:pPr/>
-              <a:t>10/15/14</a:t>
+              <a:t>10/18/2014</a:t>
             </a:fld>
             <a:endParaRPr lang="en-US"/>
           </a:p>
@@ -14765,6 +15720,108 @@
           <a:p>
             <a:r>
               <a:rPr lang="en-US" dirty="0"/>
+              <a:t>20 </a:t>
+            </a:r>
+            <a:r>
+              <a:rPr lang="en-US" dirty="0" smtClean="0"/>
+              <a:t>Most </a:t>
+            </a:r>
+            <a:r>
+              <a:rPr lang="en-US" dirty="0"/>
+              <a:t>D</a:t>
+            </a:r>
+            <a:r>
+              <a:rPr lang="en-US" dirty="0" smtClean="0"/>
+              <a:t>iscriminative </a:t>
+            </a:r>
+            <a:r>
+              <a:rPr lang="en-US" dirty="0"/>
+              <a:t>T</a:t>
+            </a:r>
+            <a:r>
+              <a:rPr lang="en-US" dirty="0" smtClean="0"/>
+              <a:t>erms </a:t>
+            </a:r>
+            <a:r>
+              <a:rPr lang="en-US"/>
+              <a:t>per C</a:t>
+            </a:r>
+            <a:r>
+              <a:rPr lang="en-US" smtClean="0"/>
+              <a:t>luster</a:t>
+            </a:r>
+            <a:endParaRPr lang="en-US" dirty="0"/>
+          </a:p>
+        </p:txBody>
+      </p:sp>
+    </p:spTree>
+    <p:extLst>
+      <p:ext uri="{BB962C8B-B14F-4D97-AF65-F5344CB8AC3E}">
+        <p14:creationId xmlns:p14="http://schemas.microsoft.com/office/powerpoint/2010/main" val="1381074220"/>
+      </p:ext>
+    </p:extLst>
+  </p:cSld>
+  <p:clrMapOvr>
+    <a:masterClrMapping/>
+  </p:clrMapOvr>
+</p:sld>
+</file>
+
+<file path=ppt/slides/slide11.xml><?xml version="1.0" encoding="utf-8"?>
+<p:sld xmlns:a="http://schemas.openxmlformats.org/drawingml/2006/main" xmlns:r="http://schemas.openxmlformats.org/officeDocument/2006/relationships" xmlns:p="http://schemas.openxmlformats.org/presentationml/2006/main">
+  <p:cSld>
+    <p:spTree>
+      <p:nvGrpSpPr>
+        <p:cNvPr id="1" name=""/>
+        <p:cNvGrpSpPr/>
+        <p:nvPr/>
+      </p:nvGrpSpPr>
+      <p:grpSpPr>
+        <a:xfrm>
+          <a:off x="0" y="0"/>
+          <a:ext cx="0" cy="0"/>
+          <a:chOff x="0" y="0"/>
+          <a:chExt cx="0" cy="0"/>
+        </a:xfrm>
+      </p:grpSpPr>
+      <p:sp>
+        <p:nvSpPr>
+          <p:cNvPr id="2" name="Content Placeholder 1"/>
+          <p:cNvSpPr>
+            <a:spLocks noGrp="1"/>
+          </p:cNvSpPr>
+          <p:nvPr>
+            <p:ph idx="1"/>
+          </p:nvPr>
+        </p:nvSpPr>
+        <p:spPr/>
+        <p:txBody>
+          <a:bodyPr/>
+          <a:lstStyle/>
+          <a:p>
+            <a:endParaRPr lang="en-US"/>
+          </a:p>
+        </p:txBody>
+      </p:sp>
+      <p:sp>
+        <p:nvSpPr>
+          <p:cNvPr id="3" name="Title 2"/>
+          <p:cNvSpPr>
+            <a:spLocks noGrp="1"/>
+          </p:cNvSpPr>
+          <p:nvPr>
+            <p:ph type="title"/>
+          </p:nvPr>
+        </p:nvSpPr>
+        <p:spPr/>
+        <p:txBody>
+          <a:bodyPr>
+            <a:normAutofit fontScale="90000"/>
+          </a:bodyPr>
+          <a:lstStyle/>
+          <a:p>
+            <a:r>
+              <a:rPr lang="en-US" dirty="0"/>
               <a:t>V</a:t>
             </a:r>
             <a:r>
@@ -14781,11 +15838,7 @@
             </a:r>
             <a:r>
               <a:rPr lang="en-US" dirty="0"/>
-              <a:t>and </a:t>
-            </a:r>
-            <a:r>
-              <a:rPr lang="en-US" dirty="0"/>
-              <a:t>T</a:t>
+              <a:t>and T</a:t>
             </a:r>
             <a:r>
               <a:rPr lang="en-US" dirty="0" smtClean="0"/>
@@ -14837,12 +15890,124 @@
         </p:nvSpPr>
         <p:spPr/>
         <p:txBody>
-          <a:bodyPr/>
+          <a:bodyPr>
+            <a:normAutofit lnSpcReduction="10000"/>
+          </a:bodyPr>
           <a:lstStyle/>
+          <a:p>
+            <a:r>
+              <a:rPr lang="en-US" dirty="0" smtClean="0"/>
+              <a:t>Anatomy of a Request</a:t>
+            </a:r>
+          </a:p>
           <a:p>
             <a:pPr marL="0" indent="0">
               <a:buNone/>
             </a:pPr>
+            <a:r>
+              <a:rPr lang="en-US" sz="2000" dirty="0"/>
+              <a:t>$URL = $</a:t>
+            </a:r>
+            <a:r>
+              <a:rPr lang="en-US" sz="2000" dirty="0" err="1"/>
+              <a:t>baseURL</a:t>
+            </a:r>
+            <a:r>
+              <a:rPr lang="en-US" sz="2000" dirty="0"/>
+              <a:t> . $</a:t>
+            </a:r>
+            <a:r>
+              <a:rPr lang="en-US" sz="2000" dirty="0" smtClean="0"/>
+              <a:t>source </a:t>
+            </a:r>
+            <a:r>
+              <a:rPr lang="en-US" sz="2000" dirty="0"/>
+              <a:t>. $section . $format . "?" . $offset . $</a:t>
+            </a:r>
+            <a:r>
+              <a:rPr lang="en-US" sz="2000" dirty="0" smtClean="0"/>
+              <a:t>key;</a:t>
+            </a:r>
+          </a:p>
+          <a:p>
+            <a:pPr marL="0" indent="0">
+              <a:buNone/>
+            </a:pPr>
+            <a:r>
+              <a:rPr lang="en-US" sz="2000" dirty="0"/>
+              <a:t>$raw = @</a:t>
+            </a:r>
+            <a:r>
+              <a:rPr lang="en-US" sz="2000" dirty="0" err="1"/>
+              <a:t>file_get_contents</a:t>
+            </a:r>
+            <a:r>
+              <a:rPr lang="en-US" sz="2000" dirty="0"/>
+              <a:t>( $URL </a:t>
+            </a:r>
+            <a:r>
+              <a:rPr lang="en-US" sz="2000" dirty="0" smtClean="0"/>
+              <a:t>);</a:t>
+            </a:r>
+          </a:p>
+          <a:p>
+            <a:pPr marL="0" indent="0">
+              <a:buNone/>
+            </a:pPr>
+            <a:r>
+              <a:rPr lang="en-US" sz="2000" dirty="0" smtClean="0"/>
+              <a:t>$response = </a:t>
+            </a:r>
+            <a:r>
+              <a:rPr lang="en-US" sz="2000" dirty="0" err="1" smtClean="0"/>
+              <a:t>unserialize</a:t>
+            </a:r>
+            <a:r>
+              <a:rPr lang="en-US" sz="2000" dirty="0" smtClean="0"/>
+              <a:t>( $raw );</a:t>
+            </a:r>
+          </a:p>
+          <a:p>
+            <a:pPr marL="0" indent="0">
+              <a:buNone/>
+            </a:pPr>
+            <a:endParaRPr lang="en-US" sz="2000" dirty="0"/>
+          </a:p>
+          <a:p>
+            <a:r>
+              <a:rPr lang="en-US" dirty="0" smtClean="0"/>
+              <a:t>Reattempt if encounter errors</a:t>
+            </a:r>
+          </a:p>
+          <a:p>
+            <a:pPr marL="0" indent="0">
+              <a:buNone/>
+            </a:pPr>
+            <a:r>
+              <a:rPr lang="en-US" sz="2000" dirty="0" smtClean="0"/>
+              <a:t>if</a:t>
+            </a:r>
+            <a:r>
+              <a:rPr lang="en-US" sz="2000" dirty="0"/>
+              <a:t>( $response["status"] == "OK" ) </a:t>
+            </a:r>
+            <a:r>
+              <a:rPr lang="en-US" sz="2000" dirty="0" smtClean="0"/>
+              <a:t>{ … }</a:t>
+            </a:r>
+            <a:endParaRPr lang="en-US" sz="2000" dirty="0"/>
+          </a:p>
+          <a:p>
+            <a:pPr marL="0" indent="0">
+              <a:buNone/>
+            </a:pPr>
+            <a:endParaRPr lang="en-US" sz="2000" dirty="0" smtClean="0"/>
+          </a:p>
+          <a:p>
+            <a:r>
+              <a:rPr lang="en-US" dirty="0" smtClean="0"/>
+              <a:t>Store all raw files!!!</a:t>
+            </a:r>
             <a:endParaRPr lang="en-US" dirty="0"/>
           </a:p>
         </p:txBody>
@@ -14881,17 +16046,188 @@
     </p:spTree>
     <p:extLst>
       <p:ext uri="{BB962C8B-B14F-4D97-AF65-F5344CB8AC3E}">
-        <p14:creationId xmlns:p14="http://schemas.microsoft.com/office/powerpoint/2010/main" val="1654103745"/>
+        <p14:creationId xmlns:p14="http://schemas.microsoft.com/office/powerpoint/2010/main" val="3126703736"/>
       </p:ext>
     </p:extLst>
   </p:cSld>
   <p:clrMapOvr>
     <a:masterClrMapping/>
   </p:clrMapOvr>
+  <p:timing>
+    <p:tnLst>
+      <p:par>
+        <p:cTn id="1" dur="indefinite" restart="never" nodeType="tmRoot"/>
+      </p:par>
+    </p:tnLst>
+  </p:timing>
 </p:sld>
 </file>
 
 <file path=ppt/slides/slide3.xml><?xml version="1.0" encoding="utf-8"?>
+<p:sld xmlns:a="http://schemas.openxmlformats.org/drawingml/2006/main" xmlns:r="http://schemas.openxmlformats.org/officeDocument/2006/relationships" xmlns:p="http://schemas.openxmlformats.org/presentationml/2006/main">
+  <p:cSld>
+    <p:spTree>
+      <p:nvGrpSpPr>
+        <p:cNvPr id="1" name=""/>
+        <p:cNvGrpSpPr/>
+        <p:nvPr/>
+      </p:nvGrpSpPr>
+      <p:grpSpPr>
+        <a:xfrm>
+          <a:off x="0" y="0"/>
+          <a:ext cx="0" cy="0"/>
+          <a:chOff x="0" y="0"/>
+          <a:chExt cx="0" cy="0"/>
+        </a:xfrm>
+      </p:grpSpPr>
+      <p:sp>
+        <p:nvSpPr>
+          <p:cNvPr id="2" name="Content Placeholder 1"/>
+          <p:cNvSpPr>
+            <a:spLocks noGrp="1"/>
+          </p:cNvSpPr>
+          <p:nvPr>
+            <p:ph idx="1"/>
+          </p:nvPr>
+        </p:nvSpPr>
+        <p:spPr/>
+        <p:txBody>
+          <a:bodyPr>
+            <a:normAutofit lnSpcReduction="10000"/>
+          </a:bodyPr>
+          <a:lstStyle/>
+          <a:p>
+            <a:r>
+              <a:rPr lang="en-US" dirty="0" smtClean="0"/>
+              <a:t>Combine all raw files into a single PHP array where the URL is the “unique” key, thereby eliminating duplicates.</a:t>
+            </a:r>
+          </a:p>
+          <a:p>
+            <a:endParaRPr lang="en-US" dirty="0" smtClean="0"/>
+          </a:p>
+          <a:p>
+            <a:r>
+              <a:rPr lang="en-US" dirty="0" smtClean="0"/>
+              <a:t>We then mapped each URL to a unique numerical ID, and output a file containing the abstract and has the ID as filename.</a:t>
+            </a:r>
+          </a:p>
+          <a:p>
+            <a:endParaRPr lang="en-US" dirty="0"/>
+          </a:p>
+          <a:p>
+            <a:r>
+              <a:rPr lang="en-US" dirty="0" smtClean="0"/>
+              <a:t>Downloaded a combined 41,116 unique documents.</a:t>
+            </a:r>
+            <a:endParaRPr lang="en-US" dirty="0"/>
+          </a:p>
+        </p:txBody>
+      </p:sp>
+      <p:sp>
+        <p:nvSpPr>
+          <p:cNvPr id="3" name="Title 2"/>
+          <p:cNvSpPr>
+            <a:spLocks noGrp="1"/>
+          </p:cNvSpPr>
+          <p:nvPr>
+            <p:ph type="title"/>
+          </p:nvPr>
+        </p:nvSpPr>
+        <p:spPr/>
+        <p:txBody>
+          <a:bodyPr/>
+          <a:lstStyle/>
+          <a:p>
+            <a:r>
+              <a:rPr lang="en-US" b="1" dirty="0" smtClean="0"/>
+              <a:t>Preprocessing The Abstracts</a:t>
+            </a:r>
+            <a:endParaRPr lang="en-US" dirty="0"/>
+          </a:p>
+        </p:txBody>
+      </p:sp>
+    </p:spTree>
+    <p:extLst>
+      <p:ext uri="{BB962C8B-B14F-4D97-AF65-F5344CB8AC3E}">
+        <p14:creationId xmlns:p14="http://schemas.microsoft.com/office/powerpoint/2010/main" val="257930372"/>
+      </p:ext>
+    </p:extLst>
+  </p:cSld>
+  <p:clrMapOvr>
+    <a:masterClrMapping/>
+  </p:clrMapOvr>
+  <p:timing>
+    <p:tnLst>
+      <p:par>
+        <p:cTn id="1" dur="indefinite" restart="never" nodeType="tmRoot"/>
+      </p:par>
+    </p:tnLst>
+  </p:timing>
+</p:sld>
+</file>
+
+<file path=ppt/slides/slide4.xml><?xml version="1.0" encoding="utf-8"?>
+<p:sld xmlns:a="http://schemas.openxmlformats.org/drawingml/2006/main" xmlns:r="http://schemas.openxmlformats.org/officeDocument/2006/relationships" xmlns:p="http://schemas.openxmlformats.org/presentationml/2006/main">
+  <p:cSld>
+    <p:spTree>
+      <p:nvGrpSpPr>
+        <p:cNvPr id="1" name=""/>
+        <p:cNvGrpSpPr/>
+        <p:nvPr/>
+      </p:nvGrpSpPr>
+      <p:grpSpPr>
+        <a:xfrm>
+          <a:off x="0" y="0"/>
+          <a:ext cx="0" cy="0"/>
+          <a:chOff x="0" y="0"/>
+          <a:chExt cx="0" cy="0"/>
+        </a:xfrm>
+      </p:grpSpPr>
+      <p:graphicFrame>
+        <p:nvGraphicFramePr>
+          <p:cNvPr id="4" name="Chart 3"/>
+          <p:cNvGraphicFramePr>
+            <a:graphicFrameLocks/>
+          </p:cNvGraphicFramePr>
+          <p:nvPr>
+            <p:extLst>
+              <p:ext uri="{D42A27DB-BD31-4B8C-83A1-F6EECF244321}">
+                <p14:modId xmlns:p14="http://schemas.microsoft.com/office/powerpoint/2010/main" val="225065879"/>
+              </p:ext>
+            </p:extLst>
+          </p:nvPr>
+        </p:nvGraphicFramePr>
+        <p:xfrm>
+          <a:off x="0" y="1366574"/>
+          <a:ext cx="9144000" cy="5395966"/>
+        </p:xfrm>
+        <a:graphic>
+          <a:graphicData uri="http://schemas.openxmlformats.org/drawingml/2006/chart">
+            <c:chart xmlns:c="http://schemas.openxmlformats.org/drawingml/2006/chart" xmlns:r="http://schemas.openxmlformats.org/officeDocument/2006/relationships" r:id="rId3"/>
+          </a:graphicData>
+        </a:graphic>
+      </p:graphicFrame>
+    </p:spTree>
+    <p:extLst>
+      <p:ext uri="{BB962C8B-B14F-4D97-AF65-F5344CB8AC3E}">
+        <p14:creationId xmlns:p14="http://schemas.microsoft.com/office/powerpoint/2010/main" val="1579321341"/>
+      </p:ext>
+    </p:extLst>
+  </p:cSld>
+  <p:clrMapOvr>
+    <a:masterClrMapping/>
+  </p:clrMapOvr>
+  <p:timing>
+    <p:tnLst>
+      <p:par>
+        <p:cTn id="1" dur="indefinite" restart="never" nodeType="tmRoot"/>
+      </p:par>
+    </p:tnLst>
+  </p:timing>
+</p:sld>
+</file>
+
+<file path=ppt/slides/slide5.xml><?xml version="1.0" encoding="utf-8"?>
 <p:sld xmlns:a="http://schemas.openxmlformats.org/drawingml/2006/main" xmlns:r="http://schemas.openxmlformats.org/officeDocument/2006/relationships" xmlns:p="http://schemas.openxmlformats.org/presentationml/2006/main">
   <p:cSld>
     <p:spTree>
@@ -14943,8 +16279,16 @@
           <a:lstStyle/>
           <a:p>
             <a:r>
-              <a:rPr lang="en-US" b="1" dirty="0" smtClean="0"/>
-              <a:t>Preprocessing The Abstracts</a:t>
+              <a:rPr lang="nl-NL" dirty="0"/>
+              <a:t>W</a:t>
+            </a:r>
+            <a:r>
+              <a:rPr lang="nl-NL" dirty="0" smtClean="0"/>
+              <a:t>ord </a:t>
+            </a:r>
+            <a:r>
+              <a:rPr lang="nl-NL" dirty="0" smtClean="0"/>
+              <a:t>Stemming and Stop Words</a:t>
             </a:r>
             <a:endParaRPr lang="en-US" dirty="0"/>
           </a:p>
@@ -14953,7 +16297,7 @@
     </p:spTree>
     <p:extLst>
       <p:ext uri="{BB962C8B-B14F-4D97-AF65-F5344CB8AC3E}">
-        <p14:creationId xmlns:p14="http://schemas.microsoft.com/office/powerpoint/2010/main" val="2489511203"/>
+        <p14:creationId xmlns:p14="http://schemas.microsoft.com/office/powerpoint/2010/main" val="562862890"/>
       </p:ext>
     </p:extLst>
   </p:cSld>
@@ -14963,7 +16307,7 @@
 </p:sld>
 </file>
 
-<file path=ppt/slides/slide4.xml><?xml version="1.0" encoding="utf-8"?>
+<file path=ppt/slides/slide6.xml><?xml version="1.0" encoding="utf-8"?>
 <p:sld xmlns:a="http://schemas.openxmlformats.org/drawingml/2006/main" xmlns:r="http://schemas.openxmlformats.org/officeDocument/2006/relationships" xmlns:p="http://schemas.openxmlformats.org/presentationml/2006/main">
   <p:cSld>
     <p:spTree>
@@ -14995,7 +16339,68 @@
           <a:bodyPr/>
           <a:lstStyle/>
           <a:p>
-            <a:endParaRPr lang="en-US"/>
+            <a:r>
+              <a:rPr lang="en-US" dirty="0" smtClean="0"/>
+              <a:t>Convert a directory of documents </a:t>
+            </a:r>
+            <a:r>
+              <a:rPr lang="en-US" dirty="0" smtClean="0"/>
+              <a:t>into a single &lt;</a:t>
+            </a:r>
+            <a:r>
+              <a:rPr lang="en-US" dirty="0" err="1" smtClean="0"/>
+              <a:t>key,value</a:t>
+            </a:r>
+            <a:r>
+              <a:rPr lang="en-US" dirty="0" smtClean="0"/>
+              <a:t>&gt; file</a:t>
+            </a:r>
+          </a:p>
+          <a:p>
+            <a:pPr lvl="1"/>
+            <a:r>
+              <a:rPr lang="en-US" dirty="0" smtClean="0"/>
+              <a:t>Key: ( word, </a:t>
+            </a:r>
+            <a:r>
+              <a:rPr lang="en-US" dirty="0" err="1" smtClean="0"/>
+              <a:t>docID</a:t>
+            </a:r>
+            <a:r>
+              <a:rPr lang="en-US" dirty="0" smtClean="0"/>
+              <a:t> )</a:t>
+            </a:r>
+          </a:p>
+          <a:p>
+            <a:pPr lvl="1"/>
+            <a:r>
+              <a:rPr lang="en-US" dirty="0" smtClean="0"/>
+              <a:t>Value: # this word in this document</a:t>
+            </a:r>
+          </a:p>
+          <a:p>
+            <a:pPr lvl="1"/>
+            <a:endParaRPr lang="en-US" dirty="0" smtClean="0"/>
+          </a:p>
+          <a:p>
+            <a:r>
+              <a:rPr lang="en-US" dirty="0" smtClean="0"/>
+              <a:t>Word Stemming and Stop Word removal</a:t>
+            </a:r>
+          </a:p>
+          <a:p>
+            <a:endParaRPr lang="en-US" dirty="0"/>
+          </a:p>
+          <a:p>
+            <a:r>
+              <a:rPr lang="en-US" dirty="0" smtClean="0"/>
+              <a:t>Took about 50 minutes on </a:t>
+            </a:r>
+            <a:r>
+              <a:rPr lang="en-US" dirty="0" err="1" smtClean="0"/>
+              <a:t>Galles</a:t>
+            </a:r>
+            <a:endParaRPr lang="en-US" dirty="0" smtClean="0"/>
           </a:p>
         </p:txBody>
       </p:sp>
@@ -15011,100 +16416,29 @@
         </p:nvSpPr>
         <p:spPr/>
         <p:txBody>
-          <a:bodyPr/>
+          <a:bodyPr>
+            <a:normAutofit fontScale="90000"/>
+          </a:bodyPr>
           <a:lstStyle/>
           <a:p>
             <a:r>
-              <a:rPr lang="nl-NL" dirty="0"/>
-              <a:t>W</a:t>
+              <a:rPr lang="en-US" dirty="0" smtClean="0"/>
+              <a:t>Calculating TF-IDF with </a:t>
             </a:r>
             <a:r>
-              <a:rPr lang="nl-NL" dirty="0" smtClean="0"/>
-              <a:t>ord </a:t>
-            </a:r>
-            <a:r>
-              <a:rPr lang="nl-NL" dirty="0"/>
-              <a:t>S</a:t>
-            </a:r>
-            <a:r>
-              <a:rPr lang="nl-NL" dirty="0" smtClean="0"/>
-              <a:t>temming</a:t>
-            </a:r>
-            <a:endParaRPr lang="en-US" dirty="0"/>
-          </a:p>
-        </p:txBody>
-      </p:sp>
-    </p:spTree>
-    <p:extLst>
-      <p:ext uri="{BB962C8B-B14F-4D97-AF65-F5344CB8AC3E}">
-        <p14:creationId xmlns:p14="http://schemas.microsoft.com/office/powerpoint/2010/main" val="562862890"/>
-      </p:ext>
-    </p:extLst>
-  </p:cSld>
-  <p:clrMapOvr>
-    <a:masterClrMapping/>
-  </p:clrMapOvr>
-</p:sld>
-</file>
-
-<file path=ppt/slides/slide5.xml><?xml version="1.0" encoding="utf-8"?>
-<p:sld xmlns:a="http://schemas.openxmlformats.org/drawingml/2006/main" xmlns:r="http://schemas.openxmlformats.org/officeDocument/2006/relationships" xmlns:p="http://schemas.openxmlformats.org/presentationml/2006/main">
-  <p:cSld>
-    <p:spTree>
-      <p:nvGrpSpPr>
-        <p:cNvPr id="1" name=""/>
-        <p:cNvGrpSpPr/>
-        <p:nvPr/>
-      </p:nvGrpSpPr>
-      <p:grpSpPr>
-        <a:xfrm>
-          <a:off x="0" y="0"/>
-          <a:ext cx="0" cy="0"/>
-          <a:chOff x="0" y="0"/>
-          <a:chExt cx="0" cy="0"/>
-        </a:xfrm>
-      </p:grpSpPr>
-      <p:sp>
-        <p:nvSpPr>
-          <p:cNvPr id="2" name="Content Placeholder 1"/>
-          <p:cNvSpPr>
-            <a:spLocks noGrp="1"/>
-          </p:cNvSpPr>
-          <p:nvPr>
-            <p:ph idx="1"/>
-          </p:nvPr>
-        </p:nvSpPr>
-        <p:spPr/>
-        <p:txBody>
-          <a:bodyPr/>
-          <a:lstStyle/>
-          <a:p>
-            <a:endParaRPr lang="en-US"/>
-          </a:p>
-        </p:txBody>
-      </p:sp>
-      <p:sp>
-        <p:nvSpPr>
-          <p:cNvPr id="3" name="Title 2"/>
-          <p:cNvSpPr>
-            <a:spLocks noGrp="1"/>
-          </p:cNvSpPr>
-          <p:nvPr>
-            <p:ph type="title"/>
-          </p:nvPr>
-        </p:nvSpPr>
-        <p:spPr/>
-        <p:txBody>
-          <a:bodyPr/>
-          <a:lstStyle/>
-          <a:p>
-            <a:r>
-              <a:rPr lang="en-US" dirty="0"/>
-              <a:t>TF-</a:t>
+              <a:rPr lang="en-US" dirty="0" err="1" smtClean="0"/>
+              <a:t>MapReduce</a:t>
             </a:r>
             <a:r>
               <a:rPr lang="en-US" dirty="0" smtClean="0"/>
-              <a:t>IDF</a:t>
+              <a:t/>
+            </a:r>
+            <a:br>
+              <a:rPr lang="en-US" dirty="0" smtClean="0"/>
+            </a:br>
+            <a:r>
+              <a:rPr lang="en-US" dirty="0" smtClean="0"/>
+              <a:t>First Run</a:t>
             </a:r>
             <a:endParaRPr lang="en-US" dirty="0"/>
           </a:p>
@@ -15123,7 +16457,7 @@
 </p:sld>
 </file>
 
-<file path=ppt/slides/slide6.xml><?xml version="1.0" encoding="utf-8"?>
+<file path=ppt/slides/slide7.xml><?xml version="1.0" encoding="utf-8"?>
 <p:sld xmlns:a="http://schemas.openxmlformats.org/drawingml/2006/main" xmlns:r="http://schemas.openxmlformats.org/officeDocument/2006/relationships" xmlns:p="http://schemas.openxmlformats.org/presentationml/2006/main">
   <p:cSld>
     <p:spTree>
@@ -15221,7 +16555,7 @@
 </p:sld>
 </file>
 
-<file path=ppt/slides/slide7.xml><?xml version="1.0" encoding="utf-8"?>
+<file path=ppt/slides/slide8.xml><?xml version="1.0" encoding="utf-8"?>
 <p:sld xmlns:a="http://schemas.openxmlformats.org/drawingml/2006/main" xmlns:r="http://schemas.openxmlformats.org/officeDocument/2006/relationships" xmlns:p="http://schemas.openxmlformats.org/presentationml/2006/main">
   <p:cSld>
     <p:spTree>
@@ -15297,7 +16631,7 @@
 </p:sld>
 </file>
 
-<file path=ppt/slides/slide8.xml><?xml version="1.0" encoding="utf-8"?>
+<file path=ppt/slides/slide9.xml><?xml version="1.0" encoding="utf-8"?>
 <p:sld xmlns:a="http://schemas.openxmlformats.org/drawingml/2006/main" xmlns:r="http://schemas.openxmlformats.org/officeDocument/2006/relationships" xmlns:p="http://schemas.openxmlformats.org/presentationml/2006/main">
   <p:cSld>
     <p:spTree>
@@ -15378,112 +16712,6 @@
     <p:extLst>
       <p:ext uri="{BB962C8B-B14F-4D97-AF65-F5344CB8AC3E}">
         <p14:creationId xmlns:p14="http://schemas.microsoft.com/office/powerpoint/2010/main" val="1275797778"/>
-      </p:ext>
-    </p:extLst>
-  </p:cSld>
-  <p:clrMapOvr>
-    <a:masterClrMapping/>
-  </p:clrMapOvr>
-</p:sld>
-</file>
-
-<file path=ppt/slides/slide9.xml><?xml version="1.0" encoding="utf-8"?>
-<p:sld xmlns:a="http://schemas.openxmlformats.org/drawingml/2006/main" xmlns:r="http://schemas.openxmlformats.org/officeDocument/2006/relationships" xmlns:p="http://schemas.openxmlformats.org/presentationml/2006/main">
-  <p:cSld>
-    <p:spTree>
-      <p:nvGrpSpPr>
-        <p:cNvPr id="1" name=""/>
-        <p:cNvGrpSpPr/>
-        <p:nvPr/>
-      </p:nvGrpSpPr>
-      <p:grpSpPr>
-        <a:xfrm>
-          <a:off x="0" y="0"/>
-          <a:ext cx="0" cy="0"/>
-          <a:chOff x="0" y="0"/>
-          <a:chExt cx="0" cy="0"/>
-        </a:xfrm>
-      </p:grpSpPr>
-      <p:sp>
-        <p:nvSpPr>
-          <p:cNvPr id="2" name="Content Placeholder 1"/>
-          <p:cNvSpPr>
-            <a:spLocks noGrp="1"/>
-          </p:cNvSpPr>
-          <p:nvPr>
-            <p:ph idx="1"/>
-          </p:nvPr>
-        </p:nvSpPr>
-        <p:spPr/>
-        <p:txBody>
-          <a:bodyPr/>
-          <a:lstStyle/>
-          <a:p>
-            <a:endParaRPr lang="en-US"/>
-          </a:p>
-        </p:txBody>
-      </p:sp>
-      <p:sp>
-        <p:nvSpPr>
-          <p:cNvPr id="3" name="Title 2"/>
-          <p:cNvSpPr>
-            <a:spLocks noGrp="1"/>
-          </p:cNvSpPr>
-          <p:nvPr>
-            <p:ph type="title"/>
-          </p:nvPr>
-        </p:nvSpPr>
-        <p:spPr/>
-        <p:txBody>
-          <a:bodyPr>
-            <a:normAutofit fontScale="90000"/>
-          </a:bodyPr>
-          <a:lstStyle/>
-          <a:p>
-            <a:r>
-              <a:rPr lang="en-US" dirty="0"/>
-              <a:t>20 </a:t>
-            </a:r>
-            <a:r>
-              <a:rPr lang="en-US" dirty="0" smtClean="0"/>
-              <a:t>Most </a:t>
-            </a:r>
-            <a:r>
-              <a:rPr lang="en-US" dirty="0"/>
-              <a:t>D</a:t>
-            </a:r>
-            <a:r>
-              <a:rPr lang="en-US" dirty="0" smtClean="0"/>
-              <a:t>iscriminative </a:t>
-            </a:r>
-            <a:r>
-              <a:rPr lang="en-US" dirty="0"/>
-              <a:t>T</a:t>
-            </a:r>
-            <a:r>
-              <a:rPr lang="en-US" dirty="0" smtClean="0"/>
-              <a:t>erms </a:t>
-            </a:r>
-            <a:r>
-              <a:rPr lang="en-US"/>
-              <a:t>per </a:t>
-            </a:r>
-            <a:r>
-              <a:rPr lang="en-US"/>
-              <a:t>C</a:t>
-            </a:r>
-            <a:r>
-              <a:rPr lang="en-US" smtClean="0"/>
-              <a:t>luster</a:t>
-            </a:r>
-            <a:endParaRPr lang="en-US" dirty="0"/>
-          </a:p>
-        </p:txBody>
-      </p:sp>
-    </p:spTree>
-    <p:extLst>
-      <p:ext uri="{BB962C8B-B14F-4D97-AF65-F5344CB8AC3E}">
-        <p14:creationId xmlns:p14="http://schemas.microsoft.com/office/powerpoint/2010/main" val="1381074220"/>
       </p:ext>
     </p:extLst>
   </p:cSld>
@@ -15787,4 +17015,289 @@
   <a:objectDefaults/>
   <a:extraClrSchemeLst/>
 </a:theme>
+</file>
+
+<file path=ppt/theme/theme2.xml><?xml version="1.0" encoding="utf-8"?>
+<a:theme xmlns:a="http://schemas.openxmlformats.org/drawingml/2006/main" name="Office Theme">
+  <a:themeElements>
+    <a:clrScheme name="Office">
+      <a:dk1>
+        <a:sysClr val="windowText" lastClr="000000"/>
+      </a:dk1>
+      <a:lt1>
+        <a:sysClr val="window" lastClr="FFFFFF"/>
+      </a:lt1>
+      <a:dk2>
+        <a:srgbClr val="1F497D"/>
+      </a:dk2>
+      <a:lt2>
+        <a:srgbClr val="EEECE1"/>
+      </a:lt2>
+      <a:accent1>
+        <a:srgbClr val="4F81BD"/>
+      </a:accent1>
+      <a:accent2>
+        <a:srgbClr val="C0504D"/>
+      </a:accent2>
+      <a:accent3>
+        <a:srgbClr val="9BBB59"/>
+      </a:accent3>
+      <a:accent4>
+        <a:srgbClr val="8064A2"/>
+      </a:accent4>
+      <a:accent5>
+        <a:srgbClr val="4BACC6"/>
+      </a:accent5>
+      <a:accent6>
+        <a:srgbClr val="F79646"/>
+      </a:accent6>
+      <a:hlink>
+        <a:srgbClr val="0000FF"/>
+      </a:hlink>
+      <a:folHlink>
+        <a:srgbClr val="800080"/>
+      </a:folHlink>
+    </a:clrScheme>
+    <a:fontScheme name="Office">
+      <a:majorFont>
+        <a:latin typeface="Calibri"/>
+        <a:ea typeface=""/>
+        <a:cs typeface=""/>
+        <a:font script="Jpan" typeface="ＭＳ Ｐゴシック"/>
+        <a:font script="Hang" typeface="맑은 고딕"/>
+        <a:font script="Hans" typeface="宋体"/>
+        <a:font script="Hant" typeface="新細明體"/>
+        <a:font script="Arab" typeface="Times New Roman"/>
+        <a:font script="Hebr" typeface="Times New Roman"/>
+        <a:font script="Thai" typeface="Angsana New"/>
+        <a:font script="Ethi" typeface="Nyala"/>
+        <a:font script="Beng" typeface="Vrinda"/>
+        <a:font script="Gujr" typeface="Shruti"/>
+        <a:font script="Khmr" typeface="MoolBoran"/>
+        <a:font script="Knda" typeface="Tunga"/>
+        <a:font script="Guru" typeface="Raavi"/>
+        <a:font script="Cans" typeface="Euphemia"/>
+        <a:font script="Cher" typeface="Plantagenet Cherokee"/>
+        <a:font script="Yiii" typeface="Microsoft Yi Baiti"/>
+        <a:font script="Tibt" typeface="Microsoft Himalaya"/>
+        <a:font script="Thaa" typeface="MV Boli"/>
+        <a:font script="Deva" typeface="Mangal"/>
+        <a:font script="Telu" typeface="Gautami"/>
+        <a:font script="Taml" typeface="Latha"/>
+        <a:font script="Syrc" typeface="Estrangelo Edessa"/>
+        <a:font script="Orya" typeface="Kalinga"/>
+        <a:font script="Mlym" typeface="Kartika"/>
+        <a:font script="Laoo" typeface="DokChampa"/>
+        <a:font script="Sinh" typeface="Iskoola Pota"/>
+        <a:font script="Mong" typeface="Mongolian Baiti"/>
+        <a:font script="Viet" typeface="Times New Roman"/>
+        <a:font script="Uigh" typeface="Microsoft Uighur"/>
+        <a:font script="Geor" typeface="Sylfaen"/>
+      </a:majorFont>
+      <a:minorFont>
+        <a:latin typeface="Calibri"/>
+        <a:ea typeface=""/>
+        <a:cs typeface=""/>
+        <a:font script="Jpan" typeface="ＭＳ Ｐゴシック"/>
+        <a:font script="Hang" typeface="맑은 고딕"/>
+        <a:font script="Hans" typeface="宋体"/>
+        <a:font script="Hant" typeface="新細明體"/>
+        <a:font script="Arab" typeface="Arial"/>
+        <a:font script="Hebr" typeface="Arial"/>
+        <a:font script="Thai" typeface="Cordia New"/>
+        <a:font script="Ethi" typeface="Nyala"/>
+        <a:font script="Beng" typeface="Vrinda"/>
+        <a:font script="Gujr" typeface="Shruti"/>
+        <a:font script="Khmr" typeface="DaunPenh"/>
+        <a:font script="Knda" typeface="Tunga"/>
+        <a:font script="Guru" typeface="Raavi"/>
+        <a:font script="Cans" typeface="Euphemia"/>
+        <a:font script="Cher" typeface="Plantagenet Cherokee"/>
+        <a:font script="Yiii" typeface="Microsoft Yi Baiti"/>
+        <a:font script="Tibt" typeface="Microsoft Himalaya"/>
+        <a:font script="Thaa" typeface="MV Boli"/>
+        <a:font script="Deva" typeface="Mangal"/>
+        <a:font script="Telu" typeface="Gautami"/>
+        <a:font script="Taml" typeface="Latha"/>
+        <a:font script="Syrc" typeface="Estrangelo Edessa"/>
+        <a:font script="Orya" typeface="Kalinga"/>
+        <a:font script="Mlym" typeface="Kartika"/>
+        <a:font script="Laoo" typeface="DokChampa"/>
+        <a:font script="Sinh" typeface="Iskoola Pota"/>
+        <a:font script="Mong" typeface="Mongolian Baiti"/>
+        <a:font script="Viet" typeface="Arial"/>
+        <a:font script="Uigh" typeface="Microsoft Uighur"/>
+        <a:font script="Geor" typeface="Sylfaen"/>
+      </a:minorFont>
+    </a:fontScheme>
+    <a:fmtScheme name="Office">
+      <a:fillStyleLst>
+        <a:solidFill>
+          <a:schemeClr val="phClr"/>
+        </a:solidFill>
+        <a:gradFill rotWithShape="1">
+          <a:gsLst>
+            <a:gs pos="0">
+              <a:schemeClr val="phClr">
+                <a:tint val="50000"/>
+                <a:satMod val="300000"/>
+              </a:schemeClr>
+            </a:gs>
+            <a:gs pos="35000">
+              <a:schemeClr val="phClr">
+                <a:tint val="37000"/>
+                <a:satMod val="300000"/>
+              </a:schemeClr>
+            </a:gs>
+            <a:gs pos="100000">
+              <a:schemeClr val="phClr">
+                <a:tint val="15000"/>
+                <a:satMod val="350000"/>
+              </a:schemeClr>
+            </a:gs>
+          </a:gsLst>
+          <a:lin ang="16200000" scaled="1"/>
+        </a:gradFill>
+        <a:gradFill rotWithShape="1">
+          <a:gsLst>
+            <a:gs pos="0">
+              <a:schemeClr val="phClr">
+                <a:shade val="51000"/>
+                <a:satMod val="130000"/>
+              </a:schemeClr>
+            </a:gs>
+            <a:gs pos="80000">
+              <a:schemeClr val="phClr">
+                <a:shade val="93000"/>
+                <a:satMod val="130000"/>
+              </a:schemeClr>
+            </a:gs>
+            <a:gs pos="100000">
+              <a:schemeClr val="phClr">
+                <a:shade val="94000"/>
+                <a:satMod val="135000"/>
+              </a:schemeClr>
+            </a:gs>
+          </a:gsLst>
+          <a:lin ang="16200000" scaled="0"/>
+        </a:gradFill>
+      </a:fillStyleLst>
+      <a:lnStyleLst>
+        <a:ln w="9525" cap="flat" cmpd="sng" algn="ctr">
+          <a:solidFill>
+            <a:schemeClr val="phClr">
+              <a:shade val="95000"/>
+              <a:satMod val="105000"/>
+            </a:schemeClr>
+          </a:solidFill>
+          <a:prstDash val="solid"/>
+        </a:ln>
+        <a:ln w="25400" cap="flat" cmpd="sng" algn="ctr">
+          <a:solidFill>
+            <a:schemeClr val="phClr"/>
+          </a:solidFill>
+          <a:prstDash val="solid"/>
+        </a:ln>
+        <a:ln w="38100" cap="flat" cmpd="sng" algn="ctr">
+          <a:solidFill>
+            <a:schemeClr val="phClr"/>
+          </a:solidFill>
+          <a:prstDash val="solid"/>
+        </a:ln>
+      </a:lnStyleLst>
+      <a:effectStyleLst>
+        <a:effectStyle>
+          <a:effectLst>
+            <a:outerShdw blurRad="40000" dist="20000" dir="5400000" rotWithShape="0">
+              <a:srgbClr val="000000">
+                <a:alpha val="38000"/>
+              </a:srgbClr>
+            </a:outerShdw>
+          </a:effectLst>
+        </a:effectStyle>
+        <a:effectStyle>
+          <a:effectLst>
+            <a:outerShdw blurRad="40000" dist="23000" dir="5400000" rotWithShape="0">
+              <a:srgbClr val="000000">
+                <a:alpha val="35000"/>
+              </a:srgbClr>
+            </a:outerShdw>
+          </a:effectLst>
+        </a:effectStyle>
+        <a:effectStyle>
+          <a:effectLst>
+            <a:outerShdw blurRad="40000" dist="23000" dir="5400000" rotWithShape="0">
+              <a:srgbClr val="000000">
+                <a:alpha val="35000"/>
+              </a:srgbClr>
+            </a:outerShdw>
+          </a:effectLst>
+          <a:scene3d>
+            <a:camera prst="orthographicFront">
+              <a:rot lat="0" lon="0" rev="0"/>
+            </a:camera>
+            <a:lightRig rig="threePt" dir="t">
+              <a:rot lat="0" lon="0" rev="1200000"/>
+            </a:lightRig>
+          </a:scene3d>
+          <a:sp3d>
+            <a:bevelT w="63500" h="25400"/>
+          </a:sp3d>
+        </a:effectStyle>
+      </a:effectStyleLst>
+      <a:bgFillStyleLst>
+        <a:solidFill>
+          <a:schemeClr val="phClr"/>
+        </a:solidFill>
+        <a:gradFill rotWithShape="1">
+          <a:gsLst>
+            <a:gs pos="0">
+              <a:schemeClr val="phClr">
+                <a:tint val="40000"/>
+                <a:satMod val="350000"/>
+              </a:schemeClr>
+            </a:gs>
+            <a:gs pos="40000">
+              <a:schemeClr val="phClr">
+                <a:tint val="45000"/>
+                <a:shade val="99000"/>
+                <a:satMod val="350000"/>
+              </a:schemeClr>
+            </a:gs>
+            <a:gs pos="100000">
+              <a:schemeClr val="phClr">
+                <a:shade val="20000"/>
+                <a:satMod val="255000"/>
+              </a:schemeClr>
+            </a:gs>
+          </a:gsLst>
+          <a:path path="circle">
+            <a:fillToRect l="50000" t="-80000" r="50000" b="180000"/>
+          </a:path>
+        </a:gradFill>
+        <a:gradFill rotWithShape="1">
+          <a:gsLst>
+            <a:gs pos="0">
+              <a:schemeClr val="phClr">
+                <a:tint val="80000"/>
+                <a:satMod val="300000"/>
+              </a:schemeClr>
+            </a:gs>
+            <a:gs pos="100000">
+              <a:schemeClr val="phClr">
+                <a:shade val="30000"/>
+                <a:satMod val="200000"/>
+              </a:schemeClr>
+            </a:gs>
+          </a:gsLst>
+          <a:path path="circle">
+            <a:fillToRect l="50000" t="50000" r="50000" b="50000"/>
+          </a:path>
+        </a:gradFill>
+      </a:bgFillStyleLst>
+    </a:fmtScheme>
+  </a:themeElements>
+  <a:objectDefaults/>
+  <a:extraClrSchemeLst/>
+</a:theme>
 </file>
</xml_diff>

<commit_message>
and a few more updates to presentation
</commit_message>
<xml_diff>
--- a/Presentation.pptx
+++ b/Presentation.pptx
@@ -5,7 +5,7 @@
     <p:sldMasterId id="2147483744" r:id="rId1"/>
   </p:sldMasterIdLst>
   <p:notesMasterIdLst>
-    <p:notesMasterId r:id="rId15"/>
+    <p:notesMasterId r:id="rId16"/>
   </p:notesMasterIdLst>
   <p:sldIdLst>
     <p:sldId id="256" r:id="rId2"/>
@@ -21,6 +21,7 @@
     <p:sldId id="263" r:id="rId12"/>
     <p:sldId id="265" r:id="rId13"/>
     <p:sldId id="264" r:id="rId14"/>
+    <p:sldId id="271" r:id="rId15"/>
   </p:sldIdLst>
   <p:sldSz cx="9144000" cy="6858000" type="screen4x3"/>
   <p:notesSz cx="6858000" cy="9144000"/>
@@ -141,6 +142,7 @@
             <p14:sldId id="263"/>
             <p14:sldId id="265"/>
             <p14:sldId id="264"/>
+            <p14:sldId id="271"/>
           </p14:sldIdLst>
         </p14:section>
       </p14:sectionLst>
@@ -488,11 +490,11 @@
           <c:showBubbleSize val="0"/>
         </c:dLbls>
         <c:gapWidth val="150"/>
-        <c:axId val="63991168"/>
-        <c:axId val="64062592"/>
+        <c:axId val="112577536"/>
+        <c:axId val="45523712"/>
       </c:barChart>
       <c:catAx>
-        <c:axId val="63991168"/>
+        <c:axId val="112577536"/>
         <c:scaling>
           <c:orientation val="minMax"/>
         </c:scaling>
@@ -501,7 +503,7 @@
         <c:majorTickMark val="out"/>
         <c:minorTickMark val="none"/>
         <c:tickLblPos val="nextTo"/>
-        <c:crossAx val="64062592"/>
+        <c:crossAx val="45523712"/>
         <c:crosses val="autoZero"/>
         <c:auto val="1"/>
         <c:lblAlgn val="ctr"/>
@@ -509,7 +511,7 @@
         <c:noMultiLvlLbl val="0"/>
       </c:catAx>
       <c:valAx>
-        <c:axId val="64062592"/>
+        <c:axId val="45523712"/>
         <c:scaling>
           <c:orientation val="minMax"/>
         </c:scaling>
@@ -520,7 +522,7 @@
         <c:majorTickMark val="out"/>
         <c:minorTickMark val="none"/>
         <c:tickLblPos val="nextTo"/>
-        <c:crossAx val="63991168"/>
+        <c:crossAx val="112577536"/>
         <c:crosses val="autoZero"/>
         <c:crossBetween val="between"/>
       </c:valAx>
@@ -15795,10 +15797,82 @@
         </p:nvSpPr>
         <p:spPr/>
         <p:txBody>
-          <a:bodyPr/>
+          <a:bodyPr>
+            <a:normAutofit lnSpcReduction="10000"/>
+          </a:bodyPr>
           <a:lstStyle/>
           <a:p>
-            <a:endParaRPr lang="en-US"/>
+            <a:r>
+              <a:rPr lang="en-US" dirty="0" smtClean="0"/>
+              <a:t>We used Mahout’s version of K-Means</a:t>
+            </a:r>
+            <a:endParaRPr lang="en-US" dirty="0"/>
+          </a:p>
+          <a:p>
+            <a:r>
+              <a:rPr lang="en-US" dirty="0" smtClean="0"/>
+              <a:t>Pros:</a:t>
+            </a:r>
+          </a:p>
+          <a:p>
+            <a:pPr lvl="1"/>
+            <a:r>
+              <a:rPr lang="en-US" dirty="0" smtClean="0"/>
+              <a:t>General Purpose, the </a:t>
+            </a:r>
+            <a:r>
+              <a:rPr lang="en-US" dirty="0" err="1" smtClean="0"/>
+              <a:t>swiss</a:t>
+            </a:r>
+            <a:r>
+              <a:rPr lang="en-US" dirty="0" smtClean="0"/>
+              <a:t> army knife of </a:t>
+            </a:r>
+            <a:r>
+              <a:rPr lang="en-US" dirty="0" err="1" smtClean="0"/>
+              <a:t>clusterer’s</a:t>
+            </a:r>
+            <a:endParaRPr lang="en-US" dirty="0" smtClean="0"/>
+          </a:p>
+          <a:p>
+            <a:pPr lvl="1"/>
+            <a:r>
+              <a:rPr lang="en-US" dirty="0" smtClean="0"/>
+              <a:t>Running </a:t>
+            </a:r>
+            <a:r>
+              <a:rPr lang="en-US" dirty="0" err="1" smtClean="0"/>
+              <a:t>mapreduce</a:t>
+            </a:r>
+            <a:r>
+              <a:rPr lang="en-US" dirty="0" smtClean="0"/>
+              <a:t> version on Mahout is fast</a:t>
+            </a:r>
+            <a:endParaRPr lang="en-US" dirty="0"/>
+          </a:p>
+          <a:p>
+            <a:pPr lvl="1"/>
+            <a:endParaRPr lang="en-US" dirty="0"/>
+          </a:p>
+          <a:p>
+            <a:r>
+              <a:rPr lang="en-US" dirty="0" smtClean="0"/>
+              <a:t>Cons:</a:t>
+            </a:r>
+          </a:p>
+          <a:p>
+            <a:pPr lvl="1"/>
+            <a:r>
+              <a:rPr lang="en-US" dirty="0" smtClean="0"/>
+              <a:t>Umm…  k anyone?</a:t>
+            </a:r>
+          </a:p>
+          <a:p>
+            <a:pPr lvl="1"/>
+            <a:r>
+              <a:rPr lang="en-US" dirty="0" smtClean="0"/>
+              <a:t>Documentation?  We don’t need no stinking documentation!!!</a:t>
+            </a:r>
           </a:p>
         </p:txBody>
       </p:sp>
@@ -15874,7 +15948,7 @@
           <a:bodyPr/>
           <a:lstStyle/>
           <a:p>
-            <a:endParaRPr lang="en-US"/>
+            <a:endParaRPr lang="en-US" dirty="0"/>
           </a:p>
         </p:txBody>
       </p:sp>
@@ -16063,10 +16137,65 @@
         </p:nvSpPr>
         <p:spPr/>
         <p:txBody>
-          <a:bodyPr/>
+          <a:bodyPr>
+            <a:normAutofit lnSpcReduction="10000"/>
+          </a:bodyPr>
           <a:lstStyle/>
           <a:p>
-            <a:endParaRPr lang="en-US"/>
+            <a:r>
+              <a:rPr lang="en-US" dirty="0" smtClean="0"/>
+              <a:t>With</a:t>
+            </a:r>
+            <a:r>
+              <a:rPr lang="en-US" dirty="0" smtClean="0"/>
+              <a:t> Orange, “</a:t>
+            </a:r>
+            <a:r>
+              <a:rPr lang="en-US" dirty="0" smtClean="0"/>
+              <a:t>Data </a:t>
+            </a:r>
+            <a:r>
+              <a:rPr lang="en-US" dirty="0"/>
+              <a:t>Mining - Fruitful and </a:t>
+            </a:r>
+            <a:r>
+              <a:rPr lang="en-US" dirty="0" smtClean="0"/>
+              <a:t>Fun”, we plotted centroids picked by our </a:t>
+            </a:r>
+            <a:r>
+              <a:rPr lang="en-US" dirty="0" err="1" smtClean="0"/>
+              <a:t>clusterer</a:t>
+            </a:r>
+            <a:r>
+              <a:rPr lang="en-US" dirty="0" smtClean="0"/>
+              <a:t> using the linear projections visualization</a:t>
+            </a:r>
+          </a:p>
+          <a:p>
+            <a:endParaRPr lang="en-US" dirty="0"/>
+          </a:p>
+          <a:p>
+            <a:r>
+              <a:rPr lang="en-US" dirty="0" smtClean="0"/>
+              <a:t>Runs very slowly on desktop, so unable to perform much analysis</a:t>
+            </a:r>
+          </a:p>
+          <a:p>
+            <a:endParaRPr lang="en-US" dirty="0"/>
+          </a:p>
+          <a:p>
+            <a:r>
+              <a:rPr lang="en-US" dirty="0" smtClean="0"/>
+              <a:t>The black outer </a:t>
+            </a:r>
+            <a:r>
+              <a:rPr lang="en-US" smtClean="0"/>
+              <a:t>ring is all of the terms, and the dots are where the clusters are</a:t>
+            </a:r>
+            <a:endParaRPr lang="en-US" dirty="0"/>
+          </a:p>
+          <a:p>
+            <a:endParaRPr lang="en-US" dirty="0"/>
           </a:p>
         </p:txBody>
       </p:sp>
@@ -16119,6 +16248,77 @@
     <p:extLst>
       <p:ext uri="{BB962C8B-B14F-4D97-AF65-F5344CB8AC3E}">
         <p14:creationId xmlns:p14="http://schemas.microsoft.com/office/powerpoint/2010/main" val="575528864"/>
+      </p:ext>
+    </p:extLst>
+  </p:cSld>
+  <p:clrMapOvr>
+    <a:masterClrMapping/>
+  </p:clrMapOvr>
+</p:sld>
+</file>
+
+<file path=ppt/slides/slide14.xml><?xml version="1.0" encoding="utf-8"?>
+<p:sld xmlns:a="http://schemas.openxmlformats.org/drawingml/2006/main" xmlns:r="http://schemas.openxmlformats.org/officeDocument/2006/relationships" xmlns:p="http://schemas.openxmlformats.org/presentationml/2006/main">
+  <p:cSld>
+    <p:spTree>
+      <p:nvGrpSpPr>
+        <p:cNvPr id="1" name=""/>
+        <p:cNvGrpSpPr/>
+        <p:nvPr/>
+      </p:nvGrpSpPr>
+      <p:grpSpPr>
+        <a:xfrm>
+          <a:off x="0" y="0"/>
+          <a:ext cx="0" cy="0"/>
+          <a:chOff x="0" y="0"/>
+          <a:chExt cx="0" cy="0"/>
+        </a:xfrm>
+      </p:grpSpPr>
+      <p:pic>
+        <p:nvPicPr>
+          <p:cNvPr id="1026" name="Picture 2" descr="C:\Users\daniel\Desktop\centroidVisual.png"/>
+          <p:cNvPicPr>
+            <a:picLocks noChangeAspect="1" noChangeArrowheads="1"/>
+          </p:cNvPicPr>
+          <p:nvPr/>
+        </p:nvPicPr>
+        <p:blipFill>
+          <a:blip r:embed="rId2" cstate="email">
+            <a:extLst>
+              <a:ext uri="{28A0092B-C50C-407E-A947-70E740481C1C}">
+                <a14:useLocalDpi xmlns:a14="http://schemas.microsoft.com/office/drawing/2010/main" val="0"/>
+              </a:ext>
+            </a:extLst>
+          </a:blip>
+          <a:srcRect/>
+          <a:stretch>
+            <a:fillRect/>
+          </a:stretch>
+        </p:blipFill>
+        <p:spPr bwMode="auto">
+          <a:xfrm>
+            <a:off x="1" y="0"/>
+            <a:ext cx="9143999" cy="6875274"/>
+          </a:xfrm>
+          <a:prstGeom prst="rect">
+            <a:avLst/>
+          </a:prstGeom>
+          <a:noFill/>
+          <a:extLst>
+            <a:ext uri="{909E8E84-426E-40DD-AFC4-6F175D3DCCD1}">
+              <a14:hiddenFill xmlns:a14="http://schemas.microsoft.com/office/drawing/2010/main">
+                <a:solidFill>
+                  <a:srgbClr val="FFFFFF"/>
+                </a:solidFill>
+              </a14:hiddenFill>
+            </a:ext>
+          </a:extLst>
+        </p:spPr>
+      </p:pic>
+    </p:spTree>
+    <p:extLst>
+      <p:ext uri="{BB962C8B-B14F-4D97-AF65-F5344CB8AC3E}">
+        <p14:creationId xmlns:p14="http://schemas.microsoft.com/office/powerpoint/2010/main" val="535467097"/>
       </p:ext>
     </p:extLst>
   </p:cSld>
@@ -16777,8 +16977,13 @@
           <a:p>
             <a:r>
               <a:rPr lang="en-US" sz="2300" dirty="0" smtClean="0"/>
-              <a:t>This run we want to capture the number of words in each document.</a:t>
-            </a:r>
+              <a:t>This run we want to capture the number of words in each document</a:t>
+            </a:r>
+            <a:r>
+              <a:rPr lang="en-US" sz="2300" dirty="0" smtClean="0"/>
+              <a:t>.  Also, capture the max words in a document.</a:t>
+            </a:r>
+            <a:endParaRPr lang="en-US" sz="2300" dirty="0" smtClean="0"/>
           </a:p>
           <a:p>
             <a:endParaRPr lang="en-US" sz="2300" dirty="0"/>
@@ -16844,11 +17049,15 @@
             </a:r>
             <a:r>
               <a:rPr lang="en-US" sz="2300" dirty="0" smtClean="0"/>
-              <a:t>, #</a:t>
+              <a:t>, </a:t>
+            </a:r>
+            <a:r>
+              <a:rPr lang="en-US" sz="2300" dirty="0" smtClean="0"/>
+              <a:t>#</a:t>
             </a:r>
             <a:r>
               <a:rPr lang="en-US" sz="2300" dirty="0" err="1" smtClean="0"/>
-              <a:t>wordsInDoc</a:t>
+              <a:t>totalWordsInDoc</a:t>
             </a:r>
             <a:r>
               <a:rPr lang="en-US" sz="2300" dirty="0" smtClean="0"/>
@@ -16941,7 +17150,7 @@
         <p:spPr/>
         <p:txBody>
           <a:bodyPr>
-            <a:normAutofit/>
+            <a:normAutofit lnSpcReduction="10000"/>
           </a:bodyPr>
           <a:lstStyle/>
           <a:p>
@@ -16975,11 +17184,70 @@
             </a:r>
             <a:r>
               <a:rPr lang="en-US" sz="2300" dirty="0"/>
-              <a:t>) &gt;</a:t>
-            </a:r>
-          </a:p>
-          <a:p>
-            <a:endParaRPr lang="en-US" sz="2300" smtClean="0"/>
+              <a:t>) </a:t>
+            </a:r>
+            <a:r>
+              <a:rPr lang="en-US" sz="2300" dirty="0" smtClean="0"/>
+              <a:t>&gt; along with the max document word count.</a:t>
+            </a:r>
+          </a:p>
+          <a:p>
+            <a:endParaRPr lang="en-US" sz="2300" dirty="0"/>
+          </a:p>
+          <a:p>
+            <a:r>
+              <a:rPr lang="en-US" sz="2300" dirty="0" smtClean="0"/>
+              <a:t>Calculate Term Frequency (TF) and Inverse Document Frequency (IDF).  </a:t>
+            </a:r>
+            <a:r>
+              <a:rPr lang="en-US" sz="2300" dirty="0" smtClean="0"/>
+              <a:t>We used the max document </a:t>
+            </a:r>
+            <a:r>
+              <a:rPr lang="en-US" sz="2300" dirty="0" err="1" smtClean="0"/>
+              <a:t>wordcount</a:t>
+            </a:r>
+            <a:r>
+              <a:rPr lang="en-US" sz="2300" dirty="0" smtClean="0"/>
+              <a:t> obtained in the first run to normalize.</a:t>
+            </a:r>
+          </a:p>
+          <a:p>
+            <a:endParaRPr lang="en-US" sz="2300" dirty="0"/>
+          </a:p>
+          <a:p>
+            <a:r>
+              <a:rPr lang="en-US" sz="2300" dirty="0" smtClean="0"/>
+              <a:t>Output &lt; (word, </a:t>
+            </a:r>
+            <a:r>
+              <a:rPr lang="en-US" sz="2300" dirty="0" err="1" smtClean="0"/>
+              <a:t>docID</a:t>
+            </a:r>
+            <a:r>
+              <a:rPr lang="en-US" sz="2300" dirty="0" smtClean="0"/>
+              <a:t>), (#</a:t>
+            </a:r>
+            <a:r>
+              <a:rPr lang="en-US" sz="2300" dirty="0" err="1" smtClean="0"/>
+              <a:t>wordInDoc</a:t>
+            </a:r>
+            <a:r>
+              <a:rPr lang="en-US" sz="2300" dirty="0" smtClean="0"/>
+              <a:t>, #</a:t>
+            </a:r>
+            <a:r>
+              <a:rPr lang="en-US" sz="2300" dirty="0" err="1" smtClean="0"/>
+              <a:t>numDocsWithTerm</a:t>
+            </a:r>
+            <a:r>
+              <a:rPr lang="en-US" sz="2300" dirty="0" smtClean="0"/>
+              <a:t>, TF, IDF, TF-IDF) &gt; </a:t>
+            </a:r>
+            <a:endParaRPr lang="en-US" sz="2300" dirty="0"/>
+          </a:p>
+          <a:p>
+            <a:endParaRPr lang="en-US" sz="2300" dirty="0" smtClean="0"/>
           </a:p>
           <a:p>
             <a:endParaRPr lang="en-US" sz="2300" dirty="0"/>

</xml_diff>